<commit_message>
Additions to most lectures
</commit_message>
<xml_diff>
--- a/powerpoints/ITU Academy Slides AM4-02.pptx
+++ b/powerpoints/ITU Academy Slides AM4-02.pptx
@@ -21,6 +21,18 @@
     <p:sldId id="266" r:id="rId18"/>
     <p:sldId id="267" r:id="rId19"/>
     <p:sldId id="268" r:id="rId20"/>
+    <p:sldId id="269" r:id="rId21"/>
+    <p:sldId id="270" r:id="rId22"/>
+    <p:sldId id="271" r:id="rId23"/>
+    <p:sldId id="272" r:id="rId24"/>
+    <p:sldId id="273" r:id="rId25"/>
+    <p:sldId id="274" r:id="rId26"/>
+    <p:sldId id="275" r:id="rId27"/>
+    <p:sldId id="276" r:id="rId28"/>
+    <p:sldId id="277" r:id="rId29"/>
+    <p:sldId id="278" r:id="rId30"/>
+    <p:sldId id="279" r:id="rId31"/>
+    <p:sldId id="280" r:id="rId32"/>
   </p:sldIdLst>
   <p:sldSz cx="9144000" cy="6858000"/>
   <p:notesSz cx="6858000" cy="9144000"/>
@@ -542,6 +554,516 @@
               <a:t>What happens if not all conditions apply? e.g. the data is not huge but we want redundancy, parallel access?</a:t>
             </a:r>
           </a:p>
+          <a:p>
+            <a:pPr/>
+            <a:r>
+              <a:t>What is the difference with super-computers used for weather prediction, climate change research, particle physics?</a:t>
+            </a:r>
+          </a:p>
+        </p:txBody>
+      </p:sp>
+    </p:spTree>
+  </p:cSld>
+  <p:clrMapOvr>
+    <a:masterClrMapping/>
+  </p:clrMapOvr>
+</p:notes>
+</file>
+
+<file path=ppt/notesSlides/notesSlide10.xml><?xml version="1.0" encoding="utf-8"?>
+<p:notes xmlns:a="http://schemas.openxmlformats.org/drawingml/2006/main" xmlns:r="http://schemas.openxmlformats.org/officeDocument/2006/relationships" xmlns:p="http://schemas.openxmlformats.org/presentationml/2006/main" showMasterSp="1" showMasterPhAnim="1">
+  <p:cSld>
+    <p:spTree>
+      <p:nvGrpSpPr>
+        <p:cNvPr id="1" name=""/>
+        <p:cNvGrpSpPr/>
+        <p:nvPr/>
+      </p:nvGrpSpPr>
+      <p:grpSpPr>
+        <a:xfrm>
+          <a:off x="0" y="0"/>
+          <a:ext cx="0" cy="0"/>
+          <a:chOff x="0" y="0"/>
+          <a:chExt cx="0" cy="0"/>
+        </a:xfrm>
+      </p:grpSpPr>
+      <p:sp>
+        <p:nvSpPr>
+          <p:cNvPr id="214" name="Shape 214"/>
+          <p:cNvSpPr/>
+          <p:nvPr>
+            <p:ph type="sldImg"/>
+          </p:nvPr>
+        </p:nvSpPr>
+        <p:spPr>
+          <a:prstGeom prst="rect">
+            <a:avLst/>
+          </a:prstGeom>
+        </p:spPr>
+        <p:txBody>
+          <a:bodyPr/>
+          <a:lstStyle/>
+          <a:p>
+            <a:pPr/>
+          </a:p>
+        </p:txBody>
+      </p:sp>
+      <p:sp>
+        <p:nvSpPr>
+          <p:cNvPr id="215" name="Shape 215"/>
+          <p:cNvSpPr/>
+          <p:nvPr>
+            <p:ph type="body" sz="quarter" idx="1"/>
+          </p:nvPr>
+        </p:nvSpPr>
+        <p:spPr>
+          <a:prstGeom prst="rect">
+            <a:avLst/>
+          </a:prstGeom>
+        </p:spPr>
+        <p:txBody>
+          <a:bodyPr/>
+          <a:lstStyle/>
+          <a:p>
+            <a:pPr/>
+            <a:r>
+              <a:t>In a Zeppelin notebook running Scala, the pre-defined “spark” object will be the start of operations.</a:t>
+            </a:r>
+          </a:p>
+          <a:p>
+            <a:pPr/>
+          </a:p>
+          <a:p>
+            <a:pPr/>
+            <a:r>
+              <a:t>Explain the concept of single-assignment “val” values.</a:t>
+            </a:r>
+          </a:p>
+          <a:p>
+            <a:pPr/>
+          </a:p>
+          <a:p>
+            <a:pPr/>
+            <a:r>
+              <a:t>Explain the fields:</a:t>
+            </a:r>
+          </a:p>
+          <a:p>
+            <a:pPr/>
+            <a:r>
+              <a:t>id_1: the unique ID of user 1</a:t>
+            </a:r>
+          </a:p>
+          <a:p>
+            <a:pPr/>
+            <a:r>
+              <a:t>id_2: the unique ID of user 2 (who might be the same as user 1!)</a:t>
+            </a:r>
+          </a:p>
+          <a:p>
+            <a:pPr/>
+            <a:r>
+              <a:t>cmp_fname_c1, etc.: comparison results for various characteristics of the two users</a:t>
+            </a:r>
+          </a:p>
+          <a:p>
+            <a:pPr/>
+            <a:r>
+              <a:t>Not shown here but will be seen in the notebook: the actual result of “identical” or “not identical”</a:t>
+            </a:r>
+          </a:p>
+        </p:txBody>
+      </p:sp>
+    </p:spTree>
+  </p:cSld>
+  <p:clrMapOvr>
+    <a:masterClrMapping/>
+  </p:clrMapOvr>
+</p:notes>
+</file>
+
+<file path=ppt/notesSlides/notesSlide11.xml><?xml version="1.0" encoding="utf-8"?>
+<p:notes xmlns:a="http://schemas.openxmlformats.org/drawingml/2006/main" xmlns:r="http://schemas.openxmlformats.org/officeDocument/2006/relationships" xmlns:p="http://schemas.openxmlformats.org/presentationml/2006/main" showMasterSp="1" showMasterPhAnim="1">
+  <p:cSld>
+    <p:spTree>
+      <p:nvGrpSpPr>
+        <p:cNvPr id="1" name=""/>
+        <p:cNvGrpSpPr/>
+        <p:nvPr/>
+      </p:nvGrpSpPr>
+      <p:grpSpPr>
+        <a:xfrm>
+          <a:off x="0" y="0"/>
+          <a:ext cx="0" cy="0"/>
+          <a:chOff x="0" y="0"/>
+          <a:chExt cx="0" cy="0"/>
+        </a:xfrm>
+      </p:grpSpPr>
+      <p:sp>
+        <p:nvSpPr>
+          <p:cNvPr id="221" name="Shape 221"/>
+          <p:cNvSpPr/>
+          <p:nvPr>
+            <p:ph type="sldImg"/>
+          </p:nvPr>
+        </p:nvSpPr>
+        <p:spPr>
+          <a:prstGeom prst="rect">
+            <a:avLst/>
+          </a:prstGeom>
+        </p:spPr>
+        <p:txBody>
+          <a:bodyPr/>
+          <a:lstStyle/>
+          <a:p>
+            <a:pPr/>
+          </a:p>
+        </p:txBody>
+      </p:sp>
+      <p:sp>
+        <p:nvSpPr>
+          <p:cNvPr id="222" name="Shape 222"/>
+          <p:cNvSpPr/>
+          <p:nvPr>
+            <p:ph type="body" sz="quarter" idx="1"/>
+          </p:nvPr>
+        </p:nvSpPr>
+        <p:spPr>
+          <a:prstGeom prst="rect">
+            <a:avLst/>
+          </a:prstGeom>
+        </p:spPr>
+        <p:txBody>
+          <a:bodyPr/>
+          <a:lstStyle/>
+          <a:p>
+            <a:pPr/>
+            <a:r>
+              <a:t>The default inferred data type is “string” for everything</a:t>
+            </a:r>
+          </a:p>
+        </p:txBody>
+      </p:sp>
+    </p:spTree>
+  </p:cSld>
+  <p:clrMapOvr>
+    <a:masterClrMapping/>
+  </p:clrMapOvr>
+</p:notes>
+</file>
+
+<file path=ppt/notesSlides/notesSlide12.xml><?xml version="1.0" encoding="utf-8"?>
+<p:notes xmlns:a="http://schemas.openxmlformats.org/drawingml/2006/main" xmlns:r="http://schemas.openxmlformats.org/officeDocument/2006/relationships" xmlns:p="http://schemas.openxmlformats.org/presentationml/2006/main" showMasterSp="1" showMasterPhAnim="1">
+  <p:cSld>
+    <p:spTree>
+      <p:nvGrpSpPr>
+        <p:cNvPr id="1" name=""/>
+        <p:cNvGrpSpPr/>
+        <p:nvPr/>
+      </p:nvGrpSpPr>
+      <p:grpSpPr>
+        <a:xfrm>
+          <a:off x="0" y="0"/>
+          <a:ext cx="0" cy="0"/>
+          <a:chOff x="0" y="0"/>
+          <a:chExt cx="0" cy="0"/>
+        </a:xfrm>
+      </p:grpSpPr>
+      <p:sp>
+        <p:nvSpPr>
+          <p:cNvPr id="227" name="Shape 227"/>
+          <p:cNvSpPr/>
+          <p:nvPr>
+            <p:ph type="sldImg"/>
+          </p:nvPr>
+        </p:nvSpPr>
+        <p:spPr>
+          <a:prstGeom prst="rect">
+            <a:avLst/>
+          </a:prstGeom>
+        </p:spPr>
+        <p:txBody>
+          <a:bodyPr/>
+          <a:lstStyle/>
+          <a:p>
+            <a:pPr/>
+          </a:p>
+        </p:txBody>
+      </p:sp>
+      <p:sp>
+        <p:nvSpPr>
+          <p:cNvPr id="228" name="Shape 228"/>
+          <p:cNvSpPr/>
+          <p:nvPr>
+            <p:ph type="body" sz="quarter" idx="1"/>
+          </p:nvPr>
+        </p:nvSpPr>
+        <p:spPr>
+          <a:prstGeom prst="rect">
+            <a:avLst/>
+          </a:prstGeom>
+        </p:spPr>
+        <p:txBody>
+          <a:bodyPr/>
+          <a:lstStyle/>
+          <a:p>
+            <a:pPr/>
+            <a:r>
+              <a:t>To get correct data types inferred, we use the method “inferSchema”.</a:t>
+            </a:r>
+          </a:p>
+          <a:p>
+            <a:pPr/>
+            <a:r>
+              <a:t>It will inspect the values in each column and assigns the appropriate data type.</a:t>
+            </a:r>
+          </a:p>
+        </p:txBody>
+      </p:sp>
+    </p:spTree>
+  </p:cSld>
+  <p:clrMapOvr>
+    <a:masterClrMapping/>
+  </p:clrMapOvr>
+</p:notes>
+</file>
+
+<file path=ppt/notesSlides/notesSlide13.xml><?xml version="1.0" encoding="utf-8"?>
+<p:notes xmlns:a="http://schemas.openxmlformats.org/drawingml/2006/main" xmlns:r="http://schemas.openxmlformats.org/officeDocument/2006/relationships" xmlns:p="http://schemas.openxmlformats.org/presentationml/2006/main" showMasterSp="1" showMasterPhAnim="1">
+  <p:cSld>
+    <p:spTree>
+      <p:nvGrpSpPr>
+        <p:cNvPr id="1" name=""/>
+        <p:cNvGrpSpPr/>
+        <p:nvPr/>
+      </p:nvGrpSpPr>
+      <p:grpSpPr>
+        <a:xfrm>
+          <a:off x="0" y="0"/>
+          <a:ext cx="0" cy="0"/>
+          <a:chOff x="0" y="0"/>
+          <a:chExt cx="0" cy="0"/>
+        </a:xfrm>
+      </p:grpSpPr>
+      <p:sp>
+        <p:nvSpPr>
+          <p:cNvPr id="234" name="Shape 234"/>
+          <p:cNvSpPr/>
+          <p:nvPr>
+            <p:ph type="sldImg"/>
+          </p:nvPr>
+        </p:nvSpPr>
+        <p:spPr>
+          <a:prstGeom prst="rect">
+            <a:avLst/>
+          </a:prstGeom>
+        </p:spPr>
+        <p:txBody>
+          <a:bodyPr/>
+          <a:lstStyle/>
+          <a:p>
+            <a:pPr/>
+          </a:p>
+        </p:txBody>
+      </p:sp>
+      <p:sp>
+        <p:nvSpPr>
+          <p:cNvPr id="235" name="Shape 235"/>
+          <p:cNvSpPr/>
+          <p:nvPr>
+            <p:ph type="body" sz="quarter" idx="1"/>
+          </p:nvPr>
+        </p:nvSpPr>
+        <p:spPr>
+          <a:prstGeom prst="rect">
+            <a:avLst/>
+          </a:prstGeom>
+        </p:spPr>
+        <p:txBody>
+          <a:bodyPr/>
+          <a:lstStyle/>
+          <a:p>
+            <a:pPr/>
+            <a:r>
+              <a:t>Here are the results of the datatypes found by Spark.</a:t>
+            </a:r>
+          </a:p>
+          <a:p>
+            <a:pPr/>
+            <a:r>
+              <a:t>Notice that some are “double” while others are “integer”: the inference is fairly sophisticated.</a:t>
+            </a:r>
+          </a:p>
+        </p:txBody>
+      </p:sp>
+    </p:spTree>
+  </p:cSld>
+  <p:clrMapOvr>
+    <a:masterClrMapping/>
+  </p:clrMapOvr>
+</p:notes>
+</file>
+
+<file path=ppt/notesSlides/notesSlide14.xml><?xml version="1.0" encoding="utf-8"?>
+<p:notes xmlns:a="http://schemas.openxmlformats.org/drawingml/2006/main" xmlns:r="http://schemas.openxmlformats.org/officeDocument/2006/relationships" xmlns:p="http://schemas.openxmlformats.org/presentationml/2006/main" showMasterSp="1" showMasterPhAnim="1">
+  <p:cSld>
+    <p:spTree>
+      <p:nvGrpSpPr>
+        <p:cNvPr id="1" name=""/>
+        <p:cNvGrpSpPr/>
+        <p:nvPr/>
+      </p:nvGrpSpPr>
+      <p:grpSpPr>
+        <a:xfrm>
+          <a:off x="0" y="0"/>
+          <a:ext cx="0" cy="0"/>
+          <a:chOff x="0" y="0"/>
+          <a:chExt cx="0" cy="0"/>
+        </a:xfrm>
+      </p:grpSpPr>
+      <p:sp>
+        <p:nvSpPr>
+          <p:cNvPr id="240" name="Shape 240"/>
+          <p:cNvSpPr/>
+          <p:nvPr>
+            <p:ph type="sldImg"/>
+          </p:nvPr>
+        </p:nvSpPr>
+        <p:spPr>
+          <a:prstGeom prst="rect">
+            <a:avLst/>
+          </a:prstGeom>
+        </p:spPr>
+        <p:txBody>
+          <a:bodyPr/>
+          <a:lstStyle/>
+          <a:p>
+            <a:pPr/>
+          </a:p>
+        </p:txBody>
+      </p:sp>
+      <p:sp>
+        <p:nvSpPr>
+          <p:cNvPr id="241" name="Shape 241"/>
+          <p:cNvSpPr/>
+          <p:nvPr>
+            <p:ph type="body" sz="quarter" idx="1"/>
+          </p:nvPr>
+        </p:nvSpPr>
+        <p:spPr>
+          <a:prstGeom prst="rect">
+            <a:avLst/>
+          </a:prstGeom>
+        </p:spPr>
+        <p:txBody>
+          <a:bodyPr/>
+          <a:lstStyle/>
+          <a:p>
+            <a:pPr/>
+            <a:r>
+              <a:t>Explain the operations:</a:t>
+            </a:r>
+          </a:p>
+          <a:p>
+            <a:pPr/>
+            <a:r>
+              <a:t>count() -&gt; see result</a:t>
+            </a:r>
+          </a:p>
+          <a:p>
+            <a:pPr/>
+            <a:r>
+              <a:t>cache() -&gt; results will be kept in memory until caching is disabled</a:t>
+            </a:r>
+          </a:p>
+          <a:p>
+            <a:pPr/>
+            <a:r>
+              <a:t>The next operation is a pipeline, explain each step:</a:t>
+            </a:r>
+          </a:p>
+          <a:p>
+            <a:pPr/>
+            <a:r>
+              <a:t>groupBy(“is_match”) -&gt; how many records are labeled “is_match”</a:t>
+            </a:r>
+          </a:p>
+          <a:p>
+            <a:pPr/>
+            <a:r>
+              <a:t>count() -&gt; etc. etc.</a:t>
+            </a:r>
+          </a:p>
+        </p:txBody>
+      </p:sp>
+    </p:spTree>
+  </p:cSld>
+  <p:clrMapOvr>
+    <a:masterClrMapping/>
+  </p:clrMapOvr>
+</p:notes>
+</file>
+
+<file path=ppt/notesSlides/notesSlide15.xml><?xml version="1.0" encoding="utf-8"?>
+<p:notes xmlns:a="http://schemas.openxmlformats.org/drawingml/2006/main" xmlns:r="http://schemas.openxmlformats.org/officeDocument/2006/relationships" xmlns:p="http://schemas.openxmlformats.org/presentationml/2006/main" showMasterSp="1" showMasterPhAnim="1">
+  <p:cSld>
+    <p:spTree>
+      <p:nvGrpSpPr>
+        <p:cNvPr id="1" name=""/>
+        <p:cNvGrpSpPr/>
+        <p:nvPr/>
+      </p:nvGrpSpPr>
+      <p:grpSpPr>
+        <a:xfrm>
+          <a:off x="0" y="0"/>
+          <a:ext cx="0" cy="0"/>
+          <a:chOff x="0" y="0"/>
+          <a:chExt cx="0" cy="0"/>
+        </a:xfrm>
+      </p:grpSpPr>
+      <p:sp>
+        <p:nvSpPr>
+          <p:cNvPr id="246" name="Shape 246"/>
+          <p:cNvSpPr/>
+          <p:nvPr>
+            <p:ph type="sldImg"/>
+          </p:nvPr>
+        </p:nvSpPr>
+        <p:spPr>
+          <a:prstGeom prst="rect">
+            <a:avLst/>
+          </a:prstGeom>
+        </p:spPr>
+        <p:txBody>
+          <a:bodyPr/>
+          <a:lstStyle/>
+          <a:p>
+            <a:pPr/>
+          </a:p>
+        </p:txBody>
+      </p:sp>
+      <p:sp>
+        <p:nvSpPr>
+          <p:cNvPr id="247" name="Shape 247"/>
+          <p:cNvSpPr/>
+          <p:nvPr>
+            <p:ph type="body" sz="quarter" idx="1"/>
+          </p:nvPr>
+        </p:nvSpPr>
+        <p:spPr>
+          <a:prstGeom prst="rect">
+            <a:avLst/>
+          </a:prstGeom>
+        </p:spPr>
+        <p:txBody>
+          <a:bodyPr/>
+          <a:lstStyle/>
+          <a:p>
+            <a:pPr/>
+            <a:r>
+              <a:t>Spark also supports SQL queries; the multi-line quotation is a proper SQL expression sent to Spark.</a:t>
+            </a:r>
+          </a:p>
         </p:txBody>
       </p:sp>
     </p:spTree>
@@ -1067,6 +1589,146 @@
             <a:pPr/>
             <a:r>
               <a:t>Instructions in the accompanying Zeppelin notebook</a:t>
+            </a:r>
+          </a:p>
+        </p:txBody>
+      </p:sp>
+    </p:spTree>
+  </p:cSld>
+  <p:clrMapOvr>
+    <a:masterClrMapping/>
+  </p:clrMapOvr>
+</p:notes>
+</file>
+
+<file path=ppt/notesSlides/notesSlide8.xml><?xml version="1.0" encoding="utf-8"?>
+<p:notes xmlns:a="http://schemas.openxmlformats.org/drawingml/2006/main" xmlns:r="http://schemas.openxmlformats.org/officeDocument/2006/relationships" xmlns:p="http://schemas.openxmlformats.org/presentationml/2006/main" showMasterSp="1" showMasterPhAnim="1">
+  <p:cSld>
+    <p:spTree>
+      <p:nvGrpSpPr>
+        <p:cNvPr id="1" name=""/>
+        <p:cNvGrpSpPr/>
+        <p:nvPr/>
+      </p:nvGrpSpPr>
+      <p:grpSpPr>
+        <a:xfrm>
+          <a:off x="0" y="0"/>
+          <a:ext cx="0" cy="0"/>
+          <a:chOff x="0" y="0"/>
+          <a:chExt cx="0" cy="0"/>
+        </a:xfrm>
+      </p:grpSpPr>
+      <p:sp>
+        <p:nvSpPr>
+          <p:cNvPr id="202" name="Shape 202"/>
+          <p:cNvSpPr/>
+          <p:nvPr>
+            <p:ph type="sldImg"/>
+          </p:nvPr>
+        </p:nvSpPr>
+        <p:spPr>
+          <a:prstGeom prst="rect">
+            <a:avLst/>
+          </a:prstGeom>
+        </p:spPr>
+        <p:txBody>
+          <a:bodyPr/>
+          <a:lstStyle/>
+          <a:p>
+            <a:pPr/>
+          </a:p>
+        </p:txBody>
+      </p:sp>
+      <p:sp>
+        <p:nvSpPr>
+          <p:cNvPr id="203" name="Shape 203"/>
+          <p:cNvSpPr/>
+          <p:nvPr>
+            <p:ph type="body" sz="quarter" idx="1"/>
+          </p:nvPr>
+        </p:nvSpPr>
+        <p:spPr>
+          <a:prstGeom prst="rect">
+            <a:avLst/>
+          </a:prstGeom>
+        </p:spPr>
+        <p:txBody>
+          <a:bodyPr/>
+          <a:lstStyle/>
+          <a:p>
+            <a:pPr/>
+            <a:r>
+              <a:t>Give some examples from the textbook</a:t>
+            </a:r>
+          </a:p>
+        </p:txBody>
+      </p:sp>
+    </p:spTree>
+  </p:cSld>
+  <p:clrMapOvr>
+    <a:masterClrMapping/>
+  </p:clrMapOvr>
+</p:notes>
+</file>
+
+<file path=ppt/notesSlides/notesSlide9.xml><?xml version="1.0" encoding="utf-8"?>
+<p:notes xmlns:a="http://schemas.openxmlformats.org/drawingml/2006/main" xmlns:r="http://schemas.openxmlformats.org/officeDocument/2006/relationships" xmlns:p="http://schemas.openxmlformats.org/presentationml/2006/main" showMasterSp="1" showMasterPhAnim="1">
+  <p:cSld>
+    <p:spTree>
+      <p:nvGrpSpPr>
+        <p:cNvPr id="1" name=""/>
+        <p:cNvGrpSpPr/>
+        <p:nvPr/>
+      </p:nvGrpSpPr>
+      <p:grpSpPr>
+        <a:xfrm>
+          <a:off x="0" y="0"/>
+          <a:ext cx="0" cy="0"/>
+          <a:chOff x="0" y="0"/>
+          <a:chExt cx="0" cy="0"/>
+        </a:xfrm>
+      </p:grpSpPr>
+      <p:sp>
+        <p:nvSpPr>
+          <p:cNvPr id="207" name="Shape 207"/>
+          <p:cNvSpPr/>
+          <p:nvPr>
+            <p:ph type="sldImg"/>
+          </p:nvPr>
+        </p:nvSpPr>
+        <p:spPr>
+          <a:prstGeom prst="rect">
+            <a:avLst/>
+          </a:prstGeom>
+        </p:spPr>
+        <p:txBody>
+          <a:bodyPr/>
+          <a:lstStyle/>
+          <a:p>
+            <a:pPr/>
+          </a:p>
+        </p:txBody>
+      </p:sp>
+      <p:sp>
+        <p:nvSpPr>
+          <p:cNvPr id="208" name="Shape 208"/>
+          <p:cNvSpPr/>
+          <p:nvPr>
+            <p:ph type="body" sz="quarter" idx="1"/>
+          </p:nvPr>
+        </p:nvSpPr>
+        <p:spPr>
+          <a:prstGeom prst="rect">
+            <a:avLst/>
+          </a:prstGeom>
+        </p:spPr>
+        <p:txBody>
+          <a:bodyPr/>
+          <a:lstStyle/>
+          <a:p>
+            <a:pPr/>
+            <a:r>
+              <a:t>Explain the concept of “case class” in Scala</a:t>
             </a:r>
           </a:p>
         </p:txBody>
@@ -4082,7 +4744,7 @@
       </p:grpSpPr>
       <p:sp>
         <p:nvSpPr>
-          <p:cNvPr id="200" name="Start Spark, connect to an RDD"/>
+          <p:cNvPr id="200" name="Example task: Record Linkage"/>
           <p:cNvSpPr txBox="1"/>
           <p:nvPr>
             <p:ph type="title"/>
@@ -4099,7 +4761,49 @@
           <a:p>
             <a:pPr/>
             <a:r>
-              <a:t>Start Spark, connect to an RDD</a:t>
+              <a:t>Example task: Record Linkage</a:t>
+            </a:r>
+          </a:p>
+        </p:txBody>
+      </p:sp>
+      <p:sp>
+        <p:nvSpPr>
+          <p:cNvPr id="201" name="We have a database with records, some of them from the same source…"/>
+          <p:cNvSpPr txBox="1"/>
+          <p:nvPr>
+            <p:ph type="body" idx="1"/>
+          </p:nvPr>
+        </p:nvSpPr>
+        <p:spPr>
+          <a:prstGeom prst="rect">
+            <a:avLst/>
+          </a:prstGeom>
+        </p:spPr>
+        <p:txBody>
+          <a:bodyPr/>
+          <a:lstStyle/>
+          <a:p>
+            <a:pPr/>
+            <a:r>
+              <a:t>We have a database with records, some of them from the same source</a:t>
+            </a:r>
+          </a:p>
+          <a:p>
+            <a:pPr/>
+            <a:r>
+              <a:t>However, they have subtle differences: small pieces missing from addresses, names written with abbreviations, misspellings, etc.</a:t>
+            </a:r>
+          </a:p>
+          <a:p>
+            <a:pPr/>
+            <a:r>
+              <a:t>How can we identify and collect linked records?</a:t>
+            </a:r>
+          </a:p>
+          <a:p>
+            <a:pPr/>
+            <a:r>
+              <a:t>Test database: “linkage”</a:t>
             </a:r>
           </a:p>
         </p:txBody>
@@ -4132,7 +4836,7 @@
       </p:grpSpPr>
       <p:sp>
         <p:nvSpPr>
-          <p:cNvPr id="202" name="Define helper function"/>
+          <p:cNvPr id="205" name="Start Spark, define schema for RDD"/>
           <p:cNvSpPr txBox="1"/>
           <p:nvPr>
             <p:ph type="title"/>
@@ -4149,7 +4853,136 @@
           <a:p>
             <a:pPr/>
             <a:r>
-              <a:t>Define helper function</a:t>
+              <a:t>Start Spark, define schema for RDD</a:t>
+            </a:r>
+          </a:p>
+        </p:txBody>
+      </p:sp>
+      <p:sp>
+        <p:nvSpPr>
+          <p:cNvPr id="206" name="import org.apache.spark.sql.{DataFrame, Dataset, Row, SparkSession}…"/>
+          <p:cNvSpPr txBox="1"/>
+          <p:nvPr/>
+        </p:nvSpPr>
+        <p:spPr>
+          <a:xfrm>
+            <a:off x="1272984" y="1296315"/>
+            <a:ext cx="6598033" cy="5120641"/>
+          </a:xfrm>
+          <a:prstGeom prst="rect">
+            <a:avLst/>
+          </a:prstGeom>
+          <a:ln w="12700">
+            <a:miter lim="400000"/>
+          </a:ln>
+          <a:extLst>
+            <a:ext uri="{C572A759-6A51-4108-AA02-DFA0A04FC94B}">
+              <ma14:wrappingTextBoxFlag xmlns:ma14="http://schemas.microsoft.com/office/mac/drawingml/2011/main" val="1"/>
+            </a:ext>
+          </a:extLst>
+        </p:spPr>
+        <p:txBody>
+          <a:bodyPr wrap="none" lIns="45719" rIns="45719">
+            <a:spAutoFit/>
+          </a:bodyPr>
+          <a:lstStyle/>
+          <a:p>
+            <a:pPr/>
+            <a:r>
+              <a:t>import org.apache.spark.sql.{DataFrame, Dataset, Row, SparkSession}</a:t>
+            </a:r>
+          </a:p>
+          <a:p>
+            <a:pPr/>
+            <a:r>
+              <a:t>import org.apache.spark.sql.functions._ // for lit(), first(), etc.</a:t>
+            </a:r>
+          </a:p>
+          <a:p>
+            <a:pPr/>
+          </a:p>
+          <a:p>
+            <a:pPr/>
+            <a:r>
+              <a:t>case class MatchData(</a:t>
+            </a:r>
+          </a:p>
+          <a:p>
+            <a:pPr/>
+            <a:r>
+              <a:t>  id_1: Int,</a:t>
+            </a:r>
+          </a:p>
+          <a:p>
+            <a:pPr/>
+            <a:r>
+              <a:t>  id_2: Int,</a:t>
+            </a:r>
+          </a:p>
+          <a:p>
+            <a:pPr/>
+            <a:r>
+              <a:t>  cmp_fname_c1: Option[Double],</a:t>
+            </a:r>
+          </a:p>
+          <a:p>
+            <a:pPr/>
+            <a:r>
+              <a:t>  cmp_fname_c2: Option[Double],</a:t>
+            </a:r>
+          </a:p>
+          <a:p>
+            <a:pPr/>
+            <a:r>
+              <a:t>  cmp_lname_c1: Option[Double],</a:t>
+            </a:r>
+          </a:p>
+          <a:p>
+            <a:pPr/>
+            <a:r>
+              <a:t>  cmp_lname_c2: Option[Double],</a:t>
+            </a:r>
+          </a:p>
+          <a:p>
+            <a:pPr/>
+            <a:r>
+              <a:t>  cmp_sex: Option[Int],</a:t>
+            </a:r>
+          </a:p>
+          <a:p>
+            <a:pPr/>
+            <a:r>
+              <a:t>  cmp_bd: Option[Int],</a:t>
+            </a:r>
+          </a:p>
+          <a:p>
+            <a:pPr/>
+            <a:r>
+              <a:t>  cmp_bm: Option[Int],</a:t>
+            </a:r>
+          </a:p>
+          <a:p>
+            <a:pPr/>
+            <a:r>
+              <a:t>  cmp_by: Option[Int],</a:t>
+            </a:r>
+          </a:p>
+          <a:p>
+            <a:pPr/>
+            <a:r>
+              <a:t>  cmp_plz: Option[Int],</a:t>
+            </a:r>
+          </a:p>
+          <a:p>
+            <a:pPr/>
+            <a:r>
+              <a:t>  is_match: Boolean</a:t>
+            </a:r>
+          </a:p>
+          <a:p>
+            <a:pPr/>
+            <a:r>
+              <a:t>)</a:t>
             </a:r>
           </a:p>
         </p:txBody>
@@ -4182,7 +5015,7 @@
       </p:grpSpPr>
       <p:sp>
         <p:nvSpPr>
-          <p:cNvPr id="204" name="Start operating on RDD"/>
+          <p:cNvPr id="210" name="Connect to the RDD, inspect it"/>
           <p:cNvSpPr txBox="1"/>
           <p:nvPr>
             <p:ph type="title"/>
@@ -4199,7 +5032,2740 @@
           <a:p>
             <a:pPr/>
             <a:r>
-              <a:t>Start operating on RDD</a:t>
+              <a:t>Connect to the RDD, inspect it</a:t>
+            </a:r>
+          </a:p>
+        </p:txBody>
+      </p:sp>
+      <p:sp>
+        <p:nvSpPr>
+          <p:cNvPr id="211" name="import spark.implicits._…"/>
+          <p:cNvSpPr txBox="1"/>
+          <p:nvPr/>
+        </p:nvSpPr>
+        <p:spPr>
+          <a:xfrm>
+            <a:off x="1319083" y="1230498"/>
+            <a:ext cx="3934307" cy="1767841"/>
+          </a:xfrm>
+          <a:prstGeom prst="rect">
+            <a:avLst/>
+          </a:prstGeom>
+          <a:ln w="12700">
+            <a:miter lim="400000"/>
+          </a:ln>
+          <a:extLst>
+            <a:ext uri="{C572A759-6A51-4108-AA02-DFA0A04FC94B}">
+              <ma14:wrappingTextBoxFlag xmlns:ma14="http://schemas.microsoft.com/office/mac/drawingml/2011/main" val="1"/>
+            </a:ext>
+          </a:extLst>
+        </p:spPr>
+        <p:txBody>
+          <a:bodyPr wrap="none" lIns="45719" rIns="45719">
+            <a:spAutoFit/>
+          </a:bodyPr>
+          <a:lstStyle/>
+          <a:p>
+            <a:pPr/>
+            <a:r>
+              <a:t>    import spark.implicits._</a:t>
+            </a:r>
+          </a:p>
+          <a:p>
+            <a:pPr/>
+            <a:r>
+              <a:t> </a:t>
+            </a:r>
+          </a:p>
+          <a:p>
+            <a:pPr/>
+            <a:r>
+              <a:t>    val preview = spark.read.csv("linkage")</a:t>
+            </a:r>
+          </a:p>
+          <a:p>
+            <a:pPr>
+              <a:defRPr b="1"/>
+            </a:pPr>
+            <a:r>
+              <a:t>    preview.show()</a:t>
+            </a:r>
+          </a:p>
+          <a:p>
+            <a:pPr/>
+          </a:p>
+        </p:txBody>
+      </p:sp>
+      <p:sp>
+        <p:nvSpPr>
+          <p:cNvPr id="212" name="preview: org.apache.spark.sql.DataFrame = [_c0: string, _c1: string ... 10 more fields]…"/>
+          <p:cNvSpPr txBox="1"/>
+          <p:nvPr/>
+        </p:nvSpPr>
+        <p:spPr>
+          <a:xfrm>
+            <a:off x="168379" y="3395743"/>
+            <a:ext cx="12765466" cy="3126716"/>
+          </a:xfrm>
+          <a:prstGeom prst="rect">
+            <a:avLst/>
+          </a:prstGeom>
+          <a:ln w="12700">
+            <a:miter lim="400000"/>
+          </a:ln>
+          <a:extLst>
+            <a:ext uri="{C572A759-6A51-4108-AA02-DFA0A04FC94B}">
+              <ma14:wrappingTextBoxFlag xmlns:ma14="http://schemas.microsoft.com/office/mac/drawingml/2011/main" val="1"/>
+            </a:ext>
+          </a:extLst>
+        </p:spPr>
+        <p:txBody>
+          <a:bodyPr lIns="45719" rIns="45719">
+            <a:spAutoFit/>
+          </a:bodyPr>
+          <a:lstStyle/>
+          <a:p>
+            <a:pPr defTabSz="457200">
+              <a:lnSpc>
+                <a:spcPts val="3000"/>
+              </a:lnSpc>
+              <a:defRPr sz="1200">
+                <a:solidFill>
+                  <a:srgbClr val="212121"/>
+                </a:solidFill>
+                <a:latin typeface="Monaco"/>
+                <a:ea typeface="Monaco"/>
+                <a:cs typeface="Monaco"/>
+                <a:sym typeface="Monaco"/>
+              </a:defRPr>
+            </a:pPr>
+            <a:r>
+              <a:t>preview: org.apache.spark.sql.DataFrame = [_c0: string, _c1: string ... 10 more fields]</a:t>
+            </a:r>
+          </a:p>
+          <a:p>
+            <a:pPr defTabSz="457200">
+              <a:lnSpc>
+                <a:spcPts val="3000"/>
+              </a:lnSpc>
+              <a:defRPr sz="1200">
+                <a:solidFill>
+                  <a:srgbClr val="212121"/>
+                </a:solidFill>
+                <a:latin typeface="Monaco"/>
+                <a:ea typeface="Monaco"/>
+                <a:cs typeface="Monaco"/>
+                <a:sym typeface="Monaco"/>
+              </a:defRPr>
+            </a:pPr>
+            <a:r>
+              <a:t>+-----+-----+------------+------------+------------+------------+-------+------+------+------+-------+--------+</a:t>
+            </a:r>
+          </a:p>
+          <a:p>
+            <a:pPr defTabSz="457200">
+              <a:lnSpc>
+                <a:spcPts val="3000"/>
+              </a:lnSpc>
+              <a:defRPr sz="1200">
+                <a:solidFill>
+                  <a:srgbClr val="212121"/>
+                </a:solidFill>
+                <a:latin typeface="Monaco"/>
+                <a:ea typeface="Monaco"/>
+                <a:cs typeface="Monaco"/>
+                <a:sym typeface="Monaco"/>
+              </a:defRPr>
+            </a:pPr>
+            <a:r>
+              <a:t>|  _c0|  _c1|         _c2|         _c3|         _c4|         _c5|    _c6|   _c7|   _c8|   _c9|   _c10|    _c11|</a:t>
+            </a:r>
+          </a:p>
+          <a:p>
+            <a:pPr defTabSz="457200">
+              <a:lnSpc>
+                <a:spcPts val="3000"/>
+              </a:lnSpc>
+              <a:defRPr sz="1200">
+                <a:solidFill>
+                  <a:srgbClr val="212121"/>
+                </a:solidFill>
+                <a:latin typeface="Monaco"/>
+                <a:ea typeface="Monaco"/>
+                <a:cs typeface="Monaco"/>
+                <a:sym typeface="Monaco"/>
+              </a:defRPr>
+            </a:pPr>
+            <a:r>
+              <a:t>+-----+-----+------------+------------+------------+------------+-------+------+------+------+-------+--------+</a:t>
+            </a:r>
+          </a:p>
+          <a:p>
+            <a:pPr defTabSz="457200">
+              <a:lnSpc>
+                <a:spcPts val="3000"/>
+              </a:lnSpc>
+              <a:defRPr sz="1200">
+                <a:solidFill>
+                  <a:srgbClr val="212121"/>
+                </a:solidFill>
+                <a:latin typeface="Monaco"/>
+                <a:ea typeface="Monaco"/>
+                <a:cs typeface="Monaco"/>
+                <a:sym typeface="Monaco"/>
+              </a:defRPr>
+            </a:pPr>
+            <a:r>
+              <a:t>| id_1| id_2|cmp_fname_c1|cmp_fname_c2|cmp_lname_c1|cmp_lname_c2|cmp_sex|cmp_bd|cmp_bm|cmp_by|cmp_plz|is_match|</a:t>
+            </a:r>
+          </a:p>
+          <a:p>
+            <a:pPr defTabSz="457200">
+              <a:lnSpc>
+                <a:spcPts val="3000"/>
+              </a:lnSpc>
+              <a:defRPr sz="1200">
+                <a:solidFill>
+                  <a:srgbClr val="212121"/>
+                </a:solidFill>
+                <a:latin typeface="Monaco"/>
+                <a:ea typeface="Monaco"/>
+                <a:cs typeface="Monaco"/>
+                <a:sym typeface="Monaco"/>
+              </a:defRPr>
+            </a:pPr>
+            <a:r>
+              <a:t>| 3148| 8326|           1|           ?|           1|           ?|      1|     1|     1|     1|      1|    TRUE|</a:t>
+            </a:r>
+          </a:p>
+          <a:p>
+            <a:pPr defTabSz="457200">
+              <a:lnSpc>
+                <a:spcPts val="3000"/>
+              </a:lnSpc>
+              <a:defRPr sz="1200">
+                <a:solidFill>
+                  <a:srgbClr val="212121"/>
+                </a:solidFill>
+                <a:latin typeface="Monaco"/>
+                <a:ea typeface="Monaco"/>
+                <a:cs typeface="Monaco"/>
+                <a:sym typeface="Monaco"/>
+              </a:defRPr>
+            </a:pPr>
+            <a:r>
+              <a:t>|14055|94934|           1|           ?|           1|           ?|      1|     1|     1|     1|      1|    TRUE|</a:t>
+            </a:r>
+          </a:p>
+          <a:p>
+            <a:pPr defTabSz="457200">
+              <a:lnSpc>
+                <a:spcPts val="3000"/>
+              </a:lnSpc>
+              <a:defRPr sz="1200">
+                <a:solidFill>
+                  <a:srgbClr val="212121"/>
+                </a:solidFill>
+                <a:latin typeface="Monaco"/>
+                <a:ea typeface="Monaco"/>
+                <a:cs typeface="Monaco"/>
+                <a:sym typeface="Monaco"/>
+              </a:defRPr>
+            </a:pPr>
+            <a:r>
+              <a:t>|33948|34740|           1|           ?|           1|           ?|      1|     1|     1|     1|      1|    TRUE|</a:t>
+            </a:r>
+          </a:p>
+          <a:p>
+            <a:pPr defTabSz="457200">
+              <a:lnSpc>
+                <a:spcPts val="3000"/>
+              </a:lnSpc>
+              <a:defRPr sz="1200">
+                <a:solidFill>
+                  <a:srgbClr val="212121"/>
+                </a:solidFill>
+                <a:latin typeface="Monaco"/>
+                <a:ea typeface="Monaco"/>
+                <a:cs typeface="Monaco"/>
+                <a:sym typeface="Monaco"/>
+              </a:defRPr>
+            </a:pPr>
+            <a:r>
+              <a:t>|  946|71870|           1|           ?|           1|           ?|      1|     1|     1|     1|      1|    TRUE|</a:t>
+            </a:r>
+          </a:p>
+          <a:p>
+            <a:pPr defTabSz="457200">
+              <a:lnSpc>
+                <a:spcPts val="3000"/>
+              </a:lnSpc>
+              <a:defRPr sz="1200">
+                <a:solidFill>
+                  <a:srgbClr val="212121"/>
+                </a:solidFill>
+                <a:latin typeface="Monaco"/>
+                <a:ea typeface="Monaco"/>
+                <a:cs typeface="Monaco"/>
+                <a:sym typeface="Monaco"/>
+              </a:defRPr>
+            </a:pPr>
+            <a:r>
+              <a:t>|64880|71676|           1|           ?|           1|           ?|      1|     1|     1|     1|      1|    TRUE|</a:t>
+            </a:r>
+          </a:p>
+          <a:p>
+            <a:pPr defTabSz="457200">
+              <a:lnSpc>
+                <a:spcPts val="3000"/>
+              </a:lnSpc>
+              <a:defRPr sz="1200">
+                <a:solidFill>
+                  <a:srgbClr val="212121"/>
+                </a:solidFill>
+                <a:latin typeface="Monaco"/>
+                <a:ea typeface="Monaco"/>
+                <a:cs typeface="Monaco"/>
+                <a:sym typeface="Monaco"/>
+              </a:defRPr>
+            </a:pPr>
+            <a:r>
+              <a:t>|25739|45991|           1|           ?|           1|           ?|      1|     1|     1|     1|      1|    TRUE|</a:t>
+            </a:r>
+          </a:p>
+          <a:p>
+            <a:pPr defTabSz="457200">
+              <a:lnSpc>
+                <a:spcPts val="3000"/>
+              </a:lnSpc>
+              <a:defRPr sz="1200">
+                <a:solidFill>
+                  <a:srgbClr val="212121"/>
+                </a:solidFill>
+                <a:latin typeface="Monaco"/>
+                <a:ea typeface="Monaco"/>
+                <a:cs typeface="Monaco"/>
+                <a:sym typeface="Monaco"/>
+              </a:defRPr>
+            </a:pPr>
+            <a:r>
+              <a:t>|62415|93584|           1|           ?|           1|           ?|      1|     1|     1|     1|      0|    TRUE|</a:t>
+            </a:r>
+          </a:p>
+          <a:p>
+            <a:pPr defTabSz="457200">
+              <a:lnSpc>
+                <a:spcPts val="3000"/>
+              </a:lnSpc>
+              <a:defRPr sz="1200">
+                <a:solidFill>
+                  <a:srgbClr val="212121"/>
+                </a:solidFill>
+                <a:latin typeface="Monaco"/>
+                <a:ea typeface="Monaco"/>
+                <a:cs typeface="Monaco"/>
+                <a:sym typeface="Monaco"/>
+              </a:defRPr>
+            </a:pPr>
+            <a:r>
+              <a:t>|27995|31399|           1|           ?|           1|           ?|      1|     1|     1|     1|      1|    TRUE|</a:t>
+            </a:r>
+          </a:p>
+          <a:p>
+            <a:pPr defTabSz="457200">
+              <a:lnSpc>
+                <a:spcPts val="3000"/>
+              </a:lnSpc>
+              <a:defRPr sz="1200">
+                <a:solidFill>
+                  <a:srgbClr val="212121"/>
+                </a:solidFill>
+                <a:latin typeface="Monaco"/>
+                <a:ea typeface="Monaco"/>
+                <a:cs typeface="Monaco"/>
+                <a:sym typeface="Monaco"/>
+              </a:defRPr>
+            </a:pPr>
+            <a:r>
+              <a:t>| 4909|12238|           1|           ?|           1|           ?|      1|     1|     1|     1|      1|    TRUE|</a:t>
+            </a:r>
+          </a:p>
+        </p:txBody>
+      </p:sp>
+      <p:sp>
+        <p:nvSpPr>
+          <p:cNvPr id="213" name="The head of the raw RDD:"/>
+          <p:cNvSpPr txBox="1"/>
+          <p:nvPr/>
+        </p:nvSpPr>
+        <p:spPr>
+          <a:xfrm>
+            <a:off x="387376" y="3011620"/>
+            <a:ext cx="2484908" cy="370841"/>
+          </a:xfrm>
+          <a:prstGeom prst="rect">
+            <a:avLst/>
+          </a:prstGeom>
+          <a:ln w="12700">
+            <a:miter lim="400000"/>
+          </a:ln>
+          <a:extLst>
+            <a:ext uri="{C572A759-6A51-4108-AA02-DFA0A04FC94B}">
+              <ma14:wrappingTextBoxFlag xmlns:ma14="http://schemas.microsoft.com/office/mac/drawingml/2011/main" val="1"/>
+            </a:ext>
+          </a:extLst>
+        </p:spPr>
+        <p:txBody>
+          <a:bodyPr wrap="none" lIns="45719" rIns="45719">
+            <a:spAutoFit/>
+          </a:bodyPr>
+          <a:lstStyle/>
+          <a:p>
+            <a:pPr/>
+            <a:r>
+              <a:t>The head of the raw RDD:</a:t>
+            </a:r>
+          </a:p>
+        </p:txBody>
+      </p:sp>
+    </p:spTree>
+  </p:cSld>
+  <p:clrMapOvr>
+    <a:masterClrMapping/>
+  </p:clrMapOvr>
+  <p:transition xmlns:p14="http://schemas.microsoft.com/office/powerpoint/2010/main" spd="med" advClick="1"/>
+</p:sld>
+</file>
+
+<file path=ppt/slides/slide14.xml><?xml version="1.0" encoding="utf-8"?>
+<p:sld xmlns:a="http://schemas.openxmlformats.org/drawingml/2006/main" xmlns:r="http://schemas.openxmlformats.org/officeDocument/2006/relationships" xmlns:p="http://schemas.openxmlformats.org/presentationml/2006/main" showMasterSp="1" showMasterPhAnim="1">
+  <p:cSld>
+    <p:spTree>
+      <p:nvGrpSpPr>
+        <p:cNvPr id="1" name=""/>
+        <p:cNvGrpSpPr/>
+        <p:nvPr/>
+      </p:nvGrpSpPr>
+      <p:grpSpPr>
+        <a:xfrm>
+          <a:off x="0" y="0"/>
+          <a:ext cx="0" cy="0"/>
+          <a:chOff x="0" y="0"/>
+          <a:chExt cx="0" cy="0"/>
+        </a:xfrm>
+      </p:grpSpPr>
+      <p:sp>
+        <p:nvSpPr>
+          <p:cNvPr id="217" name="Inspect the RDD (2)"/>
+          <p:cNvSpPr txBox="1"/>
+          <p:nvPr>
+            <p:ph type="title"/>
+          </p:nvPr>
+        </p:nvSpPr>
+        <p:spPr>
+          <a:prstGeom prst="rect">
+            <a:avLst/>
+          </a:prstGeom>
+        </p:spPr>
+        <p:txBody>
+          <a:bodyPr/>
+          <a:lstStyle/>
+          <a:p>
+            <a:pPr/>
+            <a:r>
+              <a:t>Inspect the RDD (2)</a:t>
+            </a:r>
+          </a:p>
+        </p:txBody>
+      </p:sp>
+      <p:sp>
+        <p:nvSpPr>
+          <p:cNvPr id="218" name="import spark.implicits._…"/>
+          <p:cNvSpPr txBox="1"/>
+          <p:nvPr/>
+        </p:nvSpPr>
+        <p:spPr>
+          <a:xfrm>
+            <a:off x="1319083" y="1230498"/>
+            <a:ext cx="6505834" cy="1767841"/>
+          </a:xfrm>
+          <a:prstGeom prst="rect">
+            <a:avLst/>
+          </a:prstGeom>
+          <a:ln w="12700">
+            <a:miter lim="400000"/>
+          </a:ln>
+          <a:extLst>
+            <a:ext uri="{C572A759-6A51-4108-AA02-DFA0A04FC94B}">
+              <ma14:wrappingTextBoxFlag xmlns:ma14="http://schemas.microsoft.com/office/mac/drawingml/2011/main" val="1"/>
+            </a:ext>
+          </a:extLst>
+        </p:spPr>
+        <p:txBody>
+          <a:bodyPr wrap="none" lIns="45719" rIns="45719">
+            <a:spAutoFit/>
+          </a:bodyPr>
+          <a:lstStyle/>
+          <a:p>
+            <a:pPr/>
+            <a:r>
+              <a:t>    import spark.implicits._</a:t>
+            </a:r>
+          </a:p>
+          <a:p>
+            <a:pPr/>
+            <a:r>
+              <a:t> </a:t>
+            </a:r>
+          </a:p>
+          <a:p>
+            <a:pPr/>
+            <a:r>
+              <a:t>    val preview = spark.read.csv("/Volumes/Transcend/DATA/linkage")</a:t>
+            </a:r>
+          </a:p>
+          <a:p>
+            <a:pPr/>
+            <a:r>
+              <a:t>    preview.show()</a:t>
+            </a:r>
+          </a:p>
+          <a:p>
+            <a:pPr>
+              <a:defRPr b="1"/>
+            </a:pPr>
+            <a:r>
+              <a:t>    preview.printSchema()</a:t>
+            </a:r>
+          </a:p>
+        </p:txBody>
+      </p:sp>
+      <p:sp>
+        <p:nvSpPr>
+          <p:cNvPr id="219" name="root…"/>
+          <p:cNvSpPr txBox="1"/>
+          <p:nvPr/>
+        </p:nvSpPr>
+        <p:spPr>
+          <a:xfrm>
+            <a:off x="2873742" y="2933381"/>
+            <a:ext cx="3396517" cy="2923516"/>
+          </a:xfrm>
+          <a:prstGeom prst="rect">
+            <a:avLst/>
+          </a:prstGeom>
+          <a:ln w="12700">
+            <a:miter lim="400000"/>
+          </a:ln>
+          <a:extLst>
+            <a:ext uri="{C572A759-6A51-4108-AA02-DFA0A04FC94B}">
+              <ma14:wrappingTextBoxFlag xmlns:ma14="http://schemas.microsoft.com/office/mac/drawingml/2011/main" val="1"/>
+            </a:ext>
+          </a:extLst>
+        </p:spPr>
+        <p:txBody>
+          <a:bodyPr wrap="none" lIns="45719" rIns="45719">
+            <a:spAutoFit/>
+          </a:bodyPr>
+          <a:lstStyle/>
+          <a:p>
+            <a:pPr defTabSz="457200">
+              <a:lnSpc>
+                <a:spcPts val="3000"/>
+              </a:lnSpc>
+              <a:defRPr sz="1200">
+                <a:solidFill>
+                  <a:srgbClr val="212121"/>
+                </a:solidFill>
+                <a:latin typeface="Monaco"/>
+                <a:ea typeface="Monaco"/>
+                <a:cs typeface="Monaco"/>
+                <a:sym typeface="Monaco"/>
+              </a:defRPr>
+            </a:pPr>
+            <a:r>
+              <a:t>root</a:t>
+            </a:r>
+          </a:p>
+          <a:p>
+            <a:pPr defTabSz="457200">
+              <a:lnSpc>
+                <a:spcPts val="3000"/>
+              </a:lnSpc>
+              <a:defRPr sz="1200">
+                <a:solidFill>
+                  <a:srgbClr val="212121"/>
+                </a:solidFill>
+                <a:latin typeface="Monaco"/>
+                <a:ea typeface="Monaco"/>
+                <a:cs typeface="Monaco"/>
+                <a:sym typeface="Monaco"/>
+              </a:defRPr>
+            </a:pPr>
+            <a:r>
+              <a:t> |-- _c0: string (nullable = true)</a:t>
+            </a:r>
+          </a:p>
+          <a:p>
+            <a:pPr defTabSz="457200">
+              <a:lnSpc>
+                <a:spcPts val="3000"/>
+              </a:lnSpc>
+              <a:defRPr sz="1200">
+                <a:solidFill>
+                  <a:srgbClr val="212121"/>
+                </a:solidFill>
+                <a:latin typeface="Monaco"/>
+                <a:ea typeface="Monaco"/>
+                <a:cs typeface="Monaco"/>
+                <a:sym typeface="Monaco"/>
+              </a:defRPr>
+            </a:pPr>
+            <a:r>
+              <a:t> |-- _c1: string (nullable = true)</a:t>
+            </a:r>
+          </a:p>
+          <a:p>
+            <a:pPr defTabSz="457200">
+              <a:lnSpc>
+                <a:spcPts val="3000"/>
+              </a:lnSpc>
+              <a:defRPr sz="1200">
+                <a:solidFill>
+                  <a:srgbClr val="212121"/>
+                </a:solidFill>
+                <a:latin typeface="Monaco"/>
+                <a:ea typeface="Monaco"/>
+                <a:cs typeface="Monaco"/>
+                <a:sym typeface="Monaco"/>
+              </a:defRPr>
+            </a:pPr>
+            <a:r>
+              <a:t> |-- _c2: string (nullable = true)</a:t>
+            </a:r>
+          </a:p>
+          <a:p>
+            <a:pPr defTabSz="457200">
+              <a:lnSpc>
+                <a:spcPts val="3000"/>
+              </a:lnSpc>
+              <a:defRPr sz="1200">
+                <a:solidFill>
+                  <a:srgbClr val="212121"/>
+                </a:solidFill>
+                <a:latin typeface="Monaco"/>
+                <a:ea typeface="Monaco"/>
+                <a:cs typeface="Monaco"/>
+                <a:sym typeface="Monaco"/>
+              </a:defRPr>
+            </a:pPr>
+            <a:r>
+              <a:t> |-- _c3: string (nullable = true)</a:t>
+            </a:r>
+          </a:p>
+          <a:p>
+            <a:pPr defTabSz="457200">
+              <a:lnSpc>
+                <a:spcPts val="3000"/>
+              </a:lnSpc>
+              <a:defRPr sz="1200">
+                <a:solidFill>
+                  <a:srgbClr val="212121"/>
+                </a:solidFill>
+                <a:latin typeface="Monaco"/>
+                <a:ea typeface="Monaco"/>
+                <a:cs typeface="Monaco"/>
+                <a:sym typeface="Monaco"/>
+              </a:defRPr>
+            </a:pPr>
+            <a:r>
+              <a:t> |-- _c4: string (nullable = true)</a:t>
+            </a:r>
+          </a:p>
+          <a:p>
+            <a:pPr defTabSz="457200">
+              <a:lnSpc>
+                <a:spcPts val="3000"/>
+              </a:lnSpc>
+              <a:defRPr sz="1200">
+                <a:solidFill>
+                  <a:srgbClr val="212121"/>
+                </a:solidFill>
+                <a:latin typeface="Monaco"/>
+                <a:ea typeface="Monaco"/>
+                <a:cs typeface="Monaco"/>
+                <a:sym typeface="Monaco"/>
+              </a:defRPr>
+            </a:pPr>
+            <a:r>
+              <a:t> |-- _c5: string (nullable = true)</a:t>
+            </a:r>
+          </a:p>
+          <a:p>
+            <a:pPr defTabSz="457200">
+              <a:lnSpc>
+                <a:spcPts val="3000"/>
+              </a:lnSpc>
+              <a:defRPr sz="1200">
+                <a:solidFill>
+                  <a:srgbClr val="212121"/>
+                </a:solidFill>
+                <a:latin typeface="Monaco"/>
+                <a:ea typeface="Monaco"/>
+                <a:cs typeface="Monaco"/>
+                <a:sym typeface="Monaco"/>
+              </a:defRPr>
+            </a:pPr>
+            <a:r>
+              <a:t> |-- _c6: string (nullable = true)</a:t>
+            </a:r>
+          </a:p>
+          <a:p>
+            <a:pPr defTabSz="457200">
+              <a:lnSpc>
+                <a:spcPts val="3000"/>
+              </a:lnSpc>
+              <a:defRPr sz="1200">
+                <a:solidFill>
+                  <a:srgbClr val="212121"/>
+                </a:solidFill>
+                <a:latin typeface="Monaco"/>
+                <a:ea typeface="Monaco"/>
+                <a:cs typeface="Monaco"/>
+                <a:sym typeface="Monaco"/>
+              </a:defRPr>
+            </a:pPr>
+            <a:r>
+              <a:t> |-- _c7: string (nullable = true)</a:t>
+            </a:r>
+          </a:p>
+          <a:p>
+            <a:pPr defTabSz="457200">
+              <a:lnSpc>
+                <a:spcPts val="3000"/>
+              </a:lnSpc>
+              <a:defRPr sz="1200">
+                <a:solidFill>
+                  <a:srgbClr val="212121"/>
+                </a:solidFill>
+                <a:latin typeface="Monaco"/>
+                <a:ea typeface="Monaco"/>
+                <a:cs typeface="Monaco"/>
+                <a:sym typeface="Monaco"/>
+              </a:defRPr>
+            </a:pPr>
+            <a:r>
+              <a:t> |-- _c8: string (nullable = true)</a:t>
+            </a:r>
+          </a:p>
+          <a:p>
+            <a:pPr defTabSz="457200">
+              <a:lnSpc>
+                <a:spcPts val="3000"/>
+              </a:lnSpc>
+              <a:defRPr sz="1200">
+                <a:solidFill>
+                  <a:srgbClr val="212121"/>
+                </a:solidFill>
+                <a:latin typeface="Monaco"/>
+                <a:ea typeface="Monaco"/>
+                <a:cs typeface="Monaco"/>
+                <a:sym typeface="Monaco"/>
+              </a:defRPr>
+            </a:pPr>
+            <a:r>
+              <a:t> |-- _c9: string (nullable = true)</a:t>
+            </a:r>
+          </a:p>
+          <a:p>
+            <a:pPr defTabSz="457200">
+              <a:lnSpc>
+                <a:spcPts val="3000"/>
+              </a:lnSpc>
+              <a:defRPr sz="1200">
+                <a:solidFill>
+                  <a:srgbClr val="212121"/>
+                </a:solidFill>
+                <a:latin typeface="Monaco"/>
+                <a:ea typeface="Monaco"/>
+                <a:cs typeface="Monaco"/>
+                <a:sym typeface="Monaco"/>
+              </a:defRPr>
+            </a:pPr>
+            <a:r>
+              <a:t> |-- _c10: string (nullable = true)</a:t>
+            </a:r>
+          </a:p>
+          <a:p>
+            <a:pPr defTabSz="457200">
+              <a:lnSpc>
+                <a:spcPts val="3000"/>
+              </a:lnSpc>
+              <a:defRPr sz="1200">
+                <a:solidFill>
+                  <a:srgbClr val="212121"/>
+                </a:solidFill>
+                <a:latin typeface="Monaco"/>
+                <a:ea typeface="Monaco"/>
+                <a:cs typeface="Monaco"/>
+                <a:sym typeface="Monaco"/>
+              </a:defRPr>
+            </a:pPr>
+            <a:r>
+              <a:t> |-- _c11: string (nullable = true)</a:t>
+            </a:r>
+          </a:p>
+        </p:txBody>
+      </p:sp>
+      <p:sp>
+        <p:nvSpPr>
+          <p:cNvPr id="220" name="The default data structure:…"/>
+          <p:cNvSpPr txBox="1"/>
+          <p:nvPr/>
+        </p:nvSpPr>
+        <p:spPr>
+          <a:xfrm>
+            <a:off x="244831" y="2964179"/>
+            <a:ext cx="2630797" cy="929641"/>
+          </a:xfrm>
+          <a:prstGeom prst="rect">
+            <a:avLst/>
+          </a:prstGeom>
+          <a:ln w="12700">
+            <a:miter lim="400000"/>
+          </a:ln>
+          <a:extLst>
+            <a:ext uri="{C572A759-6A51-4108-AA02-DFA0A04FC94B}">
+              <ma14:wrappingTextBoxFlag xmlns:ma14="http://schemas.microsoft.com/office/mac/drawingml/2011/main" val="1"/>
+            </a:ext>
+          </a:extLst>
+        </p:spPr>
+        <p:txBody>
+          <a:bodyPr wrap="none" lIns="45719" rIns="45719">
+            <a:spAutoFit/>
+          </a:bodyPr>
+          <a:lstStyle/>
+          <a:p>
+            <a:pPr/>
+            <a:r>
+              <a:t>The default data structure:</a:t>
+            </a:r>
+          </a:p>
+          <a:p>
+            <a:pPr/>
+          </a:p>
+          <a:p>
+            <a:pPr/>
+            <a:r>
+              <a:t>(not what we wanted)</a:t>
+            </a:r>
+          </a:p>
+        </p:txBody>
+      </p:sp>
+    </p:spTree>
+  </p:cSld>
+  <p:clrMapOvr>
+    <a:masterClrMapping/>
+  </p:clrMapOvr>
+  <p:transition xmlns:p14="http://schemas.microsoft.com/office/powerpoint/2010/main" spd="med" advClick="1"/>
+</p:sld>
+</file>
+
+<file path=ppt/slides/slide15.xml><?xml version="1.0" encoding="utf-8"?>
+<p:sld xmlns:a="http://schemas.openxmlformats.org/drawingml/2006/main" xmlns:r="http://schemas.openxmlformats.org/officeDocument/2006/relationships" xmlns:p="http://schemas.openxmlformats.org/presentationml/2006/main" showMasterSp="1" showMasterPhAnim="1">
+  <p:cSld>
+    <p:spTree>
+      <p:nvGrpSpPr>
+        <p:cNvPr id="1" name=""/>
+        <p:cNvGrpSpPr/>
+        <p:nvPr/>
+      </p:nvGrpSpPr>
+      <p:grpSpPr>
+        <a:xfrm>
+          <a:off x="0" y="0"/>
+          <a:ext cx="0" cy="0"/>
+          <a:chOff x="0" y="0"/>
+          <a:chExt cx="0" cy="0"/>
+        </a:xfrm>
+      </p:grpSpPr>
+      <p:sp>
+        <p:nvSpPr>
+          <p:cNvPr id="224" name="Parse the RDD"/>
+          <p:cNvSpPr txBox="1"/>
+          <p:nvPr>
+            <p:ph type="title"/>
+          </p:nvPr>
+        </p:nvSpPr>
+        <p:spPr>
+          <a:prstGeom prst="rect">
+            <a:avLst/>
+          </a:prstGeom>
+        </p:spPr>
+        <p:txBody>
+          <a:bodyPr/>
+          <a:lstStyle/>
+          <a:p>
+            <a:pPr/>
+            <a:r>
+              <a:t>Parse the RDD</a:t>
+            </a:r>
+          </a:p>
+        </p:txBody>
+      </p:sp>
+      <p:sp>
+        <p:nvSpPr>
+          <p:cNvPr id="225" name="val parsed = spark.read…"/>
+          <p:cNvSpPr txBox="1"/>
+          <p:nvPr/>
+        </p:nvSpPr>
+        <p:spPr>
+          <a:xfrm>
+            <a:off x="2393548" y="1373043"/>
+            <a:ext cx="4356904" cy="1767841"/>
+          </a:xfrm>
+          <a:prstGeom prst="rect">
+            <a:avLst/>
+          </a:prstGeom>
+          <a:ln w="12700">
+            <a:miter lim="400000"/>
+          </a:ln>
+          <a:extLst>
+            <a:ext uri="{C572A759-6A51-4108-AA02-DFA0A04FC94B}">
+              <ma14:wrappingTextBoxFlag xmlns:ma14="http://schemas.microsoft.com/office/mac/drawingml/2011/main" val="1"/>
+            </a:ext>
+          </a:extLst>
+        </p:spPr>
+        <p:txBody>
+          <a:bodyPr wrap="none" lIns="45719" rIns="45719">
+            <a:spAutoFit/>
+          </a:bodyPr>
+          <a:lstStyle/>
+          <a:p>
+            <a:pPr/>
+            <a:r>
+              <a:t>val parsed = spark.read</a:t>
+            </a:r>
+          </a:p>
+          <a:p>
+            <a:pPr/>
+            <a:r>
+              <a:t>      .option("header", "true")</a:t>
+            </a:r>
+          </a:p>
+          <a:p>
+            <a:pPr/>
+            <a:r>
+              <a:t>      .option("nullValue", "?")</a:t>
+            </a:r>
+          </a:p>
+          <a:p>
+            <a:pPr/>
+            <a:r>
+              <a:t>      .option("inferSchema", "true")</a:t>
+            </a:r>
+          </a:p>
+          <a:p>
+            <a:pPr/>
+            <a:r>
+              <a:t>      .csv("/Volumes/Transcend/DATA/linkage")</a:t>
+            </a:r>
+          </a:p>
+          <a:p>
+            <a:pPr>
+              <a:defRPr b="1"/>
+            </a:pPr>
+            <a:r>
+              <a:t>    parsed.show()</a:t>
+            </a:r>
+          </a:p>
+        </p:txBody>
+      </p:sp>
+      <p:sp>
+        <p:nvSpPr>
+          <p:cNvPr id="226" name="parsed: org.apache.spark.sql.DataFrame = [id_1: int, id_2: int ... 10 more fields]…"/>
+          <p:cNvSpPr txBox="1"/>
+          <p:nvPr/>
+        </p:nvSpPr>
+        <p:spPr>
+          <a:xfrm>
+            <a:off x="771411" y="3300712"/>
+            <a:ext cx="12130757" cy="3126717"/>
+          </a:xfrm>
+          <a:prstGeom prst="rect">
+            <a:avLst/>
+          </a:prstGeom>
+          <a:ln w="12700">
+            <a:miter lim="400000"/>
+          </a:ln>
+          <a:extLst>
+            <a:ext uri="{C572A759-6A51-4108-AA02-DFA0A04FC94B}">
+              <ma14:wrappingTextBoxFlag xmlns:ma14="http://schemas.microsoft.com/office/mac/drawingml/2011/main" val="1"/>
+            </a:ext>
+          </a:extLst>
+        </p:spPr>
+        <p:txBody>
+          <a:bodyPr lIns="45719" rIns="45719">
+            <a:spAutoFit/>
+          </a:bodyPr>
+          <a:lstStyle/>
+          <a:p>
+            <a:pPr defTabSz="457200">
+              <a:lnSpc>
+                <a:spcPts val="3000"/>
+              </a:lnSpc>
+              <a:defRPr sz="1200">
+                <a:solidFill>
+                  <a:srgbClr val="212121"/>
+                </a:solidFill>
+                <a:latin typeface="Monaco"/>
+                <a:ea typeface="Monaco"/>
+                <a:cs typeface="Monaco"/>
+                <a:sym typeface="Monaco"/>
+              </a:defRPr>
+            </a:pPr>
+            <a:r>
+              <a:t>parsed: org.apache.spark.sql.DataFrame = [id_1: int, id_2: int ... 10 more fields]</a:t>
+            </a:r>
+          </a:p>
+          <a:p>
+            <a:pPr defTabSz="457200">
+              <a:lnSpc>
+                <a:spcPts val="3000"/>
+              </a:lnSpc>
+              <a:defRPr sz="1200">
+                <a:solidFill>
+                  <a:srgbClr val="212121"/>
+                </a:solidFill>
+                <a:latin typeface="Monaco"/>
+                <a:ea typeface="Monaco"/>
+                <a:cs typeface="Monaco"/>
+                <a:sym typeface="Monaco"/>
+              </a:defRPr>
+            </a:pPr>
+            <a:r>
+              <a:t>+-----+-----+------------+------------+------------+------------+-------+------+------+------+-------+--------+</a:t>
+            </a:r>
+          </a:p>
+          <a:p>
+            <a:pPr defTabSz="457200">
+              <a:lnSpc>
+                <a:spcPts val="3000"/>
+              </a:lnSpc>
+              <a:defRPr sz="1200">
+                <a:solidFill>
+                  <a:srgbClr val="212121"/>
+                </a:solidFill>
+                <a:latin typeface="Monaco"/>
+                <a:ea typeface="Monaco"/>
+                <a:cs typeface="Monaco"/>
+                <a:sym typeface="Monaco"/>
+              </a:defRPr>
+            </a:pPr>
+            <a:r>
+              <a:t>| id_1| id_2|cmp_fname_c1|cmp_fname_c2|cmp_lname_c1|cmp_lname_c2|cmp_sex|cmp_bd|cmp_bm|cmp_by|cmp_plz|is_match|</a:t>
+            </a:r>
+          </a:p>
+          <a:p>
+            <a:pPr defTabSz="457200">
+              <a:lnSpc>
+                <a:spcPts val="3000"/>
+              </a:lnSpc>
+              <a:defRPr sz="1200">
+                <a:solidFill>
+                  <a:srgbClr val="212121"/>
+                </a:solidFill>
+                <a:latin typeface="Monaco"/>
+                <a:ea typeface="Monaco"/>
+                <a:cs typeface="Monaco"/>
+                <a:sym typeface="Monaco"/>
+              </a:defRPr>
+            </a:pPr>
+            <a:r>
+              <a:t>+-----+-----+------------+------------+------------+------------+-------+------+------+------+-------+--------+</a:t>
+            </a:r>
+          </a:p>
+          <a:p>
+            <a:pPr defTabSz="457200">
+              <a:lnSpc>
+                <a:spcPts val="3000"/>
+              </a:lnSpc>
+              <a:defRPr sz="1200">
+                <a:solidFill>
+                  <a:srgbClr val="212121"/>
+                </a:solidFill>
+                <a:latin typeface="Monaco"/>
+                <a:ea typeface="Monaco"/>
+                <a:cs typeface="Monaco"/>
+                <a:sym typeface="Monaco"/>
+              </a:defRPr>
+            </a:pPr>
+            <a:r>
+              <a:t>| 3148| 8326|         1.0|        null|         1.0|        null|      1|     1|     1|     1|      1|    true|</a:t>
+            </a:r>
+          </a:p>
+          <a:p>
+            <a:pPr defTabSz="457200">
+              <a:lnSpc>
+                <a:spcPts val="3000"/>
+              </a:lnSpc>
+              <a:defRPr sz="1200">
+                <a:solidFill>
+                  <a:srgbClr val="212121"/>
+                </a:solidFill>
+                <a:latin typeface="Monaco"/>
+                <a:ea typeface="Monaco"/>
+                <a:cs typeface="Monaco"/>
+                <a:sym typeface="Monaco"/>
+              </a:defRPr>
+            </a:pPr>
+            <a:r>
+              <a:t>|14055|94934|         1.0|        null|         1.0|        null|      1|     1|     1|     1|      1|    true|</a:t>
+            </a:r>
+          </a:p>
+          <a:p>
+            <a:pPr defTabSz="457200">
+              <a:lnSpc>
+                <a:spcPts val="3000"/>
+              </a:lnSpc>
+              <a:defRPr sz="1200">
+                <a:solidFill>
+                  <a:srgbClr val="212121"/>
+                </a:solidFill>
+                <a:latin typeface="Monaco"/>
+                <a:ea typeface="Monaco"/>
+                <a:cs typeface="Monaco"/>
+                <a:sym typeface="Monaco"/>
+              </a:defRPr>
+            </a:pPr>
+            <a:r>
+              <a:t>|33948|34740|         1.0|        null|         1.0|        null|      1|     1|     1|     1|      1|    true|</a:t>
+            </a:r>
+          </a:p>
+          <a:p>
+            <a:pPr defTabSz="457200">
+              <a:lnSpc>
+                <a:spcPts val="3000"/>
+              </a:lnSpc>
+              <a:defRPr sz="1200">
+                <a:solidFill>
+                  <a:srgbClr val="212121"/>
+                </a:solidFill>
+                <a:latin typeface="Monaco"/>
+                <a:ea typeface="Monaco"/>
+                <a:cs typeface="Monaco"/>
+                <a:sym typeface="Monaco"/>
+              </a:defRPr>
+            </a:pPr>
+            <a:r>
+              <a:t>|  946|71870|         1.0|        null|         1.0|        null|      1|     1|     1|     1|      1|    true|</a:t>
+            </a:r>
+          </a:p>
+          <a:p>
+            <a:pPr defTabSz="457200">
+              <a:lnSpc>
+                <a:spcPts val="3000"/>
+              </a:lnSpc>
+              <a:defRPr sz="1200">
+                <a:solidFill>
+                  <a:srgbClr val="212121"/>
+                </a:solidFill>
+                <a:latin typeface="Monaco"/>
+                <a:ea typeface="Monaco"/>
+                <a:cs typeface="Monaco"/>
+                <a:sym typeface="Monaco"/>
+              </a:defRPr>
+            </a:pPr>
+            <a:r>
+              <a:t>|64880|71676|         1.0|        null|         1.0|        null|      1|     1|     1|     1|      1|    true|</a:t>
+            </a:r>
+          </a:p>
+          <a:p>
+            <a:pPr defTabSz="457200">
+              <a:lnSpc>
+                <a:spcPts val="3000"/>
+              </a:lnSpc>
+              <a:defRPr sz="1200">
+                <a:solidFill>
+                  <a:srgbClr val="212121"/>
+                </a:solidFill>
+                <a:latin typeface="Monaco"/>
+                <a:ea typeface="Monaco"/>
+                <a:cs typeface="Monaco"/>
+                <a:sym typeface="Monaco"/>
+              </a:defRPr>
+            </a:pPr>
+            <a:r>
+              <a:t>|25739|45991|         1.0|        null|         1.0|        null|      1|     1|     1|     1|      1|    true|</a:t>
+            </a:r>
+          </a:p>
+          <a:p>
+            <a:pPr defTabSz="457200">
+              <a:lnSpc>
+                <a:spcPts val="3000"/>
+              </a:lnSpc>
+              <a:defRPr sz="1200">
+                <a:solidFill>
+                  <a:srgbClr val="212121"/>
+                </a:solidFill>
+                <a:latin typeface="Monaco"/>
+                <a:ea typeface="Monaco"/>
+                <a:cs typeface="Monaco"/>
+                <a:sym typeface="Monaco"/>
+              </a:defRPr>
+            </a:pPr>
+            <a:r>
+              <a:t>|62415|93584|         1.0|        null|         1.0|        null|      1|     1|     1|     1|      0|    true|</a:t>
+            </a:r>
+          </a:p>
+          <a:p>
+            <a:pPr defTabSz="457200">
+              <a:lnSpc>
+                <a:spcPts val="3000"/>
+              </a:lnSpc>
+              <a:defRPr sz="1200">
+                <a:solidFill>
+                  <a:srgbClr val="212121"/>
+                </a:solidFill>
+                <a:latin typeface="Monaco"/>
+                <a:ea typeface="Monaco"/>
+                <a:cs typeface="Monaco"/>
+                <a:sym typeface="Monaco"/>
+              </a:defRPr>
+            </a:pPr>
+            <a:r>
+              <a:t>|27995|31399|         1.0|        null|         1.0|        null|      1|     1|     1|     1|      1|    true|</a:t>
+            </a:r>
+          </a:p>
+          <a:p>
+            <a:pPr defTabSz="457200">
+              <a:lnSpc>
+                <a:spcPts val="3000"/>
+              </a:lnSpc>
+              <a:defRPr sz="1200">
+                <a:solidFill>
+                  <a:srgbClr val="212121"/>
+                </a:solidFill>
+                <a:latin typeface="Monaco"/>
+                <a:ea typeface="Monaco"/>
+                <a:cs typeface="Monaco"/>
+                <a:sym typeface="Monaco"/>
+              </a:defRPr>
+            </a:pPr>
+            <a:r>
+              <a:t>| 4909|12238|         1.0|        null|         1.0|        null|      1|     1|     1|     1|      1|    true|</a:t>
+            </a:r>
+          </a:p>
+          <a:p>
+            <a:pPr defTabSz="457200">
+              <a:lnSpc>
+                <a:spcPts val="3000"/>
+              </a:lnSpc>
+              <a:defRPr sz="1200">
+                <a:solidFill>
+                  <a:srgbClr val="212121"/>
+                </a:solidFill>
+                <a:latin typeface="Monaco"/>
+                <a:ea typeface="Monaco"/>
+                <a:cs typeface="Monaco"/>
+                <a:sym typeface="Monaco"/>
+              </a:defRPr>
+            </a:pPr>
+            <a:r>
+              <a:t>|15161|16743|         1.0|        null|         1.0|        null|      1|     1|     1|     1|      1|    true|</a:t>
+            </a:r>
+          </a:p>
+        </p:txBody>
+      </p:sp>
+    </p:spTree>
+  </p:cSld>
+  <p:clrMapOvr>
+    <a:masterClrMapping/>
+  </p:clrMapOvr>
+  <p:transition xmlns:p14="http://schemas.microsoft.com/office/powerpoint/2010/main" spd="med" advClick="1"/>
+</p:sld>
+</file>
+
+<file path=ppt/slides/slide16.xml><?xml version="1.0" encoding="utf-8"?>
+<p:sld xmlns:a="http://schemas.openxmlformats.org/drawingml/2006/main" xmlns:r="http://schemas.openxmlformats.org/officeDocument/2006/relationships" xmlns:p="http://schemas.openxmlformats.org/presentationml/2006/main" showMasterSp="1" showMasterPhAnim="1">
+  <p:cSld>
+    <p:spTree>
+      <p:nvGrpSpPr>
+        <p:cNvPr id="1" name=""/>
+        <p:cNvGrpSpPr/>
+        <p:nvPr/>
+      </p:nvGrpSpPr>
+      <p:grpSpPr>
+        <a:xfrm>
+          <a:off x="0" y="0"/>
+          <a:ext cx="0" cy="0"/>
+          <a:chOff x="0" y="0"/>
+          <a:chExt cx="0" cy="0"/>
+        </a:xfrm>
+      </p:grpSpPr>
+      <p:sp>
+        <p:nvSpPr>
+          <p:cNvPr id="230" name="Parse the  RDD (2)"/>
+          <p:cNvSpPr txBox="1"/>
+          <p:nvPr>
+            <p:ph type="title"/>
+          </p:nvPr>
+        </p:nvSpPr>
+        <p:spPr>
+          <a:prstGeom prst="rect">
+            <a:avLst/>
+          </a:prstGeom>
+        </p:spPr>
+        <p:txBody>
+          <a:bodyPr/>
+          <a:lstStyle/>
+          <a:p>
+            <a:pPr/>
+            <a:r>
+              <a:t>Parse the  RDD (2)</a:t>
+            </a:r>
+          </a:p>
+        </p:txBody>
+      </p:sp>
+      <p:sp>
+        <p:nvSpPr>
+          <p:cNvPr id="231" name="val parsed = spark.read…"/>
+          <p:cNvSpPr txBox="1"/>
+          <p:nvPr/>
+        </p:nvSpPr>
+        <p:spPr>
+          <a:xfrm>
+            <a:off x="2393548" y="1373043"/>
+            <a:ext cx="4356904" cy="2047241"/>
+          </a:xfrm>
+          <a:prstGeom prst="rect">
+            <a:avLst/>
+          </a:prstGeom>
+          <a:ln w="12700">
+            <a:miter lim="400000"/>
+          </a:ln>
+          <a:extLst>
+            <a:ext uri="{C572A759-6A51-4108-AA02-DFA0A04FC94B}">
+              <ma14:wrappingTextBoxFlag xmlns:ma14="http://schemas.microsoft.com/office/mac/drawingml/2011/main" val="1"/>
+            </a:ext>
+          </a:extLst>
+        </p:spPr>
+        <p:txBody>
+          <a:bodyPr wrap="none" lIns="45719" rIns="45719">
+            <a:spAutoFit/>
+          </a:bodyPr>
+          <a:lstStyle/>
+          <a:p>
+            <a:pPr/>
+            <a:r>
+              <a:t>val parsed = spark.read</a:t>
+            </a:r>
+          </a:p>
+          <a:p>
+            <a:pPr/>
+            <a:r>
+              <a:t>      .option("header", "true")</a:t>
+            </a:r>
+          </a:p>
+          <a:p>
+            <a:pPr/>
+            <a:r>
+              <a:t>      .option("nullValue", "?")</a:t>
+            </a:r>
+          </a:p>
+          <a:p>
+            <a:pPr/>
+            <a:r>
+              <a:t>      .option("inferSchema", "true")</a:t>
+            </a:r>
+          </a:p>
+          <a:p>
+            <a:pPr/>
+            <a:r>
+              <a:t>      .csv("/Volumes/Transcend/DATA/linkage")</a:t>
+            </a:r>
+          </a:p>
+          <a:p>
+            <a:pPr/>
+            <a:r>
+              <a:t>    parsed.show()</a:t>
+            </a:r>
+          </a:p>
+          <a:p>
+            <a:pPr>
+              <a:defRPr b="1"/>
+            </a:pPr>
+            <a:r>
+              <a:t>   parsed.printSchema()</a:t>
+            </a:r>
+          </a:p>
+        </p:txBody>
+      </p:sp>
+      <p:sp>
+        <p:nvSpPr>
+          <p:cNvPr id="232" name="root…"/>
+          <p:cNvSpPr txBox="1"/>
+          <p:nvPr/>
+        </p:nvSpPr>
+        <p:spPr>
+          <a:xfrm>
+            <a:off x="2507922" y="3630267"/>
+            <a:ext cx="4128156" cy="2923517"/>
+          </a:xfrm>
+          <a:prstGeom prst="rect">
+            <a:avLst/>
+          </a:prstGeom>
+          <a:ln w="12700">
+            <a:miter lim="400000"/>
+          </a:ln>
+          <a:extLst>
+            <a:ext uri="{C572A759-6A51-4108-AA02-DFA0A04FC94B}">
+              <ma14:wrappingTextBoxFlag xmlns:ma14="http://schemas.microsoft.com/office/mac/drawingml/2011/main" val="1"/>
+            </a:ext>
+          </a:extLst>
+        </p:spPr>
+        <p:txBody>
+          <a:bodyPr wrap="none" lIns="45719" rIns="45719">
+            <a:spAutoFit/>
+          </a:bodyPr>
+          <a:lstStyle/>
+          <a:p>
+            <a:pPr defTabSz="457200">
+              <a:lnSpc>
+                <a:spcPts val="3000"/>
+              </a:lnSpc>
+              <a:defRPr sz="1200">
+                <a:solidFill>
+                  <a:srgbClr val="212121"/>
+                </a:solidFill>
+                <a:latin typeface="Monaco"/>
+                <a:ea typeface="Monaco"/>
+                <a:cs typeface="Monaco"/>
+                <a:sym typeface="Monaco"/>
+              </a:defRPr>
+            </a:pPr>
+            <a:r>
+              <a:t>root</a:t>
+            </a:r>
+          </a:p>
+          <a:p>
+            <a:pPr defTabSz="457200">
+              <a:lnSpc>
+                <a:spcPts val="3000"/>
+              </a:lnSpc>
+              <a:defRPr sz="1200">
+                <a:solidFill>
+                  <a:srgbClr val="212121"/>
+                </a:solidFill>
+                <a:latin typeface="Monaco"/>
+                <a:ea typeface="Monaco"/>
+                <a:cs typeface="Monaco"/>
+                <a:sym typeface="Monaco"/>
+              </a:defRPr>
+            </a:pPr>
+            <a:r>
+              <a:t> |-- id_1: integer (nullable = true)</a:t>
+            </a:r>
+          </a:p>
+          <a:p>
+            <a:pPr defTabSz="457200">
+              <a:lnSpc>
+                <a:spcPts val="3000"/>
+              </a:lnSpc>
+              <a:defRPr sz="1200">
+                <a:solidFill>
+                  <a:srgbClr val="212121"/>
+                </a:solidFill>
+                <a:latin typeface="Monaco"/>
+                <a:ea typeface="Monaco"/>
+                <a:cs typeface="Monaco"/>
+                <a:sym typeface="Monaco"/>
+              </a:defRPr>
+            </a:pPr>
+            <a:r>
+              <a:t> |-- id_2: integer (nullable = true)</a:t>
+            </a:r>
+          </a:p>
+          <a:p>
+            <a:pPr defTabSz="457200">
+              <a:lnSpc>
+                <a:spcPts val="3000"/>
+              </a:lnSpc>
+              <a:defRPr sz="1200">
+                <a:solidFill>
+                  <a:srgbClr val="212121"/>
+                </a:solidFill>
+                <a:latin typeface="Monaco"/>
+                <a:ea typeface="Monaco"/>
+                <a:cs typeface="Monaco"/>
+                <a:sym typeface="Monaco"/>
+              </a:defRPr>
+            </a:pPr>
+            <a:r>
+              <a:t> |-- cmp_fname_c1: double (nullable = true)</a:t>
+            </a:r>
+          </a:p>
+          <a:p>
+            <a:pPr defTabSz="457200">
+              <a:lnSpc>
+                <a:spcPts val="3000"/>
+              </a:lnSpc>
+              <a:defRPr sz="1200">
+                <a:solidFill>
+                  <a:srgbClr val="212121"/>
+                </a:solidFill>
+                <a:latin typeface="Monaco"/>
+                <a:ea typeface="Monaco"/>
+                <a:cs typeface="Monaco"/>
+                <a:sym typeface="Monaco"/>
+              </a:defRPr>
+            </a:pPr>
+            <a:r>
+              <a:t> |-- cmp_fname_c2: double (nullable = true)</a:t>
+            </a:r>
+          </a:p>
+          <a:p>
+            <a:pPr defTabSz="457200">
+              <a:lnSpc>
+                <a:spcPts val="3000"/>
+              </a:lnSpc>
+              <a:defRPr sz="1200">
+                <a:solidFill>
+                  <a:srgbClr val="212121"/>
+                </a:solidFill>
+                <a:latin typeface="Monaco"/>
+                <a:ea typeface="Monaco"/>
+                <a:cs typeface="Monaco"/>
+                <a:sym typeface="Monaco"/>
+              </a:defRPr>
+            </a:pPr>
+            <a:r>
+              <a:t> |-- cmp_lname_c1: double (nullable = true)</a:t>
+            </a:r>
+          </a:p>
+          <a:p>
+            <a:pPr defTabSz="457200">
+              <a:lnSpc>
+                <a:spcPts val="3000"/>
+              </a:lnSpc>
+              <a:defRPr sz="1200">
+                <a:solidFill>
+                  <a:srgbClr val="212121"/>
+                </a:solidFill>
+                <a:latin typeface="Monaco"/>
+                <a:ea typeface="Monaco"/>
+                <a:cs typeface="Monaco"/>
+                <a:sym typeface="Monaco"/>
+              </a:defRPr>
+            </a:pPr>
+            <a:r>
+              <a:t> |-- cmp_lname_c2: double (nullable = true)</a:t>
+            </a:r>
+          </a:p>
+          <a:p>
+            <a:pPr defTabSz="457200">
+              <a:lnSpc>
+                <a:spcPts val="3000"/>
+              </a:lnSpc>
+              <a:defRPr sz="1200">
+                <a:solidFill>
+                  <a:srgbClr val="212121"/>
+                </a:solidFill>
+                <a:latin typeface="Monaco"/>
+                <a:ea typeface="Monaco"/>
+                <a:cs typeface="Monaco"/>
+                <a:sym typeface="Monaco"/>
+              </a:defRPr>
+            </a:pPr>
+            <a:r>
+              <a:t> |-- cmp_sex: integer (nullable = true)</a:t>
+            </a:r>
+          </a:p>
+          <a:p>
+            <a:pPr defTabSz="457200">
+              <a:lnSpc>
+                <a:spcPts val="3000"/>
+              </a:lnSpc>
+              <a:defRPr sz="1200">
+                <a:solidFill>
+                  <a:srgbClr val="212121"/>
+                </a:solidFill>
+                <a:latin typeface="Monaco"/>
+                <a:ea typeface="Monaco"/>
+                <a:cs typeface="Monaco"/>
+                <a:sym typeface="Monaco"/>
+              </a:defRPr>
+            </a:pPr>
+            <a:r>
+              <a:t> |-- cmp_bd: integer (nullable = true)</a:t>
+            </a:r>
+          </a:p>
+          <a:p>
+            <a:pPr defTabSz="457200">
+              <a:lnSpc>
+                <a:spcPts val="3000"/>
+              </a:lnSpc>
+              <a:defRPr sz="1200">
+                <a:solidFill>
+                  <a:srgbClr val="212121"/>
+                </a:solidFill>
+                <a:latin typeface="Monaco"/>
+                <a:ea typeface="Monaco"/>
+                <a:cs typeface="Monaco"/>
+                <a:sym typeface="Monaco"/>
+              </a:defRPr>
+            </a:pPr>
+            <a:r>
+              <a:t> |-- cmp_bm: integer (nullable = true)</a:t>
+            </a:r>
+          </a:p>
+          <a:p>
+            <a:pPr defTabSz="457200">
+              <a:lnSpc>
+                <a:spcPts val="3000"/>
+              </a:lnSpc>
+              <a:defRPr sz="1200">
+                <a:solidFill>
+                  <a:srgbClr val="212121"/>
+                </a:solidFill>
+                <a:latin typeface="Monaco"/>
+                <a:ea typeface="Monaco"/>
+                <a:cs typeface="Monaco"/>
+                <a:sym typeface="Monaco"/>
+              </a:defRPr>
+            </a:pPr>
+            <a:r>
+              <a:t> |-- cmp_by: integer (nullable = true)</a:t>
+            </a:r>
+          </a:p>
+          <a:p>
+            <a:pPr defTabSz="457200">
+              <a:lnSpc>
+                <a:spcPts val="3000"/>
+              </a:lnSpc>
+              <a:defRPr sz="1200">
+                <a:solidFill>
+                  <a:srgbClr val="212121"/>
+                </a:solidFill>
+                <a:latin typeface="Monaco"/>
+                <a:ea typeface="Monaco"/>
+                <a:cs typeface="Monaco"/>
+                <a:sym typeface="Monaco"/>
+              </a:defRPr>
+            </a:pPr>
+            <a:r>
+              <a:t> |-- cmp_plz: integer (nullable = true)</a:t>
+            </a:r>
+          </a:p>
+          <a:p>
+            <a:pPr defTabSz="457200">
+              <a:lnSpc>
+                <a:spcPts val="3000"/>
+              </a:lnSpc>
+              <a:defRPr sz="1200">
+                <a:solidFill>
+                  <a:srgbClr val="212121"/>
+                </a:solidFill>
+                <a:latin typeface="Monaco"/>
+                <a:ea typeface="Monaco"/>
+                <a:cs typeface="Monaco"/>
+                <a:sym typeface="Monaco"/>
+              </a:defRPr>
+            </a:pPr>
+            <a:r>
+              <a:t> |-- is_match: boolean (nullable = true)</a:t>
+            </a:r>
+          </a:p>
+        </p:txBody>
+      </p:sp>
+      <p:sp>
+        <p:nvSpPr>
+          <p:cNvPr id="233" name="The inferred…"/>
+          <p:cNvSpPr txBox="1"/>
+          <p:nvPr/>
+        </p:nvSpPr>
+        <p:spPr>
+          <a:xfrm>
+            <a:off x="450730" y="3803611"/>
+            <a:ext cx="1526417" cy="929641"/>
+          </a:xfrm>
+          <a:prstGeom prst="rect">
+            <a:avLst/>
+          </a:prstGeom>
+          <a:ln w="12700">
+            <a:miter lim="400000"/>
+          </a:ln>
+          <a:extLst>
+            <a:ext uri="{C572A759-6A51-4108-AA02-DFA0A04FC94B}">
+              <ma14:wrappingTextBoxFlag xmlns:ma14="http://schemas.microsoft.com/office/mac/drawingml/2011/main" val="1"/>
+            </a:ext>
+          </a:extLst>
+        </p:spPr>
+        <p:txBody>
+          <a:bodyPr wrap="none" lIns="45719" rIns="45719">
+            <a:spAutoFit/>
+          </a:bodyPr>
+          <a:lstStyle/>
+          <a:p>
+            <a:pPr/>
+            <a:r>
+              <a:t>The inferred </a:t>
+            </a:r>
+          </a:p>
+          <a:p>
+            <a:pPr/>
+            <a:r>
+              <a:t>data structure:</a:t>
+            </a:r>
+          </a:p>
+        </p:txBody>
+      </p:sp>
+    </p:spTree>
+  </p:cSld>
+  <p:clrMapOvr>
+    <a:masterClrMapping/>
+  </p:clrMapOvr>
+  <p:transition xmlns:p14="http://schemas.microsoft.com/office/powerpoint/2010/main" spd="med" advClick="1"/>
+</p:sld>
+</file>
+
+<file path=ppt/slides/slide17.xml><?xml version="1.0" encoding="utf-8"?>
+<p:sld xmlns:a="http://schemas.openxmlformats.org/drawingml/2006/main" xmlns:r="http://schemas.openxmlformats.org/officeDocument/2006/relationships" xmlns:p="http://schemas.openxmlformats.org/presentationml/2006/main" showMasterSp="1" showMasterPhAnim="1">
+  <p:cSld>
+    <p:spTree>
+      <p:nvGrpSpPr>
+        <p:cNvPr id="1" name=""/>
+        <p:cNvGrpSpPr/>
+        <p:nvPr/>
+      </p:nvGrpSpPr>
+      <p:grpSpPr>
+        <a:xfrm>
+          <a:off x="0" y="0"/>
+          <a:ext cx="0" cy="0"/>
+          <a:chOff x="0" y="0"/>
+          <a:chExt cx="0" cy="0"/>
+        </a:xfrm>
+      </p:grpSpPr>
+      <p:sp>
+        <p:nvSpPr>
+          <p:cNvPr id="237" name="Count the matches in the data"/>
+          <p:cNvSpPr txBox="1"/>
+          <p:nvPr>
+            <p:ph type="title"/>
+          </p:nvPr>
+        </p:nvSpPr>
+        <p:spPr>
+          <a:prstGeom prst="rect">
+            <a:avLst/>
+          </a:prstGeom>
+        </p:spPr>
+        <p:txBody>
+          <a:bodyPr/>
+          <a:lstStyle/>
+          <a:p>
+            <a:pPr/>
+            <a:r>
+              <a:t>Count the matches in the data</a:t>
+            </a:r>
+          </a:p>
+        </p:txBody>
+      </p:sp>
+      <p:sp>
+        <p:nvSpPr>
+          <p:cNvPr id="238" name="parsed.count()…"/>
+          <p:cNvSpPr txBox="1"/>
+          <p:nvPr/>
+        </p:nvSpPr>
+        <p:spPr>
+          <a:xfrm>
+            <a:off x="1254957" y="1652443"/>
+            <a:ext cx="6634086" cy="1209041"/>
+          </a:xfrm>
+          <a:prstGeom prst="rect">
+            <a:avLst/>
+          </a:prstGeom>
+          <a:ln w="12700">
+            <a:miter lim="400000"/>
+          </a:ln>
+          <a:extLst>
+            <a:ext uri="{C572A759-6A51-4108-AA02-DFA0A04FC94B}">
+              <ma14:wrappingTextBoxFlag xmlns:ma14="http://schemas.microsoft.com/office/mac/drawingml/2011/main" val="1"/>
+            </a:ext>
+          </a:extLst>
+        </p:spPr>
+        <p:txBody>
+          <a:bodyPr wrap="none" lIns="45719" rIns="45719">
+            <a:spAutoFit/>
+          </a:bodyPr>
+          <a:lstStyle/>
+          <a:p>
+            <a:pPr/>
+            <a:r>
+              <a:t>    parsed.count()</a:t>
+            </a:r>
+          </a:p>
+          <a:p>
+            <a:pPr/>
+            <a:r>
+              <a:t>    parsed.cache()</a:t>
+            </a:r>
+          </a:p>
+          <a:p>
+            <a:pPr/>
+            <a:r>
+              <a:t>    parsed.groupBy("is_match").count().orderBy($"count".desc).show()</a:t>
+            </a:r>
+          </a:p>
+        </p:txBody>
+      </p:sp>
+      <p:sp>
+        <p:nvSpPr>
+          <p:cNvPr id="239" name="res28: Long = 5749132…"/>
+          <p:cNvSpPr txBox="1"/>
+          <p:nvPr/>
+        </p:nvSpPr>
+        <p:spPr>
+          <a:xfrm>
+            <a:off x="1908352" y="3096288"/>
+            <a:ext cx="5865799" cy="1907516"/>
+          </a:xfrm>
+          <a:prstGeom prst="rect">
+            <a:avLst/>
+          </a:prstGeom>
+          <a:ln w="12700">
+            <a:miter lim="400000"/>
+          </a:ln>
+          <a:extLst>
+            <a:ext uri="{C572A759-6A51-4108-AA02-DFA0A04FC94B}">
+              <ma14:wrappingTextBoxFlag xmlns:ma14="http://schemas.microsoft.com/office/mac/drawingml/2011/main" val="1"/>
+            </a:ext>
+          </a:extLst>
+        </p:spPr>
+        <p:txBody>
+          <a:bodyPr wrap="none" lIns="45719" rIns="45719">
+            <a:spAutoFit/>
+          </a:bodyPr>
+          <a:lstStyle/>
+          <a:p>
+            <a:pPr defTabSz="457200">
+              <a:lnSpc>
+                <a:spcPts val="3000"/>
+              </a:lnSpc>
+              <a:defRPr sz="1200">
+                <a:solidFill>
+                  <a:srgbClr val="212121"/>
+                </a:solidFill>
+                <a:latin typeface="Monaco"/>
+                <a:ea typeface="Monaco"/>
+                <a:cs typeface="Monaco"/>
+                <a:sym typeface="Monaco"/>
+              </a:defRPr>
+            </a:pPr>
+            <a:r>
+              <a:t>res28: Long = 5749132</a:t>
+            </a:r>
+          </a:p>
+          <a:p>
+            <a:pPr defTabSz="457200">
+              <a:lnSpc>
+                <a:spcPts val="3000"/>
+              </a:lnSpc>
+              <a:defRPr sz="1200">
+                <a:solidFill>
+                  <a:srgbClr val="212121"/>
+                </a:solidFill>
+                <a:latin typeface="Monaco"/>
+                <a:ea typeface="Monaco"/>
+                <a:cs typeface="Monaco"/>
+                <a:sym typeface="Monaco"/>
+              </a:defRPr>
+            </a:pPr>
+            <a:r>
+              <a:t>res29: parsed.type = [id_1: int, id_2: int ... 10 more fields]</a:t>
+            </a:r>
+          </a:p>
+          <a:p>
+            <a:pPr defTabSz="457200">
+              <a:lnSpc>
+                <a:spcPts val="3000"/>
+              </a:lnSpc>
+              <a:defRPr sz="1200">
+                <a:solidFill>
+                  <a:srgbClr val="212121"/>
+                </a:solidFill>
+                <a:latin typeface="Monaco"/>
+                <a:ea typeface="Monaco"/>
+                <a:cs typeface="Monaco"/>
+                <a:sym typeface="Monaco"/>
+              </a:defRPr>
+            </a:pPr>
+            <a:r>
+              <a:t>+--------+-------+</a:t>
+            </a:r>
+          </a:p>
+          <a:p>
+            <a:pPr defTabSz="457200">
+              <a:lnSpc>
+                <a:spcPts val="3000"/>
+              </a:lnSpc>
+              <a:defRPr sz="1200">
+                <a:solidFill>
+                  <a:srgbClr val="212121"/>
+                </a:solidFill>
+                <a:latin typeface="Monaco"/>
+                <a:ea typeface="Monaco"/>
+                <a:cs typeface="Monaco"/>
+                <a:sym typeface="Monaco"/>
+              </a:defRPr>
+            </a:pPr>
+            <a:r>
+              <a:t>|is_match|  count|</a:t>
+            </a:r>
+          </a:p>
+          <a:p>
+            <a:pPr defTabSz="457200">
+              <a:lnSpc>
+                <a:spcPts val="3000"/>
+              </a:lnSpc>
+              <a:defRPr sz="1200">
+                <a:solidFill>
+                  <a:srgbClr val="212121"/>
+                </a:solidFill>
+                <a:latin typeface="Monaco"/>
+                <a:ea typeface="Monaco"/>
+                <a:cs typeface="Monaco"/>
+                <a:sym typeface="Monaco"/>
+              </a:defRPr>
+            </a:pPr>
+            <a:r>
+              <a:t>+--------+-------+</a:t>
+            </a:r>
+          </a:p>
+          <a:p>
+            <a:pPr defTabSz="457200">
+              <a:lnSpc>
+                <a:spcPts val="3000"/>
+              </a:lnSpc>
+              <a:defRPr sz="1200">
+                <a:solidFill>
+                  <a:srgbClr val="212121"/>
+                </a:solidFill>
+                <a:latin typeface="Monaco"/>
+                <a:ea typeface="Monaco"/>
+                <a:cs typeface="Monaco"/>
+                <a:sym typeface="Monaco"/>
+              </a:defRPr>
+            </a:pPr>
+            <a:r>
+              <a:t>|   false|5728201|</a:t>
+            </a:r>
+          </a:p>
+          <a:p>
+            <a:pPr defTabSz="457200">
+              <a:lnSpc>
+                <a:spcPts val="3000"/>
+              </a:lnSpc>
+              <a:defRPr sz="1200">
+                <a:solidFill>
+                  <a:srgbClr val="212121"/>
+                </a:solidFill>
+                <a:latin typeface="Monaco"/>
+                <a:ea typeface="Monaco"/>
+                <a:cs typeface="Monaco"/>
+                <a:sym typeface="Monaco"/>
+              </a:defRPr>
+            </a:pPr>
+            <a:r>
+              <a:t>|    true|  20931|</a:t>
+            </a:r>
+          </a:p>
+          <a:p>
+            <a:pPr defTabSz="457200">
+              <a:lnSpc>
+                <a:spcPts val="3000"/>
+              </a:lnSpc>
+              <a:defRPr sz="1200">
+                <a:solidFill>
+                  <a:srgbClr val="212121"/>
+                </a:solidFill>
+                <a:latin typeface="Monaco"/>
+                <a:ea typeface="Monaco"/>
+                <a:cs typeface="Monaco"/>
+                <a:sym typeface="Monaco"/>
+              </a:defRPr>
+            </a:pPr>
+            <a:r>
+              <a:t>+--------+-------+</a:t>
+            </a:r>
+          </a:p>
+        </p:txBody>
+      </p:sp>
+    </p:spTree>
+  </p:cSld>
+  <p:clrMapOvr>
+    <a:masterClrMapping/>
+  </p:clrMapOvr>
+  <p:transition xmlns:p14="http://schemas.microsoft.com/office/powerpoint/2010/main" spd="med" advClick="1"/>
+</p:sld>
+</file>
+
+<file path=ppt/slides/slide18.xml><?xml version="1.0" encoding="utf-8"?>
+<p:sld xmlns:a="http://schemas.openxmlformats.org/drawingml/2006/main" xmlns:r="http://schemas.openxmlformats.org/officeDocument/2006/relationships" xmlns:p="http://schemas.openxmlformats.org/presentationml/2006/main" showMasterSp="1" showMasterPhAnim="1">
+  <p:cSld>
+    <p:spTree>
+      <p:nvGrpSpPr>
+        <p:cNvPr id="1" name=""/>
+        <p:cNvGrpSpPr/>
+        <p:nvPr/>
+      </p:nvGrpSpPr>
+      <p:grpSpPr>
+        <a:xfrm>
+          <a:off x="0" y="0"/>
+          <a:ext cx="0" cy="0"/>
+          <a:chOff x="0" y="0"/>
+          <a:chExt cx="0" cy="0"/>
+        </a:xfrm>
+      </p:grpSpPr>
+      <p:sp>
+        <p:nvSpPr>
+          <p:cNvPr id="243" name="Can do it with SQL"/>
+          <p:cNvSpPr txBox="1"/>
+          <p:nvPr>
+            <p:ph type="title"/>
+          </p:nvPr>
+        </p:nvSpPr>
+        <p:spPr>
+          <a:prstGeom prst="rect">
+            <a:avLst/>
+          </a:prstGeom>
+        </p:spPr>
+        <p:txBody>
+          <a:bodyPr/>
+          <a:lstStyle/>
+          <a:p>
+            <a:pPr/>
+            <a:r>
+              <a:t>Can do it with SQL</a:t>
+            </a:r>
+          </a:p>
+        </p:txBody>
+      </p:sp>
+      <p:sp>
+        <p:nvSpPr>
+          <p:cNvPr id="244" name="parsed.createOrReplaceTempView(&quot;linkage&quot;)…"/>
+          <p:cNvSpPr txBox="1"/>
+          <p:nvPr/>
+        </p:nvSpPr>
+        <p:spPr>
+          <a:xfrm>
+            <a:off x="2306874" y="1518433"/>
+            <a:ext cx="4530252" cy="2047241"/>
+          </a:xfrm>
+          <a:prstGeom prst="rect">
+            <a:avLst/>
+          </a:prstGeom>
+          <a:ln w="12700">
+            <a:miter lim="400000"/>
+          </a:ln>
+          <a:extLst>
+            <a:ext uri="{C572A759-6A51-4108-AA02-DFA0A04FC94B}">
+              <ma14:wrappingTextBoxFlag xmlns:ma14="http://schemas.microsoft.com/office/mac/drawingml/2011/main" val="1"/>
+            </a:ext>
+          </a:extLst>
+        </p:spPr>
+        <p:txBody>
+          <a:bodyPr wrap="none" lIns="45719" rIns="45719">
+            <a:spAutoFit/>
+          </a:bodyPr>
+          <a:lstStyle/>
+          <a:p>
+            <a:pPr/>
+            <a:r>
+              <a:t>    parsed.createOrReplaceTempView("linkage")</a:t>
+            </a:r>
+          </a:p>
+          <a:p>
+            <a:pPr/>
+            <a:r>
+              <a:t>    spark.sql("""</a:t>
+            </a:r>
+          </a:p>
+          <a:p>
+            <a:pPr/>
+            <a:r>
+              <a:t>      SELECT is_match, COUNT(*) cnt</a:t>
+            </a:r>
+          </a:p>
+          <a:p>
+            <a:pPr/>
+            <a:r>
+              <a:t>      FROM linkage</a:t>
+            </a:r>
+          </a:p>
+          <a:p>
+            <a:pPr/>
+            <a:r>
+              <a:t>      GROUP BY is_match</a:t>
+            </a:r>
+          </a:p>
+          <a:p>
+            <a:pPr/>
+            <a:r>
+              <a:t>      ORDER BY cnt DESC</a:t>
+            </a:r>
+          </a:p>
+          <a:p>
+            <a:pPr/>
+            <a:r>
+              <a:t>    """).show()</a:t>
+            </a:r>
+          </a:p>
+        </p:txBody>
+      </p:sp>
+      <p:sp>
+        <p:nvSpPr>
+          <p:cNvPr id="245" name="+--------+-------+…"/>
+          <p:cNvSpPr txBox="1"/>
+          <p:nvPr/>
+        </p:nvSpPr>
+        <p:spPr>
+          <a:xfrm>
+            <a:off x="3651108" y="3993024"/>
+            <a:ext cx="1841784" cy="1501116"/>
+          </a:xfrm>
+          <a:prstGeom prst="rect">
+            <a:avLst/>
+          </a:prstGeom>
+          <a:ln w="12700">
+            <a:miter lim="400000"/>
+          </a:ln>
+          <a:extLst>
+            <a:ext uri="{C572A759-6A51-4108-AA02-DFA0A04FC94B}">
+              <ma14:wrappingTextBoxFlag xmlns:ma14="http://schemas.microsoft.com/office/mac/drawingml/2011/main" val="1"/>
+            </a:ext>
+          </a:extLst>
+        </p:spPr>
+        <p:txBody>
+          <a:bodyPr wrap="none" lIns="45719" rIns="45719">
+            <a:spAutoFit/>
+          </a:bodyPr>
+          <a:lstStyle/>
+          <a:p>
+            <a:pPr defTabSz="457200">
+              <a:lnSpc>
+                <a:spcPts val="3000"/>
+              </a:lnSpc>
+              <a:defRPr sz="1200">
+                <a:solidFill>
+                  <a:srgbClr val="212121"/>
+                </a:solidFill>
+                <a:latin typeface="Monaco"/>
+                <a:ea typeface="Monaco"/>
+                <a:cs typeface="Monaco"/>
+                <a:sym typeface="Monaco"/>
+              </a:defRPr>
+            </a:pPr>
+            <a:r>
+              <a:t>+--------+-------+</a:t>
+            </a:r>
+          </a:p>
+          <a:p>
+            <a:pPr defTabSz="457200">
+              <a:lnSpc>
+                <a:spcPts val="3000"/>
+              </a:lnSpc>
+              <a:defRPr sz="1200">
+                <a:solidFill>
+                  <a:srgbClr val="212121"/>
+                </a:solidFill>
+                <a:latin typeface="Monaco"/>
+                <a:ea typeface="Monaco"/>
+                <a:cs typeface="Monaco"/>
+                <a:sym typeface="Monaco"/>
+              </a:defRPr>
+            </a:pPr>
+            <a:r>
+              <a:t>|is_match|    cnt|</a:t>
+            </a:r>
+          </a:p>
+          <a:p>
+            <a:pPr defTabSz="457200">
+              <a:lnSpc>
+                <a:spcPts val="3000"/>
+              </a:lnSpc>
+              <a:defRPr sz="1200">
+                <a:solidFill>
+                  <a:srgbClr val="212121"/>
+                </a:solidFill>
+                <a:latin typeface="Monaco"/>
+                <a:ea typeface="Monaco"/>
+                <a:cs typeface="Monaco"/>
+                <a:sym typeface="Monaco"/>
+              </a:defRPr>
+            </a:pPr>
+            <a:r>
+              <a:t>+--------+-------+</a:t>
+            </a:r>
+          </a:p>
+          <a:p>
+            <a:pPr defTabSz="457200">
+              <a:lnSpc>
+                <a:spcPts val="3000"/>
+              </a:lnSpc>
+              <a:defRPr sz="1200">
+                <a:solidFill>
+                  <a:srgbClr val="212121"/>
+                </a:solidFill>
+                <a:latin typeface="Monaco"/>
+                <a:ea typeface="Monaco"/>
+                <a:cs typeface="Monaco"/>
+                <a:sym typeface="Monaco"/>
+              </a:defRPr>
+            </a:pPr>
+            <a:r>
+              <a:t>|   false|5728201|</a:t>
+            </a:r>
+          </a:p>
+          <a:p>
+            <a:pPr defTabSz="457200">
+              <a:lnSpc>
+                <a:spcPts val="3000"/>
+              </a:lnSpc>
+              <a:defRPr sz="1200">
+                <a:solidFill>
+                  <a:srgbClr val="212121"/>
+                </a:solidFill>
+                <a:latin typeface="Monaco"/>
+                <a:ea typeface="Monaco"/>
+                <a:cs typeface="Monaco"/>
+                <a:sym typeface="Monaco"/>
+              </a:defRPr>
+            </a:pPr>
+            <a:r>
+              <a:t>|    true|  20931|</a:t>
+            </a:r>
+          </a:p>
+          <a:p>
+            <a:pPr defTabSz="457200">
+              <a:lnSpc>
+                <a:spcPts val="3000"/>
+              </a:lnSpc>
+              <a:defRPr sz="1200">
+                <a:solidFill>
+                  <a:srgbClr val="212121"/>
+                </a:solidFill>
+                <a:latin typeface="Monaco"/>
+                <a:ea typeface="Monaco"/>
+                <a:cs typeface="Monaco"/>
+                <a:sym typeface="Monaco"/>
+              </a:defRPr>
+            </a:pPr>
+            <a:r>
+              <a:t>+--------+-------+</a:t>
+            </a:r>
+          </a:p>
+        </p:txBody>
+      </p:sp>
+    </p:spTree>
+  </p:cSld>
+  <p:clrMapOvr>
+    <a:masterClrMapping/>
+  </p:clrMapOvr>
+  <p:transition xmlns:p14="http://schemas.microsoft.com/office/powerpoint/2010/main" spd="med" advClick="1"/>
+</p:sld>
+</file>
+
+<file path=ppt/slides/slide19.xml><?xml version="1.0" encoding="utf-8"?>
+<p:sld xmlns:a="http://schemas.openxmlformats.org/drawingml/2006/main" xmlns:r="http://schemas.openxmlformats.org/officeDocument/2006/relationships" xmlns:p="http://schemas.openxmlformats.org/presentationml/2006/main" showMasterSp="1" showMasterPhAnim="1">
+  <p:cSld>
+    <p:spTree>
+      <p:nvGrpSpPr>
+        <p:cNvPr id="1" name=""/>
+        <p:cNvGrpSpPr/>
+        <p:nvPr/>
+      </p:nvGrpSpPr>
+      <p:grpSpPr>
+        <a:xfrm>
+          <a:off x="0" y="0"/>
+          <a:ext cx="0" cy="0"/>
+          <a:chOff x="0" y="0"/>
+          <a:chExt cx="0" cy="0"/>
+        </a:xfrm>
+      </p:grpSpPr>
+      <p:sp>
+        <p:nvSpPr>
+          <p:cNvPr id="249" name="Get description"/>
+          <p:cNvSpPr txBox="1"/>
+          <p:nvPr>
+            <p:ph type="title"/>
+          </p:nvPr>
+        </p:nvSpPr>
+        <p:spPr>
+          <a:prstGeom prst="rect">
+            <a:avLst/>
+          </a:prstGeom>
+        </p:spPr>
+        <p:txBody>
+          <a:bodyPr/>
+          <a:lstStyle/>
+          <a:p>
+            <a:pPr/>
+            <a:r>
+              <a:t>Get description</a:t>
+            </a:r>
+          </a:p>
+        </p:txBody>
+      </p:sp>
+      <p:sp>
+        <p:nvSpPr>
+          <p:cNvPr id="250" name="val summary = parsed.describe()…"/>
+          <p:cNvSpPr txBox="1"/>
+          <p:nvPr/>
+        </p:nvSpPr>
+        <p:spPr>
+          <a:xfrm>
+            <a:off x="996833" y="1525736"/>
+            <a:ext cx="7150334" cy="1209041"/>
+          </a:xfrm>
+          <a:prstGeom prst="rect">
+            <a:avLst/>
+          </a:prstGeom>
+          <a:ln w="12700">
+            <a:miter lim="400000"/>
+          </a:ln>
+          <a:extLst>
+            <a:ext uri="{C572A759-6A51-4108-AA02-DFA0A04FC94B}">
+              <ma14:wrappingTextBoxFlag xmlns:ma14="http://schemas.microsoft.com/office/mac/drawingml/2011/main" val="1"/>
+            </a:ext>
+          </a:extLst>
+        </p:spPr>
+        <p:txBody>
+          <a:bodyPr wrap="none" lIns="45719" rIns="45719">
+            <a:spAutoFit/>
+          </a:bodyPr>
+          <a:lstStyle/>
+          <a:p>
+            <a:pPr/>
+            <a:r>
+              <a:t>    val summary = parsed.describe()</a:t>
+            </a:r>
+          </a:p>
+          <a:p>
+            <a:pPr/>
+            <a:r>
+              <a:t>    summary.show()</a:t>
+            </a:r>
+          </a:p>
+          <a:p>
+            <a:pPr/>
+            <a:r>
+              <a:t>    summary.select("summary", "cmp_fname_c1", "cmp_fname_c2").show()</a:t>
+            </a:r>
+          </a:p>
+        </p:txBody>
+      </p:sp>
+      <p:sp>
+        <p:nvSpPr>
+          <p:cNvPr id="251" name="summary: org.apache.spark.sql.DataFrame = [summary: string, id_1: string ... 10 more fields]…"/>
+          <p:cNvSpPr txBox="1"/>
+          <p:nvPr/>
+        </p:nvSpPr>
+        <p:spPr>
+          <a:xfrm>
+            <a:off x="847723" y="2495656"/>
+            <a:ext cx="21356031" cy="4345916"/>
+          </a:xfrm>
+          <a:prstGeom prst="rect">
+            <a:avLst/>
+          </a:prstGeom>
+          <a:ln w="12700">
+            <a:miter lim="400000"/>
+          </a:ln>
+          <a:extLst>
+            <a:ext uri="{C572A759-6A51-4108-AA02-DFA0A04FC94B}">
+              <ma14:wrappingTextBoxFlag xmlns:ma14="http://schemas.microsoft.com/office/mac/drawingml/2011/main" val="1"/>
+            </a:ext>
+          </a:extLst>
+        </p:spPr>
+        <p:txBody>
+          <a:bodyPr lIns="45719" rIns="45719">
+            <a:spAutoFit/>
+          </a:bodyPr>
+          <a:lstStyle/>
+          <a:p>
+            <a:pPr defTabSz="457200">
+              <a:lnSpc>
+                <a:spcPts val="3000"/>
+              </a:lnSpc>
+              <a:defRPr sz="1200">
+                <a:solidFill>
+                  <a:srgbClr val="212121"/>
+                </a:solidFill>
+                <a:latin typeface="Monaco"/>
+                <a:ea typeface="Monaco"/>
+                <a:cs typeface="Monaco"/>
+                <a:sym typeface="Monaco"/>
+              </a:defRPr>
+            </a:pPr>
+            <a:r>
+              <a:t>summary: org.apache.spark.sql.DataFrame = [summary: string, id_1: string ... 10 more fields]</a:t>
+            </a:r>
+          </a:p>
+          <a:p>
+            <a:pPr defTabSz="457200">
+              <a:lnSpc>
+                <a:spcPts val="3000"/>
+              </a:lnSpc>
+              <a:defRPr sz="1200">
+                <a:solidFill>
+                  <a:srgbClr val="212121"/>
+                </a:solidFill>
+                <a:latin typeface="Monaco"/>
+                <a:ea typeface="Monaco"/>
+                <a:cs typeface="Monaco"/>
+                <a:sym typeface="Monaco"/>
+              </a:defRPr>
+            </a:pPr>
+            <a:r>
+              <a:t>+-------+------------------+------------------+------------------+------------------+------------------+-------------------+------------------+-------------------+-------------------+-------------------+-------------------+</a:t>
+            </a:r>
+          </a:p>
+          <a:p>
+            <a:pPr defTabSz="457200">
+              <a:lnSpc>
+                <a:spcPts val="3000"/>
+              </a:lnSpc>
+              <a:defRPr sz="1200">
+                <a:solidFill>
+                  <a:srgbClr val="212121"/>
+                </a:solidFill>
+                <a:latin typeface="Monaco"/>
+                <a:ea typeface="Monaco"/>
+                <a:cs typeface="Monaco"/>
+                <a:sym typeface="Monaco"/>
+              </a:defRPr>
+            </a:pPr>
+            <a:r>
+              <a:t>|summary|              id_1|              id_2|      cmp_fname_c1|      cmp_fname_c2|      cmp_lname_c1|       cmp_lname_c2|           cmp_sex|             cmp_bd|             cmp_bm|             cmp_by|            cmp_plz|</a:t>
+            </a:r>
+          </a:p>
+          <a:p>
+            <a:pPr defTabSz="457200">
+              <a:lnSpc>
+                <a:spcPts val="3000"/>
+              </a:lnSpc>
+              <a:defRPr sz="1200">
+                <a:solidFill>
+                  <a:srgbClr val="212121"/>
+                </a:solidFill>
+                <a:latin typeface="Monaco"/>
+                <a:ea typeface="Monaco"/>
+                <a:cs typeface="Monaco"/>
+                <a:sym typeface="Monaco"/>
+              </a:defRPr>
+            </a:pPr>
+            <a:r>
+              <a:t>+-------+------------------+------------------+------------------+------------------+------------------+-------------------+------------------+-------------------+-------------------+-------------------+-------------------+</a:t>
+            </a:r>
+          </a:p>
+          <a:p>
+            <a:pPr defTabSz="457200">
+              <a:lnSpc>
+                <a:spcPts val="3000"/>
+              </a:lnSpc>
+              <a:defRPr sz="1200">
+                <a:solidFill>
+                  <a:srgbClr val="212121"/>
+                </a:solidFill>
+                <a:latin typeface="Monaco"/>
+                <a:ea typeface="Monaco"/>
+                <a:cs typeface="Monaco"/>
+                <a:sym typeface="Monaco"/>
+              </a:defRPr>
+            </a:pPr>
+            <a:r>
+              <a:t>|  count|           5749132|           5749132|           5748125|            103698|           5749132|               2464|           5749132|            5748337|            5748337|            5748337|            5736289|</a:t>
+            </a:r>
+          </a:p>
+          <a:p>
+            <a:pPr defTabSz="457200">
+              <a:lnSpc>
+                <a:spcPts val="3000"/>
+              </a:lnSpc>
+              <a:defRPr sz="1200">
+                <a:solidFill>
+                  <a:srgbClr val="212121"/>
+                </a:solidFill>
+                <a:latin typeface="Monaco"/>
+                <a:ea typeface="Monaco"/>
+                <a:cs typeface="Monaco"/>
+                <a:sym typeface="Monaco"/>
+              </a:defRPr>
+            </a:pPr>
+            <a:r>
+              <a:t>|   mean| 33324.48559643438| 66587.43558331935|0.7129024704436274|0.9000176718903216|0.3156278193084133|0.31841283153174377| 0.955001381078048|0.22446526708507172|0.48885529849763504| 0.2227485966810923|0.00552866147434343|</a:t>
+            </a:r>
+          </a:p>
+          <a:p>
+            <a:pPr defTabSz="457200">
+              <a:lnSpc>
+                <a:spcPts val="3000"/>
+              </a:lnSpc>
+              <a:defRPr sz="1200">
+                <a:solidFill>
+                  <a:srgbClr val="212121"/>
+                </a:solidFill>
+                <a:latin typeface="Monaco"/>
+                <a:ea typeface="Monaco"/>
+                <a:cs typeface="Monaco"/>
+                <a:sym typeface="Monaco"/>
+              </a:defRPr>
+            </a:pPr>
+            <a:r>
+              <a:t>| stddev|23659.859374488213|23620.487613269885|0.3887583596162788|0.2713176105782331|0.3342336339615816|0.36856706620066537|0.2073011111689795| 0.4172297223846255| 0.4998758236779038|0.41609096298317344|0.07414914925420066|</a:t>
+            </a:r>
+          </a:p>
+          <a:p>
+            <a:pPr defTabSz="457200">
+              <a:lnSpc>
+                <a:spcPts val="3000"/>
+              </a:lnSpc>
+              <a:defRPr sz="1200">
+                <a:solidFill>
+                  <a:srgbClr val="212121"/>
+                </a:solidFill>
+                <a:latin typeface="Monaco"/>
+                <a:ea typeface="Monaco"/>
+                <a:cs typeface="Monaco"/>
+                <a:sym typeface="Monaco"/>
+              </a:defRPr>
+            </a:pPr>
+            <a:r>
+              <a:t>|    min|                 1|                 6|               0.0|               0.0|               0.0|                0.0|                 0|                  0|                  0|                  0|                  0|</a:t>
+            </a:r>
+          </a:p>
+          <a:p>
+            <a:pPr defTabSz="457200">
+              <a:lnSpc>
+                <a:spcPts val="3000"/>
+              </a:lnSpc>
+              <a:defRPr sz="1200">
+                <a:solidFill>
+                  <a:srgbClr val="212121"/>
+                </a:solidFill>
+                <a:latin typeface="Monaco"/>
+                <a:ea typeface="Monaco"/>
+                <a:cs typeface="Monaco"/>
+                <a:sym typeface="Monaco"/>
+              </a:defRPr>
+            </a:pPr>
+            <a:r>
+              <a:t>|    max|             99980|            100000|               1.0|               1.0|               1.0|                1.0|                 1|                  1|                  1|                  1|                  1|</a:t>
+            </a:r>
+          </a:p>
+          <a:p>
+            <a:pPr defTabSz="457200">
+              <a:lnSpc>
+                <a:spcPts val="3000"/>
+              </a:lnSpc>
+              <a:defRPr sz="1200">
+                <a:solidFill>
+                  <a:srgbClr val="212121"/>
+                </a:solidFill>
+                <a:latin typeface="Monaco"/>
+                <a:ea typeface="Monaco"/>
+                <a:cs typeface="Monaco"/>
+                <a:sym typeface="Monaco"/>
+              </a:defRPr>
+            </a:pPr>
+            <a:r>
+              <a:t>+-------+------------------+------------------+------------------+------------------+------------------+-------------------+------------------+-------------------+-------------------+-------------------+-------------------+</a:t>
+            </a:r>
+          </a:p>
+          <a:p>
+            <a:pPr defTabSz="457200">
+              <a:lnSpc>
+                <a:spcPts val="3000"/>
+              </a:lnSpc>
+              <a:defRPr sz="1200">
+                <a:solidFill>
+                  <a:srgbClr val="212121"/>
+                </a:solidFill>
+                <a:latin typeface="Monaco"/>
+                <a:ea typeface="Monaco"/>
+                <a:cs typeface="Monaco"/>
+                <a:sym typeface="Monaco"/>
+              </a:defRPr>
+            </a:pPr>
+          </a:p>
+          <a:p>
+            <a:pPr defTabSz="457200">
+              <a:lnSpc>
+                <a:spcPts val="3000"/>
+              </a:lnSpc>
+              <a:defRPr sz="1200">
+                <a:solidFill>
+                  <a:srgbClr val="212121"/>
+                </a:solidFill>
+                <a:latin typeface="Monaco"/>
+                <a:ea typeface="Monaco"/>
+                <a:cs typeface="Monaco"/>
+                <a:sym typeface="Monaco"/>
+              </a:defRPr>
+            </a:pPr>
+            <a:r>
+              <a:t>+-------+------------------+------------------+</a:t>
+            </a:r>
+          </a:p>
+          <a:p>
+            <a:pPr defTabSz="457200">
+              <a:lnSpc>
+                <a:spcPts val="3000"/>
+              </a:lnSpc>
+              <a:defRPr sz="1200">
+                <a:solidFill>
+                  <a:srgbClr val="212121"/>
+                </a:solidFill>
+                <a:latin typeface="Monaco"/>
+                <a:ea typeface="Monaco"/>
+                <a:cs typeface="Monaco"/>
+                <a:sym typeface="Monaco"/>
+              </a:defRPr>
+            </a:pPr>
+            <a:r>
+              <a:t>|summary|      cmp_fname_c1|      cmp_fname_c2|</a:t>
+            </a:r>
+          </a:p>
+          <a:p>
+            <a:pPr defTabSz="457200">
+              <a:lnSpc>
+                <a:spcPts val="3000"/>
+              </a:lnSpc>
+              <a:defRPr sz="1200">
+                <a:solidFill>
+                  <a:srgbClr val="212121"/>
+                </a:solidFill>
+                <a:latin typeface="Monaco"/>
+                <a:ea typeface="Monaco"/>
+                <a:cs typeface="Monaco"/>
+                <a:sym typeface="Monaco"/>
+              </a:defRPr>
+            </a:pPr>
+            <a:r>
+              <a:t>+-------+------------------+------------------+</a:t>
+            </a:r>
+          </a:p>
+          <a:p>
+            <a:pPr defTabSz="457200">
+              <a:lnSpc>
+                <a:spcPts val="3000"/>
+              </a:lnSpc>
+              <a:defRPr sz="1200">
+                <a:solidFill>
+                  <a:srgbClr val="212121"/>
+                </a:solidFill>
+                <a:latin typeface="Monaco"/>
+                <a:ea typeface="Monaco"/>
+                <a:cs typeface="Monaco"/>
+                <a:sym typeface="Monaco"/>
+              </a:defRPr>
+            </a:pPr>
+            <a:r>
+              <a:t>|  count|           5748125|            103698|</a:t>
+            </a:r>
+          </a:p>
+          <a:p>
+            <a:pPr defTabSz="457200">
+              <a:lnSpc>
+                <a:spcPts val="3000"/>
+              </a:lnSpc>
+              <a:defRPr sz="1200">
+                <a:solidFill>
+                  <a:srgbClr val="212121"/>
+                </a:solidFill>
+                <a:latin typeface="Monaco"/>
+                <a:ea typeface="Monaco"/>
+                <a:cs typeface="Monaco"/>
+                <a:sym typeface="Monaco"/>
+              </a:defRPr>
+            </a:pPr>
+            <a:r>
+              <a:t>|   mean|0.7129024704436274|0.9000176718903216|</a:t>
+            </a:r>
+          </a:p>
+          <a:p>
+            <a:pPr defTabSz="457200">
+              <a:lnSpc>
+                <a:spcPts val="3000"/>
+              </a:lnSpc>
+              <a:defRPr sz="1200">
+                <a:solidFill>
+                  <a:srgbClr val="212121"/>
+                </a:solidFill>
+                <a:latin typeface="Monaco"/>
+                <a:ea typeface="Monaco"/>
+                <a:cs typeface="Monaco"/>
+                <a:sym typeface="Monaco"/>
+              </a:defRPr>
+            </a:pPr>
+            <a:r>
+              <a:t>| stddev|0.3887583596162788|0.2713176105782331|</a:t>
+            </a:r>
+          </a:p>
+          <a:p>
+            <a:pPr defTabSz="457200">
+              <a:lnSpc>
+                <a:spcPts val="3000"/>
+              </a:lnSpc>
+              <a:defRPr sz="1200">
+                <a:solidFill>
+                  <a:srgbClr val="212121"/>
+                </a:solidFill>
+                <a:latin typeface="Monaco"/>
+                <a:ea typeface="Monaco"/>
+                <a:cs typeface="Monaco"/>
+                <a:sym typeface="Monaco"/>
+              </a:defRPr>
+            </a:pPr>
+            <a:r>
+              <a:t>|    min|               0.0|               0.0|</a:t>
+            </a:r>
+          </a:p>
+          <a:p>
+            <a:pPr defTabSz="457200">
+              <a:lnSpc>
+                <a:spcPts val="3000"/>
+              </a:lnSpc>
+              <a:defRPr sz="1200">
+                <a:solidFill>
+                  <a:srgbClr val="212121"/>
+                </a:solidFill>
+                <a:latin typeface="Monaco"/>
+                <a:ea typeface="Monaco"/>
+                <a:cs typeface="Monaco"/>
+                <a:sym typeface="Monaco"/>
+              </a:defRPr>
+            </a:pPr>
+            <a:r>
+              <a:t>|    max|               1.0|               1.0|</a:t>
+            </a:r>
+          </a:p>
+          <a:p>
+            <a:pPr defTabSz="457200">
+              <a:lnSpc>
+                <a:spcPts val="3000"/>
+              </a:lnSpc>
+              <a:defRPr sz="1200">
+                <a:solidFill>
+                  <a:srgbClr val="212121"/>
+                </a:solidFill>
+                <a:latin typeface="Monaco"/>
+                <a:ea typeface="Monaco"/>
+                <a:cs typeface="Monaco"/>
+                <a:sym typeface="Monaco"/>
+              </a:defRPr>
+            </a:pPr>
+            <a:r>
+              <a:t>+-------+------------------+------------------+</a:t>
             </a:r>
           </a:p>
         </p:txBody>
@@ -4274,6 +7840,1267 @@
             <a:pPr/>
             <a:r>
               <a:t>Basics of Big Data</a:t>
+            </a:r>
+          </a:p>
+        </p:txBody>
+      </p:sp>
+    </p:spTree>
+  </p:cSld>
+  <p:clrMapOvr>
+    <a:masterClrMapping/>
+  </p:clrMapOvr>
+  <p:transition xmlns:p14="http://schemas.microsoft.com/office/powerpoint/2010/main" spd="med" advClick="1"/>
+</p:sld>
+</file>
+
+<file path=ppt/slides/slide20.xml><?xml version="1.0" encoding="utf-8"?>
+<p:sld xmlns:a="http://schemas.openxmlformats.org/drawingml/2006/main" xmlns:r="http://schemas.openxmlformats.org/officeDocument/2006/relationships" xmlns:p="http://schemas.openxmlformats.org/presentationml/2006/main" showMasterSp="1" showMasterPhAnim="1">
+  <p:cSld>
+    <p:spTree>
+      <p:nvGrpSpPr>
+        <p:cNvPr id="1" name=""/>
+        <p:cNvGrpSpPr/>
+        <p:nvPr/>
+      </p:nvGrpSpPr>
+      <p:grpSpPr>
+        <a:xfrm>
+          <a:off x="0" y="0"/>
+          <a:ext cx="0" cy="0"/>
+          <a:chOff x="0" y="0"/>
+          <a:chExt cx="0" cy="0"/>
+        </a:xfrm>
+      </p:grpSpPr>
+      <p:sp>
+        <p:nvSpPr>
+          <p:cNvPr id="253" name="Define helper functions"/>
+          <p:cNvSpPr txBox="1"/>
+          <p:nvPr>
+            <p:ph type="title"/>
+          </p:nvPr>
+        </p:nvSpPr>
+        <p:spPr>
+          <a:prstGeom prst="rect">
+            <a:avLst/>
+          </a:prstGeom>
+        </p:spPr>
+        <p:txBody>
+          <a:bodyPr/>
+          <a:lstStyle/>
+          <a:p>
+            <a:pPr/>
+            <a:r>
+              <a:t>Define helper functions</a:t>
+            </a:r>
+          </a:p>
+        </p:txBody>
+      </p:sp>
+      <p:sp>
+        <p:nvSpPr>
+          <p:cNvPr id="254" name="def longForm(desc: DataFrame): DataFrame = {…"/>
+          <p:cNvSpPr txBox="1"/>
+          <p:nvPr/>
+        </p:nvSpPr>
+        <p:spPr>
+          <a:xfrm>
+            <a:off x="687475" y="1431938"/>
+            <a:ext cx="7769050" cy="2885441"/>
+          </a:xfrm>
+          <a:prstGeom prst="rect">
+            <a:avLst/>
+          </a:prstGeom>
+          <a:ln w="12700">
+            <a:miter lim="400000"/>
+          </a:ln>
+          <a:extLst>
+            <a:ext uri="{C572A759-6A51-4108-AA02-DFA0A04FC94B}">
+              <ma14:wrappingTextBoxFlag xmlns:ma14="http://schemas.microsoft.com/office/mac/drawingml/2011/main" val="1"/>
+            </a:ext>
+          </a:extLst>
+        </p:spPr>
+        <p:txBody>
+          <a:bodyPr wrap="none" lIns="45719" rIns="45719">
+            <a:spAutoFit/>
+          </a:bodyPr>
+          <a:lstStyle/>
+          <a:p>
+            <a:pPr/>
+            <a:r>
+              <a:t>  def longForm(desc: DataFrame): DataFrame = {</a:t>
+            </a:r>
+          </a:p>
+          <a:p>
+            <a:pPr/>
+            <a:r>
+              <a:t>    import desc.sparkSession.implicits._ // For toDF RDD -&gt; DataFrame conversion</a:t>
+            </a:r>
+          </a:p>
+          <a:p>
+            <a:pPr/>
+            <a:r>
+              <a:t>    val schema = desc.schema</a:t>
+            </a:r>
+          </a:p>
+          <a:p>
+            <a:pPr/>
+            <a:r>
+              <a:t>    desc.flatMap(row =&gt; {</a:t>
+            </a:r>
+          </a:p>
+          <a:p>
+            <a:pPr/>
+            <a:r>
+              <a:t>      val metric = row.getString(0)</a:t>
+            </a:r>
+          </a:p>
+          <a:p>
+            <a:pPr/>
+            <a:r>
+              <a:t>      (1 until row.size).map(i =&gt; (metric, schema(i).name, row.getString(i).toDouble))</a:t>
+            </a:r>
+          </a:p>
+          <a:p>
+            <a:pPr/>
+            <a:r>
+              <a:t>    })</a:t>
+            </a:r>
+          </a:p>
+          <a:p>
+            <a:pPr/>
+            <a:r>
+              <a:t>    .toDF("metric", "field", "value")</a:t>
+            </a:r>
+          </a:p>
+          <a:p>
+            <a:pPr/>
+            <a:r>
+              <a:t>  }</a:t>
+            </a:r>
+          </a:p>
+        </p:txBody>
+      </p:sp>
+    </p:spTree>
+  </p:cSld>
+  <p:clrMapOvr>
+    <a:masterClrMapping/>
+  </p:clrMapOvr>
+  <p:transition xmlns:p14="http://schemas.microsoft.com/office/powerpoint/2010/main" spd="med" advClick="1"/>
+</p:sld>
+</file>
+
+<file path=ppt/slides/slide21.xml><?xml version="1.0" encoding="utf-8"?>
+<p:sld xmlns:a="http://schemas.openxmlformats.org/drawingml/2006/main" xmlns:r="http://schemas.openxmlformats.org/officeDocument/2006/relationships" xmlns:p="http://schemas.openxmlformats.org/presentationml/2006/main" showMasterSp="1" showMasterPhAnim="1">
+  <p:cSld>
+    <p:spTree>
+      <p:nvGrpSpPr>
+        <p:cNvPr id="1" name=""/>
+        <p:cNvGrpSpPr/>
+        <p:nvPr/>
+      </p:nvGrpSpPr>
+      <p:grpSpPr>
+        <a:xfrm>
+          <a:off x="0" y="0"/>
+          <a:ext cx="0" cy="0"/>
+          <a:chOff x="0" y="0"/>
+          <a:chExt cx="0" cy="0"/>
+        </a:xfrm>
+      </p:grpSpPr>
+      <p:sp>
+        <p:nvSpPr>
+          <p:cNvPr id="256" name="Define helper functions"/>
+          <p:cNvSpPr txBox="1"/>
+          <p:nvPr>
+            <p:ph type="title"/>
+          </p:nvPr>
+        </p:nvSpPr>
+        <p:spPr>
+          <a:prstGeom prst="rect">
+            <a:avLst/>
+          </a:prstGeom>
+        </p:spPr>
+        <p:txBody>
+          <a:bodyPr/>
+          <a:lstStyle/>
+          <a:p>
+            <a:pPr/>
+            <a:r>
+              <a:t>Define helper functions</a:t>
+            </a:r>
+          </a:p>
+        </p:txBody>
+      </p:sp>
+      <p:sp>
+        <p:nvSpPr>
+          <p:cNvPr id="257" name="def pivotSummary(desc: DataFrame): DataFrame = {…"/>
+          <p:cNvSpPr txBox="1"/>
+          <p:nvPr/>
+        </p:nvSpPr>
+        <p:spPr>
+          <a:xfrm>
+            <a:off x="1436285" y="1740169"/>
+            <a:ext cx="6271430" cy="2047241"/>
+          </a:xfrm>
+          <a:prstGeom prst="rect">
+            <a:avLst/>
+          </a:prstGeom>
+          <a:ln w="12700">
+            <a:miter lim="400000"/>
+          </a:ln>
+          <a:extLst>
+            <a:ext uri="{C572A759-6A51-4108-AA02-DFA0A04FC94B}">
+              <ma14:wrappingTextBoxFlag xmlns:ma14="http://schemas.microsoft.com/office/mac/drawingml/2011/main" val="1"/>
+            </a:ext>
+          </a:extLst>
+        </p:spPr>
+        <p:txBody>
+          <a:bodyPr wrap="none" lIns="45719" rIns="45719">
+            <a:spAutoFit/>
+          </a:bodyPr>
+          <a:lstStyle/>
+          <a:p>
+            <a:pPr/>
+            <a:r>
+              <a:t> def pivotSummary(desc: DataFrame): DataFrame = {</a:t>
+            </a:r>
+          </a:p>
+          <a:p>
+            <a:pPr/>
+            <a:r>
+              <a:t>    val lf = longForm(desc)</a:t>
+            </a:r>
+          </a:p>
+          <a:p>
+            <a:pPr/>
+            <a:r>
+              <a:t>    lf.groupBy("field").</a:t>
+            </a:r>
+          </a:p>
+          <a:p>
+            <a:pPr/>
+            <a:r>
+              <a:t>      pivot("metric", Seq("count", "mean", "stddev", "min", "max")).</a:t>
+            </a:r>
+          </a:p>
+          <a:p>
+            <a:pPr/>
+            <a:r>
+              <a:t>      agg(first("value"))</a:t>
+            </a:r>
+          </a:p>
+          <a:p>
+            <a:pPr/>
+            <a:r>
+              <a:t>  }</a:t>
+            </a:r>
+          </a:p>
+        </p:txBody>
+      </p:sp>
+    </p:spTree>
+  </p:cSld>
+  <p:clrMapOvr>
+    <a:masterClrMapping/>
+  </p:clrMapOvr>
+  <p:transition xmlns:p14="http://schemas.microsoft.com/office/powerpoint/2010/main" spd="med" advClick="1"/>
+</p:sld>
+</file>
+
+<file path=ppt/slides/slide22.xml><?xml version="1.0" encoding="utf-8"?>
+<p:sld xmlns:a="http://schemas.openxmlformats.org/drawingml/2006/main" xmlns:r="http://schemas.openxmlformats.org/officeDocument/2006/relationships" xmlns:p="http://schemas.openxmlformats.org/presentationml/2006/main" showMasterSp="1" showMasterPhAnim="1">
+  <p:cSld>
+    <p:spTree>
+      <p:nvGrpSpPr>
+        <p:cNvPr id="1" name=""/>
+        <p:cNvGrpSpPr/>
+        <p:nvPr/>
+      </p:nvGrpSpPr>
+      <p:grpSpPr>
+        <a:xfrm>
+          <a:off x="0" y="0"/>
+          <a:ext cx="0" cy="0"/>
+          <a:chOff x="0" y="0"/>
+          <a:chExt cx="0" cy="0"/>
+        </a:xfrm>
+      </p:grpSpPr>
+      <p:sp>
+        <p:nvSpPr>
+          <p:cNvPr id="259" name="Define helper functions"/>
+          <p:cNvSpPr txBox="1"/>
+          <p:nvPr>
+            <p:ph type="title"/>
+          </p:nvPr>
+        </p:nvSpPr>
+        <p:spPr>
+          <a:prstGeom prst="rect">
+            <a:avLst/>
+          </a:prstGeom>
+        </p:spPr>
+        <p:txBody>
+          <a:bodyPr/>
+          <a:lstStyle/>
+          <a:p>
+            <a:pPr/>
+            <a:r>
+              <a:t>Define helper functions</a:t>
+            </a:r>
+          </a:p>
+        </p:txBody>
+      </p:sp>
+      <p:sp>
+        <p:nvSpPr>
+          <p:cNvPr id="260" name="def crossTabs(scored: DataFrame, t: Double): DataFrame = {…"/>
+          <p:cNvSpPr txBox="1"/>
+          <p:nvPr/>
+        </p:nvSpPr>
+        <p:spPr>
+          <a:xfrm>
+            <a:off x="1663769" y="1156615"/>
+            <a:ext cx="5816462" cy="5400041"/>
+          </a:xfrm>
+          <a:prstGeom prst="rect">
+            <a:avLst/>
+          </a:prstGeom>
+          <a:ln w="12700">
+            <a:miter lim="400000"/>
+          </a:ln>
+          <a:extLst>
+            <a:ext uri="{C572A759-6A51-4108-AA02-DFA0A04FC94B}">
+              <ma14:wrappingTextBoxFlag xmlns:ma14="http://schemas.microsoft.com/office/mac/drawingml/2011/main" val="1"/>
+            </a:ext>
+          </a:extLst>
+        </p:spPr>
+        <p:txBody>
+          <a:bodyPr wrap="none" lIns="45719" rIns="45719">
+            <a:spAutoFit/>
+          </a:bodyPr>
+          <a:lstStyle/>
+          <a:p>
+            <a:pPr/>
+            <a:r>
+              <a:t>   def crossTabs(scored: DataFrame, t: Double): DataFrame = {</a:t>
+            </a:r>
+          </a:p>
+          <a:p>
+            <a:pPr/>
+            <a:r>
+              <a:t>    scored.</a:t>
+            </a:r>
+          </a:p>
+          <a:p>
+            <a:pPr/>
+            <a:r>
+              <a:t>      selectExpr(s"score &gt;= $t as above", "is_match").</a:t>
+            </a:r>
+          </a:p>
+          <a:p>
+            <a:pPr/>
+            <a:r>
+              <a:t>      groupBy("above").</a:t>
+            </a:r>
+          </a:p>
+          <a:p>
+            <a:pPr/>
+            <a:r>
+              <a:t>      pivot("is_match", Seq("true", "false")).</a:t>
+            </a:r>
+          </a:p>
+          <a:p>
+            <a:pPr/>
+            <a:r>
+              <a:t>      count()</a:t>
+            </a:r>
+          </a:p>
+          <a:p>
+            <a:pPr/>
+            <a:r>
+              <a:t>  }</a:t>
+            </a:r>
+          </a:p>
+          <a:p>
+            <a:pPr/>
+          </a:p>
+          <a:p>
+            <a:pPr/>
+            <a:r>
+              <a:t>  case class Score(value: Double) {</a:t>
+            </a:r>
+          </a:p>
+          <a:p>
+            <a:pPr/>
+            <a:r>
+              <a:t>    def +(oi: Option[Int]) = {</a:t>
+            </a:r>
+          </a:p>
+          <a:p>
+            <a:pPr/>
+            <a:r>
+              <a:t>      Score(value + oi.getOrElse(0))</a:t>
+            </a:r>
+          </a:p>
+          <a:p>
+            <a:pPr/>
+            <a:r>
+              <a:t>    }</a:t>
+            </a:r>
+          </a:p>
+          <a:p>
+            <a:pPr/>
+            <a:r>
+              <a:t>  }</a:t>
+            </a:r>
+          </a:p>
+          <a:p>
+            <a:pPr/>
+          </a:p>
+          <a:p>
+            <a:pPr/>
+            <a:r>
+              <a:t>  def scoreMatchData(md: MatchData): Double = {</a:t>
+            </a:r>
+          </a:p>
+          <a:p>
+            <a:pPr/>
+            <a:r>
+              <a:t>    (Score(md.cmp_lname_c1.getOrElse(0.0)) + md.cmp_plz +</a:t>
+            </a:r>
+          </a:p>
+          <a:p>
+            <a:pPr/>
+            <a:r>
+              <a:t>        md.cmp_by + md.cmp_bd + md.cmp_bm).value</a:t>
+            </a:r>
+          </a:p>
+          <a:p>
+            <a:pPr/>
+            <a:r>
+              <a:t>  }</a:t>
+            </a:r>
+          </a:p>
+        </p:txBody>
+      </p:sp>
+    </p:spTree>
+  </p:cSld>
+  <p:clrMapOvr>
+    <a:masterClrMapping/>
+  </p:clrMapOvr>
+  <p:transition xmlns:p14="http://schemas.microsoft.com/office/powerpoint/2010/main" spd="med" advClick="1"/>
+</p:sld>
+</file>
+
+<file path=ppt/slides/slide23.xml><?xml version="1.0" encoding="utf-8"?>
+<p:sld xmlns:a="http://schemas.openxmlformats.org/drawingml/2006/main" xmlns:r="http://schemas.openxmlformats.org/officeDocument/2006/relationships" xmlns:p="http://schemas.openxmlformats.org/presentationml/2006/main" showMasterSp="1" showMasterPhAnim="1">
+  <p:cSld>
+    <p:spTree>
+      <p:nvGrpSpPr>
+        <p:cNvPr id="1" name=""/>
+        <p:cNvGrpSpPr/>
+        <p:nvPr/>
+      </p:nvGrpSpPr>
+      <p:grpSpPr>
+        <a:xfrm>
+          <a:off x="0" y="0"/>
+          <a:ext cx="0" cy="0"/>
+          <a:chOff x="0" y="0"/>
+          <a:chExt cx="0" cy="0"/>
+        </a:xfrm>
+      </p:grpSpPr>
+      <p:sp>
+        <p:nvSpPr>
+          <p:cNvPr id="262" name="Use the helper functions"/>
+          <p:cNvSpPr txBox="1"/>
+          <p:nvPr>
+            <p:ph type="title"/>
+          </p:nvPr>
+        </p:nvSpPr>
+        <p:spPr>
+          <a:prstGeom prst="rect">
+            <a:avLst/>
+          </a:prstGeom>
+        </p:spPr>
+        <p:txBody>
+          <a:bodyPr/>
+          <a:lstStyle/>
+          <a:p>
+            <a:pPr/>
+            <a:r>
+              <a:t>Use the helper functions</a:t>
+            </a:r>
+          </a:p>
+        </p:txBody>
+      </p:sp>
+      <p:sp>
+        <p:nvSpPr>
+          <p:cNvPr id="263" name="val matchSummaryT = pivotSummary(matchSummary)…"/>
+          <p:cNvSpPr txBox="1"/>
+          <p:nvPr/>
+        </p:nvSpPr>
+        <p:spPr>
+          <a:xfrm>
+            <a:off x="1356085" y="1476608"/>
+            <a:ext cx="6431830" cy="2606041"/>
+          </a:xfrm>
+          <a:prstGeom prst="rect">
+            <a:avLst/>
+          </a:prstGeom>
+          <a:ln w="12700">
+            <a:miter lim="400000"/>
+          </a:ln>
+          <a:extLst>
+            <a:ext uri="{C572A759-6A51-4108-AA02-DFA0A04FC94B}">
+              <ma14:wrappingTextBoxFlag xmlns:ma14="http://schemas.microsoft.com/office/mac/drawingml/2011/main" val="1"/>
+            </a:ext>
+          </a:extLst>
+        </p:spPr>
+        <p:txBody>
+          <a:bodyPr wrap="none" lIns="45719" rIns="45719">
+            <a:spAutoFit/>
+          </a:bodyPr>
+          <a:lstStyle/>
+          <a:p>
+            <a:pPr/>
+            <a:r>
+              <a:t>    val matchSummaryT = pivotSummary(matchSummary)</a:t>
+            </a:r>
+          </a:p>
+          <a:p>
+            <a:pPr/>
+            <a:r>
+              <a:t>    val missSummaryT = pivotSummary(missSummary)</a:t>
+            </a:r>
+          </a:p>
+          <a:p>
+            <a:pPr/>
+            <a:r>
+              <a:t>    matchSummaryT.createOrReplaceTempView("match_desc")</a:t>
+            </a:r>
+          </a:p>
+          <a:p>
+            <a:pPr/>
+            <a:r>
+              <a:t>    missSummaryT.createOrReplaceTempView("miss_desc")</a:t>
+            </a:r>
+          </a:p>
+          <a:p>
+            <a:pPr/>
+            <a:r>
+              <a:t>    spark.sql("""</a:t>
+            </a:r>
+          </a:p>
+          <a:p>
+            <a:pPr/>
+            <a:r>
+              <a:t>      SELECT a.field, a.count + b.count total, a.mean - b.mean delta</a:t>
+            </a:r>
+          </a:p>
+          <a:p>
+            <a:pPr/>
+            <a:r>
+              <a:t>      FROM match_desc a INNER JOIN miss_desc b ON a.field = b.field</a:t>
+            </a:r>
+          </a:p>
+          <a:p>
+            <a:pPr/>
+            <a:r>
+              <a:t>      ORDER BY delta DESC, total DESC</a:t>
+            </a:r>
+          </a:p>
+          <a:p>
+            <a:pPr/>
+            <a:r>
+              <a:t>    """).show()</a:t>
+            </a:r>
+          </a:p>
+        </p:txBody>
+      </p:sp>
+    </p:spTree>
+  </p:cSld>
+  <p:clrMapOvr>
+    <a:masterClrMapping/>
+  </p:clrMapOvr>
+  <p:transition xmlns:p14="http://schemas.microsoft.com/office/powerpoint/2010/main" spd="med" advClick="1"/>
+</p:sld>
+</file>
+
+<file path=ppt/slides/slide24.xml><?xml version="1.0" encoding="utf-8"?>
+<p:sld xmlns:a="http://schemas.openxmlformats.org/drawingml/2006/main" xmlns:r="http://schemas.openxmlformats.org/officeDocument/2006/relationships" xmlns:p="http://schemas.openxmlformats.org/presentationml/2006/main" showMasterSp="1" showMasterPhAnim="1">
+  <p:cSld>
+    <p:spTree>
+      <p:nvGrpSpPr>
+        <p:cNvPr id="1" name=""/>
+        <p:cNvGrpSpPr/>
+        <p:nvPr/>
+      </p:nvGrpSpPr>
+      <p:grpSpPr>
+        <a:xfrm>
+          <a:off x="0" y="0"/>
+          <a:ext cx="0" cy="0"/>
+          <a:chOff x="0" y="0"/>
+          <a:chExt cx="0" cy="0"/>
+        </a:xfrm>
+      </p:grpSpPr>
+      <p:sp>
+        <p:nvSpPr>
+          <p:cNvPr id="265" name="Results of the helper functions"/>
+          <p:cNvSpPr txBox="1"/>
+          <p:nvPr>
+            <p:ph type="title"/>
+          </p:nvPr>
+        </p:nvSpPr>
+        <p:spPr>
+          <a:prstGeom prst="rect">
+            <a:avLst/>
+          </a:prstGeom>
+        </p:spPr>
+        <p:txBody>
+          <a:bodyPr/>
+          <a:lstStyle/>
+          <a:p>
+            <a:pPr/>
+            <a:r>
+              <a:t>Results of the helper functions</a:t>
+            </a:r>
+          </a:p>
+        </p:txBody>
+      </p:sp>
+      <p:sp>
+        <p:nvSpPr>
+          <p:cNvPr id="266" name="matchSummaryT: org.apache.spark.sql.DataFrame = [field: string, count: double ... 4 more fields]…"/>
+          <p:cNvSpPr txBox="1"/>
+          <p:nvPr/>
+        </p:nvSpPr>
+        <p:spPr>
+          <a:xfrm>
+            <a:off x="844608" y="1940962"/>
+            <a:ext cx="8975264" cy="3736316"/>
+          </a:xfrm>
+          <a:prstGeom prst="rect">
+            <a:avLst/>
+          </a:prstGeom>
+          <a:ln w="12700">
+            <a:miter lim="400000"/>
+          </a:ln>
+          <a:extLst>
+            <a:ext uri="{C572A759-6A51-4108-AA02-DFA0A04FC94B}">
+              <ma14:wrappingTextBoxFlag xmlns:ma14="http://schemas.microsoft.com/office/mac/drawingml/2011/main" val="1"/>
+            </a:ext>
+          </a:extLst>
+        </p:spPr>
+        <p:txBody>
+          <a:bodyPr wrap="none" lIns="45719" rIns="45719">
+            <a:spAutoFit/>
+          </a:bodyPr>
+          <a:lstStyle/>
+          <a:p>
+            <a:pPr defTabSz="457200">
+              <a:lnSpc>
+                <a:spcPts val="3000"/>
+              </a:lnSpc>
+              <a:defRPr sz="1200">
+                <a:solidFill>
+                  <a:srgbClr val="212121"/>
+                </a:solidFill>
+                <a:latin typeface="Monaco"/>
+                <a:ea typeface="Monaco"/>
+                <a:cs typeface="Monaco"/>
+                <a:sym typeface="Monaco"/>
+              </a:defRPr>
+            </a:pPr>
+            <a:r>
+              <a:t>matchSummaryT: org.apache.spark.sql.DataFrame = [field: string, count: double ... 4 more fields]</a:t>
+            </a:r>
+          </a:p>
+          <a:p>
+            <a:pPr defTabSz="457200">
+              <a:lnSpc>
+                <a:spcPts val="3000"/>
+              </a:lnSpc>
+              <a:defRPr sz="1200">
+                <a:solidFill>
+                  <a:srgbClr val="212121"/>
+                </a:solidFill>
+                <a:latin typeface="Monaco"/>
+                <a:ea typeface="Monaco"/>
+                <a:cs typeface="Monaco"/>
+                <a:sym typeface="Monaco"/>
+              </a:defRPr>
+            </a:pPr>
+            <a:r>
+              <a:t>missSummaryT: org.apache.spark.sql.DataFrame = [field: string, count: double ... 4 more fields]</a:t>
+            </a:r>
+          </a:p>
+          <a:p>
+            <a:pPr defTabSz="457200">
+              <a:lnSpc>
+                <a:spcPts val="3000"/>
+              </a:lnSpc>
+              <a:defRPr sz="1200">
+                <a:solidFill>
+                  <a:srgbClr val="212121"/>
+                </a:solidFill>
+                <a:latin typeface="Monaco"/>
+                <a:ea typeface="Monaco"/>
+                <a:cs typeface="Monaco"/>
+                <a:sym typeface="Monaco"/>
+              </a:defRPr>
+            </a:pPr>
+            <a:r>
+              <a:t>+------------+---------+--------------------+</a:t>
+            </a:r>
+          </a:p>
+          <a:p>
+            <a:pPr defTabSz="457200">
+              <a:lnSpc>
+                <a:spcPts val="3000"/>
+              </a:lnSpc>
+              <a:defRPr sz="1200">
+                <a:solidFill>
+                  <a:srgbClr val="212121"/>
+                </a:solidFill>
+                <a:latin typeface="Monaco"/>
+                <a:ea typeface="Monaco"/>
+                <a:cs typeface="Monaco"/>
+                <a:sym typeface="Monaco"/>
+              </a:defRPr>
+            </a:pPr>
+            <a:r>
+              <a:t>|       field|    total|               delta|</a:t>
+            </a:r>
+          </a:p>
+          <a:p>
+            <a:pPr defTabSz="457200">
+              <a:lnSpc>
+                <a:spcPts val="3000"/>
+              </a:lnSpc>
+              <a:defRPr sz="1200">
+                <a:solidFill>
+                  <a:srgbClr val="212121"/>
+                </a:solidFill>
+                <a:latin typeface="Monaco"/>
+                <a:ea typeface="Monaco"/>
+                <a:cs typeface="Monaco"/>
+                <a:sym typeface="Monaco"/>
+              </a:defRPr>
+            </a:pPr>
+            <a:r>
+              <a:t>+------------+---------+--------------------+</a:t>
+            </a:r>
+          </a:p>
+          <a:p>
+            <a:pPr defTabSz="457200">
+              <a:lnSpc>
+                <a:spcPts val="3000"/>
+              </a:lnSpc>
+              <a:defRPr sz="1200">
+                <a:solidFill>
+                  <a:srgbClr val="212121"/>
+                </a:solidFill>
+                <a:latin typeface="Monaco"/>
+                <a:ea typeface="Monaco"/>
+                <a:cs typeface="Monaco"/>
+                <a:sym typeface="Monaco"/>
+              </a:defRPr>
+            </a:pPr>
+            <a:r>
+              <a:t>|        id_1|5749132.0|  1255.8076310367542|</a:t>
+            </a:r>
+          </a:p>
+          <a:p>
+            <a:pPr defTabSz="457200">
+              <a:lnSpc>
+                <a:spcPts val="3000"/>
+              </a:lnSpc>
+              <a:defRPr sz="1200">
+                <a:solidFill>
+                  <a:srgbClr val="212121"/>
+                </a:solidFill>
+                <a:latin typeface="Monaco"/>
+                <a:ea typeface="Monaco"/>
+                <a:cs typeface="Monaco"/>
+                <a:sym typeface="Monaco"/>
+              </a:defRPr>
+            </a:pPr>
+            <a:r>
+              <a:t>|     cmp_plz|5736289.0|  0.9563812499852176|</a:t>
+            </a:r>
+          </a:p>
+          <a:p>
+            <a:pPr defTabSz="457200">
+              <a:lnSpc>
+                <a:spcPts val="3000"/>
+              </a:lnSpc>
+              <a:defRPr sz="1200">
+                <a:solidFill>
+                  <a:srgbClr val="212121"/>
+                </a:solidFill>
+                <a:latin typeface="Monaco"/>
+                <a:ea typeface="Monaco"/>
+                <a:cs typeface="Monaco"/>
+                <a:sym typeface="Monaco"/>
+              </a:defRPr>
+            </a:pPr>
+            <a:r>
+              <a:t>|cmp_lname_c2|   2464.0|  0.8064147192926264|</a:t>
+            </a:r>
+          </a:p>
+          <a:p>
+            <a:pPr defTabSz="457200">
+              <a:lnSpc>
+                <a:spcPts val="3000"/>
+              </a:lnSpc>
+              <a:defRPr sz="1200">
+                <a:solidFill>
+                  <a:srgbClr val="212121"/>
+                </a:solidFill>
+                <a:latin typeface="Monaco"/>
+                <a:ea typeface="Monaco"/>
+                <a:cs typeface="Monaco"/>
+                <a:sym typeface="Monaco"/>
+              </a:defRPr>
+            </a:pPr>
+            <a:r>
+              <a:t>|      cmp_by|5748337.0|  0.7762059675300512|</a:t>
+            </a:r>
+          </a:p>
+          <a:p>
+            <a:pPr defTabSz="457200">
+              <a:lnSpc>
+                <a:spcPts val="3000"/>
+              </a:lnSpc>
+              <a:defRPr sz="1200">
+                <a:solidFill>
+                  <a:srgbClr val="212121"/>
+                </a:solidFill>
+                <a:latin typeface="Monaco"/>
+                <a:ea typeface="Monaco"/>
+                <a:cs typeface="Monaco"/>
+                <a:sym typeface="Monaco"/>
+              </a:defRPr>
+            </a:pPr>
+            <a:r>
+              <a:t>|      cmp_bd|5748337.0|   0.775442311783404|</a:t>
+            </a:r>
+          </a:p>
+          <a:p>
+            <a:pPr defTabSz="457200">
+              <a:lnSpc>
+                <a:spcPts val="3000"/>
+              </a:lnSpc>
+              <a:defRPr sz="1200">
+                <a:solidFill>
+                  <a:srgbClr val="212121"/>
+                </a:solidFill>
+                <a:latin typeface="Monaco"/>
+                <a:ea typeface="Monaco"/>
+                <a:cs typeface="Monaco"/>
+                <a:sym typeface="Monaco"/>
+              </a:defRPr>
+            </a:pPr>
+            <a:r>
+              <a:t>|cmp_lname_c1|5749132.0|  0.6838772482590526|</a:t>
+            </a:r>
+          </a:p>
+          <a:p>
+            <a:pPr defTabSz="457200">
+              <a:lnSpc>
+                <a:spcPts val="3000"/>
+              </a:lnSpc>
+              <a:defRPr sz="1200">
+                <a:solidFill>
+                  <a:srgbClr val="212121"/>
+                </a:solidFill>
+                <a:latin typeface="Monaco"/>
+                <a:ea typeface="Monaco"/>
+                <a:cs typeface="Monaco"/>
+                <a:sym typeface="Monaco"/>
+              </a:defRPr>
+            </a:pPr>
+            <a:r>
+              <a:t>|      cmp_bm|5748337.0|  0.5109496938298685|</a:t>
+            </a:r>
+          </a:p>
+          <a:p>
+            <a:pPr defTabSz="457200">
+              <a:lnSpc>
+                <a:spcPts val="3000"/>
+              </a:lnSpc>
+              <a:defRPr sz="1200">
+                <a:solidFill>
+                  <a:srgbClr val="212121"/>
+                </a:solidFill>
+                <a:latin typeface="Monaco"/>
+                <a:ea typeface="Monaco"/>
+                <a:cs typeface="Monaco"/>
+                <a:sym typeface="Monaco"/>
+              </a:defRPr>
+            </a:pPr>
+            <a:r>
+              <a:t>|cmp_fname_c1|5748125.0|  0.2854529057460786|</a:t>
+            </a:r>
+          </a:p>
+          <a:p>
+            <a:pPr defTabSz="457200">
+              <a:lnSpc>
+                <a:spcPts val="3000"/>
+              </a:lnSpc>
+              <a:defRPr sz="1200">
+                <a:solidFill>
+                  <a:srgbClr val="212121"/>
+                </a:solidFill>
+                <a:latin typeface="Monaco"/>
+                <a:ea typeface="Monaco"/>
+                <a:cs typeface="Monaco"/>
+                <a:sym typeface="Monaco"/>
+              </a:defRPr>
+            </a:pPr>
+            <a:r>
+              <a:t>|cmp_fname_c2| 103698.0| 0.09104268062280008|</a:t>
+            </a:r>
+          </a:p>
+          <a:p>
+            <a:pPr defTabSz="457200">
+              <a:lnSpc>
+                <a:spcPts val="3000"/>
+              </a:lnSpc>
+              <a:defRPr sz="1200">
+                <a:solidFill>
+                  <a:srgbClr val="212121"/>
+                </a:solidFill>
+                <a:latin typeface="Monaco"/>
+                <a:ea typeface="Monaco"/>
+                <a:cs typeface="Monaco"/>
+                <a:sym typeface="Monaco"/>
+              </a:defRPr>
+            </a:pPr>
+            <a:r>
+              <a:t>|     cmp_sex|5749132.0|0.032408185250332844|</a:t>
+            </a:r>
+          </a:p>
+          <a:p>
+            <a:pPr defTabSz="457200">
+              <a:lnSpc>
+                <a:spcPts val="3000"/>
+              </a:lnSpc>
+              <a:defRPr sz="1200">
+                <a:solidFill>
+                  <a:srgbClr val="212121"/>
+                </a:solidFill>
+                <a:latin typeface="Monaco"/>
+                <a:ea typeface="Monaco"/>
+                <a:cs typeface="Monaco"/>
+                <a:sym typeface="Monaco"/>
+              </a:defRPr>
+            </a:pPr>
+            <a:r>
+              <a:t>|        id_2|5749132.0| -15383.483201807663|</a:t>
+            </a:r>
+          </a:p>
+          <a:p>
+            <a:pPr defTabSz="457200">
+              <a:lnSpc>
+                <a:spcPts val="3000"/>
+              </a:lnSpc>
+              <a:defRPr sz="1200">
+                <a:solidFill>
+                  <a:srgbClr val="212121"/>
+                </a:solidFill>
+                <a:latin typeface="Monaco"/>
+                <a:ea typeface="Monaco"/>
+                <a:cs typeface="Monaco"/>
+                <a:sym typeface="Monaco"/>
+              </a:defRPr>
+            </a:pPr>
+            <a:r>
+              <a:t>+------------+---------+--------------------+</a:t>
+            </a:r>
+          </a:p>
+        </p:txBody>
+      </p:sp>
+    </p:spTree>
+  </p:cSld>
+  <p:clrMapOvr>
+    <a:masterClrMapping/>
+  </p:clrMapOvr>
+  <p:transition xmlns:p14="http://schemas.microsoft.com/office/powerpoint/2010/main" spd="med" advClick="1"/>
+</p:sld>
+</file>
+
+<file path=ppt/slides/slide25.xml><?xml version="1.0" encoding="utf-8"?>
+<p:sld xmlns:a="http://schemas.openxmlformats.org/drawingml/2006/main" xmlns:r="http://schemas.openxmlformats.org/officeDocument/2006/relationships" xmlns:p="http://schemas.openxmlformats.org/presentationml/2006/main" showMasterSp="1" showMasterPhAnim="1">
+  <p:cSld>
+    <p:spTree>
+      <p:nvGrpSpPr>
+        <p:cNvPr id="1" name=""/>
+        <p:cNvGrpSpPr/>
+        <p:nvPr/>
+      </p:nvGrpSpPr>
+      <p:grpSpPr>
+        <a:xfrm>
+          <a:off x="0" y="0"/>
+          <a:ext cx="0" cy="0"/>
+          <a:chOff x="0" y="0"/>
+          <a:chExt cx="0" cy="0"/>
+        </a:xfrm>
+      </p:grpSpPr>
+      <p:sp>
+        <p:nvSpPr>
+          <p:cNvPr id="268" name="Final result"/>
+          <p:cNvSpPr txBox="1"/>
+          <p:nvPr>
+            <p:ph type="title"/>
+          </p:nvPr>
+        </p:nvSpPr>
+        <p:spPr>
+          <a:prstGeom prst="rect">
+            <a:avLst/>
+          </a:prstGeom>
+        </p:spPr>
+        <p:txBody>
+          <a:bodyPr/>
+          <a:lstStyle/>
+          <a:p>
+            <a:pPr/>
+            <a:r>
+              <a:t>Final result</a:t>
+            </a:r>
+          </a:p>
+        </p:txBody>
+      </p:sp>
+      <p:sp>
+        <p:nvSpPr>
+          <p:cNvPr id="269" name="val matchData = parsed.as[MatchData]…"/>
+          <p:cNvSpPr txBox="1"/>
+          <p:nvPr/>
+        </p:nvSpPr>
+        <p:spPr>
+          <a:xfrm>
+            <a:off x="2594354" y="1626456"/>
+            <a:ext cx="3955292" cy="1767841"/>
+          </a:xfrm>
+          <a:prstGeom prst="rect">
+            <a:avLst/>
+          </a:prstGeom>
+          <a:ln w="12700">
+            <a:miter lim="400000"/>
+          </a:ln>
+          <a:extLst>
+            <a:ext uri="{C572A759-6A51-4108-AA02-DFA0A04FC94B}">
+              <ma14:wrappingTextBoxFlag xmlns:ma14="http://schemas.microsoft.com/office/mac/drawingml/2011/main" val="1"/>
+            </a:ext>
+          </a:extLst>
+        </p:spPr>
+        <p:txBody>
+          <a:bodyPr wrap="none" lIns="45719" rIns="45719">
+            <a:spAutoFit/>
+          </a:bodyPr>
+          <a:lstStyle/>
+          <a:p>
+            <a:pPr/>
+            <a:r>
+              <a:t>    val matchData = parsed.as[MatchData]</a:t>
+            </a:r>
+          </a:p>
+          <a:p>
+            <a:pPr/>
+            <a:r>
+              <a:t>    val scored = matchData.map { md =&gt;</a:t>
+            </a:r>
+          </a:p>
+          <a:p>
+            <a:pPr/>
+            <a:r>
+              <a:t>      (scoreMatchData(md), md.is_match)</a:t>
+            </a:r>
+          </a:p>
+          <a:p>
+            <a:pPr/>
+            <a:r>
+              <a:t>    }.toDF("score", "is_match")</a:t>
+            </a:r>
+          </a:p>
+          <a:p>
+            <a:pPr/>
+            <a:r>
+              <a:t>    crossTabs(scored, 4.0).show()</a:t>
+            </a:r>
+          </a:p>
+        </p:txBody>
+      </p:sp>
+      <p:sp>
+        <p:nvSpPr>
+          <p:cNvPr id="270" name="matchData: org.apache.spark.sql.Dataset[MatchData] = [id_1: int, id_2: int ... 10 more fields]…"/>
+          <p:cNvSpPr txBox="1"/>
+          <p:nvPr/>
+        </p:nvSpPr>
+        <p:spPr>
+          <a:xfrm>
+            <a:off x="2028908" y="3603114"/>
+            <a:ext cx="8792355" cy="1907517"/>
+          </a:xfrm>
+          <a:prstGeom prst="rect">
+            <a:avLst/>
+          </a:prstGeom>
+          <a:ln w="12700">
+            <a:miter lim="400000"/>
+          </a:ln>
+          <a:extLst>
+            <a:ext uri="{C572A759-6A51-4108-AA02-DFA0A04FC94B}">
+              <ma14:wrappingTextBoxFlag xmlns:ma14="http://schemas.microsoft.com/office/mac/drawingml/2011/main" val="1"/>
+            </a:ext>
+          </a:extLst>
+        </p:spPr>
+        <p:txBody>
+          <a:bodyPr wrap="none" lIns="45719" rIns="45719">
+            <a:spAutoFit/>
+          </a:bodyPr>
+          <a:lstStyle/>
+          <a:p>
+            <a:pPr defTabSz="457200">
+              <a:lnSpc>
+                <a:spcPts val="3000"/>
+              </a:lnSpc>
+              <a:defRPr sz="1200">
+                <a:solidFill>
+                  <a:srgbClr val="212121"/>
+                </a:solidFill>
+                <a:latin typeface="Monaco"/>
+                <a:ea typeface="Monaco"/>
+                <a:cs typeface="Monaco"/>
+                <a:sym typeface="Monaco"/>
+              </a:defRPr>
+            </a:pPr>
+            <a:r>
+              <a:t>matchData: org.apache.spark.sql.Dataset[MatchData] = [id_1: int, id_2: int ... 10 more fields]</a:t>
+            </a:r>
+          </a:p>
+          <a:p>
+            <a:pPr defTabSz="457200">
+              <a:lnSpc>
+                <a:spcPts val="3000"/>
+              </a:lnSpc>
+              <a:defRPr sz="1200">
+                <a:solidFill>
+                  <a:srgbClr val="212121"/>
+                </a:solidFill>
+                <a:latin typeface="Monaco"/>
+                <a:ea typeface="Monaco"/>
+                <a:cs typeface="Monaco"/>
+                <a:sym typeface="Monaco"/>
+              </a:defRPr>
+            </a:pPr>
+            <a:r>
+              <a:t>scored: org.apache.spark.sql.DataFrame = [score: double, is_match: boolean]</a:t>
+            </a:r>
+          </a:p>
+          <a:p>
+            <a:pPr defTabSz="457200">
+              <a:lnSpc>
+                <a:spcPts val="3000"/>
+              </a:lnSpc>
+              <a:defRPr sz="1200">
+                <a:solidFill>
+                  <a:srgbClr val="212121"/>
+                </a:solidFill>
+                <a:latin typeface="Monaco"/>
+                <a:ea typeface="Monaco"/>
+                <a:cs typeface="Monaco"/>
+                <a:sym typeface="Monaco"/>
+              </a:defRPr>
+            </a:pPr>
+            <a:r>
+              <a:t>+-----+-----+-------+</a:t>
+            </a:r>
+          </a:p>
+          <a:p>
+            <a:pPr defTabSz="457200">
+              <a:lnSpc>
+                <a:spcPts val="3000"/>
+              </a:lnSpc>
+              <a:defRPr sz="1200">
+                <a:solidFill>
+                  <a:srgbClr val="212121"/>
+                </a:solidFill>
+                <a:latin typeface="Monaco"/>
+                <a:ea typeface="Monaco"/>
+                <a:cs typeface="Monaco"/>
+                <a:sym typeface="Monaco"/>
+              </a:defRPr>
+            </a:pPr>
+            <a:r>
+              <a:t>|above| true|  false|</a:t>
+            </a:r>
+          </a:p>
+          <a:p>
+            <a:pPr defTabSz="457200">
+              <a:lnSpc>
+                <a:spcPts val="3000"/>
+              </a:lnSpc>
+              <a:defRPr sz="1200">
+                <a:solidFill>
+                  <a:srgbClr val="212121"/>
+                </a:solidFill>
+                <a:latin typeface="Monaco"/>
+                <a:ea typeface="Monaco"/>
+                <a:cs typeface="Monaco"/>
+                <a:sym typeface="Monaco"/>
+              </a:defRPr>
+            </a:pPr>
+            <a:r>
+              <a:t>+-----+-----+-------+</a:t>
+            </a:r>
+          </a:p>
+          <a:p>
+            <a:pPr defTabSz="457200">
+              <a:lnSpc>
+                <a:spcPts val="3000"/>
+              </a:lnSpc>
+              <a:defRPr sz="1200">
+                <a:solidFill>
+                  <a:srgbClr val="212121"/>
+                </a:solidFill>
+                <a:latin typeface="Monaco"/>
+                <a:ea typeface="Monaco"/>
+                <a:cs typeface="Monaco"/>
+                <a:sym typeface="Monaco"/>
+              </a:defRPr>
+            </a:pPr>
+            <a:r>
+              <a:t>| true|20871|    637|</a:t>
+            </a:r>
+          </a:p>
+          <a:p>
+            <a:pPr defTabSz="457200">
+              <a:lnSpc>
+                <a:spcPts val="3000"/>
+              </a:lnSpc>
+              <a:defRPr sz="1200">
+                <a:solidFill>
+                  <a:srgbClr val="212121"/>
+                </a:solidFill>
+                <a:latin typeface="Monaco"/>
+                <a:ea typeface="Monaco"/>
+                <a:cs typeface="Monaco"/>
+                <a:sym typeface="Monaco"/>
+              </a:defRPr>
+            </a:pPr>
+            <a:r>
+              <a:t>|false|   60|5727564|</a:t>
+            </a:r>
+          </a:p>
+          <a:p>
+            <a:pPr defTabSz="457200">
+              <a:lnSpc>
+                <a:spcPts val="3000"/>
+              </a:lnSpc>
+              <a:defRPr sz="1200">
+                <a:solidFill>
+                  <a:srgbClr val="212121"/>
+                </a:solidFill>
+                <a:latin typeface="Monaco"/>
+                <a:ea typeface="Monaco"/>
+                <a:cs typeface="Monaco"/>
+                <a:sym typeface="Monaco"/>
+              </a:defRPr>
+            </a:pPr>
+            <a:r>
+              <a:t>+-----+-----+-------+</a:t>
             </a:r>
           </a:p>
         </p:txBody>

</xml_diff>

<commit_message>
Recover from interrupted commit
</commit_message>
<xml_diff>
--- a/powerpoints/ITU Academy Slides AM4-02.pptx
+++ b/powerpoints/ITU Academy Slides AM4-02.pptx
@@ -101,7 +101,7 @@
         <a:latin typeface="+mn-lt"/>
         <a:ea typeface="+mn-ea"/>
         <a:cs typeface="+mn-cs"/>
-        <a:sym typeface="Calibri"/>
+        <a:sym typeface="Arial"/>
       </a:defRPr>
     </a:lvl1pPr>
     <a:lvl2pPr marL="0" marR="0" indent="457200" algn="l" defTabSz="914400" rtl="0" fontAlgn="auto" latinLnBrk="0" hangingPunct="0">
@@ -131,7 +131,7 @@
         <a:latin typeface="+mn-lt"/>
         <a:ea typeface="+mn-ea"/>
         <a:cs typeface="+mn-cs"/>
-        <a:sym typeface="Calibri"/>
+        <a:sym typeface="Arial"/>
       </a:defRPr>
     </a:lvl2pPr>
     <a:lvl3pPr marL="0" marR="0" indent="914400" algn="l" defTabSz="914400" rtl="0" fontAlgn="auto" latinLnBrk="0" hangingPunct="0">
@@ -161,7 +161,7 @@
         <a:latin typeface="+mn-lt"/>
         <a:ea typeface="+mn-ea"/>
         <a:cs typeface="+mn-cs"/>
-        <a:sym typeface="Calibri"/>
+        <a:sym typeface="Arial"/>
       </a:defRPr>
     </a:lvl3pPr>
     <a:lvl4pPr marL="0" marR="0" indent="1371600" algn="l" defTabSz="914400" rtl="0" fontAlgn="auto" latinLnBrk="0" hangingPunct="0">
@@ -191,7 +191,7 @@
         <a:latin typeface="+mn-lt"/>
         <a:ea typeface="+mn-ea"/>
         <a:cs typeface="+mn-cs"/>
-        <a:sym typeface="Calibri"/>
+        <a:sym typeface="Arial"/>
       </a:defRPr>
     </a:lvl4pPr>
     <a:lvl5pPr marL="0" marR="0" indent="1828800" algn="l" defTabSz="914400" rtl="0" fontAlgn="auto" latinLnBrk="0" hangingPunct="0">
@@ -221,7 +221,7 @@
         <a:latin typeface="+mn-lt"/>
         <a:ea typeface="+mn-ea"/>
         <a:cs typeface="+mn-cs"/>
-        <a:sym typeface="Calibri"/>
+        <a:sym typeface="Arial"/>
       </a:defRPr>
     </a:lvl5pPr>
     <a:lvl6pPr marL="0" marR="0" indent="2286000" algn="l" defTabSz="914400" rtl="0" fontAlgn="auto" latinLnBrk="0" hangingPunct="0">
@@ -251,7 +251,7 @@
         <a:latin typeface="+mn-lt"/>
         <a:ea typeface="+mn-ea"/>
         <a:cs typeface="+mn-cs"/>
-        <a:sym typeface="Calibri"/>
+        <a:sym typeface="Arial"/>
       </a:defRPr>
     </a:lvl6pPr>
     <a:lvl7pPr marL="0" marR="0" indent="2743200" algn="l" defTabSz="914400" rtl="0" fontAlgn="auto" latinLnBrk="0" hangingPunct="0">
@@ -281,7 +281,7 @@
         <a:latin typeface="+mn-lt"/>
         <a:ea typeface="+mn-ea"/>
         <a:cs typeface="+mn-cs"/>
-        <a:sym typeface="Calibri"/>
+        <a:sym typeface="Arial"/>
       </a:defRPr>
     </a:lvl7pPr>
     <a:lvl8pPr marL="0" marR="0" indent="3200400" algn="l" defTabSz="914400" rtl="0" fontAlgn="auto" latinLnBrk="0" hangingPunct="0">
@@ -311,7 +311,7 @@
         <a:latin typeface="+mn-lt"/>
         <a:ea typeface="+mn-ea"/>
         <a:cs typeface="+mn-cs"/>
-        <a:sym typeface="Calibri"/>
+        <a:sym typeface="Arial"/>
       </a:defRPr>
     </a:lvl8pPr>
     <a:lvl9pPr marL="0" marR="0" indent="3657600" algn="l" defTabSz="914400" rtl="0" fontAlgn="auto" latinLnBrk="0" hangingPunct="0">
@@ -341,7 +341,7 @@
         <a:latin typeface="+mn-lt"/>
         <a:ea typeface="+mn-ea"/>
         <a:cs typeface="+mn-cs"/>
-        <a:sym typeface="Calibri"/>
+        <a:sym typeface="Arial"/>
       </a:defRPr>
     </a:lvl9pPr>
   </p:defaultTextStyle>
@@ -428,7 +428,7 @@
         <a:latin typeface="+mn-lt"/>
         <a:ea typeface="+mn-ea"/>
         <a:cs typeface="+mn-cs"/>
-        <a:sym typeface="Calibri"/>
+        <a:sym typeface="Arial"/>
       </a:defRPr>
     </a:lvl1pPr>
     <a:lvl2pPr indent="228600" latinLnBrk="0">
@@ -436,7 +436,7 @@
         <a:latin typeface="+mn-lt"/>
         <a:ea typeface="+mn-ea"/>
         <a:cs typeface="+mn-cs"/>
-        <a:sym typeface="Calibri"/>
+        <a:sym typeface="Arial"/>
       </a:defRPr>
     </a:lvl2pPr>
     <a:lvl3pPr indent="457200" latinLnBrk="0">
@@ -444,7 +444,7 @@
         <a:latin typeface="+mn-lt"/>
         <a:ea typeface="+mn-ea"/>
         <a:cs typeface="+mn-cs"/>
-        <a:sym typeface="Calibri"/>
+        <a:sym typeface="Arial"/>
       </a:defRPr>
     </a:lvl3pPr>
     <a:lvl4pPr indent="685800" latinLnBrk="0">
@@ -452,7 +452,7 @@
         <a:latin typeface="+mn-lt"/>
         <a:ea typeface="+mn-ea"/>
         <a:cs typeface="+mn-cs"/>
-        <a:sym typeface="Calibri"/>
+        <a:sym typeface="Arial"/>
       </a:defRPr>
     </a:lvl4pPr>
     <a:lvl5pPr indent="914400" latinLnBrk="0">
@@ -460,7 +460,7 @@
         <a:latin typeface="+mn-lt"/>
         <a:ea typeface="+mn-ea"/>
         <a:cs typeface="+mn-cs"/>
-        <a:sym typeface="Calibri"/>
+        <a:sym typeface="Arial"/>
       </a:defRPr>
     </a:lvl5pPr>
     <a:lvl6pPr indent="1143000" latinLnBrk="0">
@@ -468,7 +468,7 @@
         <a:latin typeface="+mn-lt"/>
         <a:ea typeface="+mn-ea"/>
         <a:cs typeface="+mn-cs"/>
-        <a:sym typeface="Calibri"/>
+        <a:sym typeface="Arial"/>
       </a:defRPr>
     </a:lvl6pPr>
     <a:lvl7pPr indent="1371600" latinLnBrk="0">
@@ -476,7 +476,7 @@
         <a:latin typeface="+mn-lt"/>
         <a:ea typeface="+mn-ea"/>
         <a:cs typeface="+mn-cs"/>
-        <a:sym typeface="Calibri"/>
+        <a:sym typeface="Arial"/>
       </a:defRPr>
     </a:lvl7pPr>
     <a:lvl8pPr indent="1600200" latinLnBrk="0">
@@ -484,7 +484,7 @@
         <a:latin typeface="+mn-lt"/>
         <a:ea typeface="+mn-ea"/>
         <a:cs typeface="+mn-cs"/>
-        <a:sym typeface="Calibri"/>
+        <a:sym typeface="Arial"/>
       </a:defRPr>
     </a:lvl8pPr>
     <a:lvl9pPr indent="1828800" latinLnBrk="0">
@@ -492,7 +492,7 @@
         <a:latin typeface="+mn-lt"/>
         <a:ea typeface="+mn-ea"/>
         <a:cs typeface="+mn-cs"/>
-        <a:sym typeface="Calibri"/>
+        <a:sym typeface="Arial"/>
       </a:defRPr>
     </a:lvl9pPr>
   </p:notesStyle>
@@ -739,6 +739,26 @@
             <a:pPr/>
             <a:r>
               <a:t>(this is to prepare the students for the exercise session, here only give an outline)</a:t>
+            </a:r>
+          </a:p>
+          <a:p>
+            <a:pPr/>
+          </a:p>
+          <a:p>
+            <a:pPr/>
+            <a:r>
+              <a:rPr u="sng">
+                <a:solidFill>
+                  <a:srgbClr val="0000FF"/>
+                </a:solidFill>
+                <a:uFill>
+                  <a:solidFill>
+                    <a:srgbClr val="0000FF"/>
+                  </a:solidFill>
+                </a:uFill>
+                <a:hlinkClick r:id="rId3" invalidUrl="" action="" tgtFrame="" tooltip="" history="1" highlightClick="0" endSnd="0"/>
+              </a:rPr>
+              <a:t>https://docs.scala-lang.org/tutorials/scala-with-maven.html</a:t>
             </a:r>
           </a:p>
         </p:txBody>
@@ -4211,8 +4231,8 @@
         </p:nvSpPr>
         <p:spPr>
           <a:xfrm>
-            <a:off x="8428176" y="6404292"/>
-            <a:ext cx="258624" cy="269241"/>
+            <a:off x="8413144" y="6406785"/>
+            <a:ext cx="273657" cy="264255"/>
           </a:xfrm>
           <a:prstGeom prst="rect">
             <a:avLst/>
@@ -4286,7 +4306,7 @@
           <a:latin typeface="+mn-lt"/>
           <a:ea typeface="+mn-ea"/>
           <a:cs typeface="+mn-cs"/>
-          <a:sym typeface="Calibri"/>
+          <a:sym typeface="Arial"/>
         </a:defRPr>
       </a:lvl1pPr>
       <a:lvl2pPr marL="0" marR="0" indent="0" algn="ctr" defTabSz="914400" rtl="0" latinLnBrk="0">
@@ -4315,7 +4335,7 @@
           <a:latin typeface="+mn-lt"/>
           <a:ea typeface="+mn-ea"/>
           <a:cs typeface="+mn-cs"/>
-          <a:sym typeface="Calibri"/>
+          <a:sym typeface="Arial"/>
         </a:defRPr>
       </a:lvl2pPr>
       <a:lvl3pPr marL="0" marR="0" indent="0" algn="ctr" defTabSz="914400" rtl="0" latinLnBrk="0">
@@ -4344,7 +4364,7 @@
           <a:latin typeface="+mn-lt"/>
           <a:ea typeface="+mn-ea"/>
           <a:cs typeface="+mn-cs"/>
-          <a:sym typeface="Calibri"/>
+          <a:sym typeface="Arial"/>
         </a:defRPr>
       </a:lvl3pPr>
       <a:lvl4pPr marL="0" marR="0" indent="0" algn="ctr" defTabSz="914400" rtl="0" latinLnBrk="0">
@@ -4373,7 +4393,7 @@
           <a:latin typeface="+mn-lt"/>
           <a:ea typeface="+mn-ea"/>
           <a:cs typeface="+mn-cs"/>
-          <a:sym typeface="Calibri"/>
+          <a:sym typeface="Arial"/>
         </a:defRPr>
       </a:lvl4pPr>
       <a:lvl5pPr marL="0" marR="0" indent="0" algn="ctr" defTabSz="914400" rtl="0" latinLnBrk="0">
@@ -4402,7 +4422,7 @@
           <a:latin typeface="+mn-lt"/>
           <a:ea typeface="+mn-ea"/>
           <a:cs typeface="+mn-cs"/>
-          <a:sym typeface="Calibri"/>
+          <a:sym typeface="Arial"/>
         </a:defRPr>
       </a:lvl5pPr>
       <a:lvl6pPr marL="0" marR="0" indent="0" algn="ctr" defTabSz="914400" rtl="0" latinLnBrk="0">
@@ -4431,7 +4451,7 @@
           <a:latin typeface="+mn-lt"/>
           <a:ea typeface="+mn-ea"/>
           <a:cs typeface="+mn-cs"/>
-          <a:sym typeface="Calibri"/>
+          <a:sym typeface="Arial"/>
         </a:defRPr>
       </a:lvl6pPr>
       <a:lvl7pPr marL="0" marR="0" indent="0" algn="ctr" defTabSz="914400" rtl="0" latinLnBrk="0">
@@ -4460,7 +4480,7 @@
           <a:latin typeface="+mn-lt"/>
           <a:ea typeface="+mn-ea"/>
           <a:cs typeface="+mn-cs"/>
-          <a:sym typeface="Calibri"/>
+          <a:sym typeface="Arial"/>
         </a:defRPr>
       </a:lvl7pPr>
       <a:lvl8pPr marL="0" marR="0" indent="0" algn="ctr" defTabSz="914400" rtl="0" latinLnBrk="0">
@@ -4489,7 +4509,7 @@
           <a:latin typeface="+mn-lt"/>
           <a:ea typeface="+mn-ea"/>
           <a:cs typeface="+mn-cs"/>
-          <a:sym typeface="Calibri"/>
+          <a:sym typeface="Arial"/>
         </a:defRPr>
       </a:lvl8pPr>
       <a:lvl9pPr marL="0" marR="0" indent="0" algn="ctr" defTabSz="914400" rtl="0" latinLnBrk="0">
@@ -4518,7 +4538,7 @@
           <a:latin typeface="+mn-lt"/>
           <a:ea typeface="+mn-ea"/>
           <a:cs typeface="+mn-cs"/>
-          <a:sym typeface="Calibri"/>
+          <a:sym typeface="Arial"/>
         </a:defRPr>
       </a:lvl9pPr>
     </p:titleStyle>
@@ -4549,7 +4569,7 @@
           <a:latin typeface="+mn-lt"/>
           <a:ea typeface="+mn-ea"/>
           <a:cs typeface="+mn-cs"/>
-          <a:sym typeface="Calibri"/>
+          <a:sym typeface="Arial"/>
         </a:defRPr>
       </a:lvl1pPr>
       <a:lvl2pPr marL="783771" marR="0" indent="-326571" algn="l" defTabSz="914400" rtl="0" latinLnBrk="0">
@@ -4578,7 +4598,7 @@
           <a:latin typeface="+mn-lt"/>
           <a:ea typeface="+mn-ea"/>
           <a:cs typeface="+mn-cs"/>
-          <a:sym typeface="Calibri"/>
+          <a:sym typeface="Arial"/>
         </a:defRPr>
       </a:lvl2pPr>
       <a:lvl3pPr marL="1219200" marR="0" indent="-304800" algn="l" defTabSz="914400" rtl="0" latinLnBrk="0">
@@ -4607,7 +4627,7 @@
           <a:latin typeface="+mn-lt"/>
           <a:ea typeface="+mn-ea"/>
           <a:cs typeface="+mn-cs"/>
-          <a:sym typeface="Calibri"/>
+          <a:sym typeface="Arial"/>
         </a:defRPr>
       </a:lvl3pPr>
       <a:lvl4pPr marL="1737360" marR="0" indent="-365760" algn="l" defTabSz="914400" rtl="0" latinLnBrk="0">
@@ -4636,7 +4656,7 @@
           <a:latin typeface="+mn-lt"/>
           <a:ea typeface="+mn-ea"/>
           <a:cs typeface="+mn-cs"/>
-          <a:sym typeface="Calibri"/>
+          <a:sym typeface="Arial"/>
         </a:defRPr>
       </a:lvl4pPr>
       <a:lvl5pPr marL="2194560" marR="0" indent="-365760" algn="l" defTabSz="914400" rtl="0" latinLnBrk="0">
@@ -4665,7 +4685,7 @@
           <a:latin typeface="+mn-lt"/>
           <a:ea typeface="+mn-ea"/>
           <a:cs typeface="+mn-cs"/>
-          <a:sym typeface="Calibri"/>
+          <a:sym typeface="Arial"/>
         </a:defRPr>
       </a:lvl5pPr>
       <a:lvl6pPr marL="2651760" marR="0" indent="-365760" algn="l" defTabSz="914400" rtl="0" latinLnBrk="0">
@@ -4694,7 +4714,7 @@
           <a:latin typeface="+mn-lt"/>
           <a:ea typeface="+mn-ea"/>
           <a:cs typeface="+mn-cs"/>
-          <a:sym typeface="Calibri"/>
+          <a:sym typeface="Arial"/>
         </a:defRPr>
       </a:lvl6pPr>
       <a:lvl7pPr marL="3108960" marR="0" indent="-365760" algn="l" defTabSz="914400" rtl="0" latinLnBrk="0">
@@ -4723,7 +4743,7 @@
           <a:latin typeface="+mn-lt"/>
           <a:ea typeface="+mn-ea"/>
           <a:cs typeface="+mn-cs"/>
-          <a:sym typeface="Calibri"/>
+          <a:sym typeface="Arial"/>
         </a:defRPr>
       </a:lvl7pPr>
       <a:lvl8pPr marL="3566159" marR="0" indent="-365759" algn="l" defTabSz="914400" rtl="0" latinLnBrk="0">
@@ -4752,7 +4772,7 @@
           <a:latin typeface="+mn-lt"/>
           <a:ea typeface="+mn-ea"/>
           <a:cs typeface="+mn-cs"/>
-          <a:sym typeface="Calibri"/>
+          <a:sym typeface="Arial"/>
         </a:defRPr>
       </a:lvl8pPr>
       <a:lvl9pPr marL="4023359" marR="0" indent="-365759" algn="l" defTabSz="914400" rtl="0" latinLnBrk="0">
@@ -4781,7 +4801,7 @@
           <a:latin typeface="+mn-lt"/>
           <a:ea typeface="+mn-ea"/>
           <a:cs typeface="+mn-cs"/>
-          <a:sym typeface="Calibri"/>
+          <a:sym typeface="Arial"/>
         </a:defRPr>
       </a:lvl9pPr>
     </p:bodyStyle>
@@ -4812,7 +4832,7 @@
           <a:latin typeface="+mn-lt"/>
           <a:ea typeface="+mn-ea"/>
           <a:cs typeface="+mn-cs"/>
-          <a:sym typeface="Calibri"/>
+          <a:sym typeface="Arial"/>
         </a:defRPr>
       </a:lvl1pPr>
       <a:lvl2pPr marL="0" marR="0" indent="457200" algn="r" defTabSz="914400" rtl="0" latinLnBrk="0">
@@ -4841,7 +4861,7 @@
           <a:latin typeface="+mn-lt"/>
           <a:ea typeface="+mn-ea"/>
           <a:cs typeface="+mn-cs"/>
-          <a:sym typeface="Calibri"/>
+          <a:sym typeface="Arial"/>
         </a:defRPr>
       </a:lvl2pPr>
       <a:lvl3pPr marL="0" marR="0" indent="914400" algn="r" defTabSz="914400" rtl="0" latinLnBrk="0">
@@ -4870,7 +4890,7 @@
           <a:latin typeface="+mn-lt"/>
           <a:ea typeface="+mn-ea"/>
           <a:cs typeface="+mn-cs"/>
-          <a:sym typeface="Calibri"/>
+          <a:sym typeface="Arial"/>
         </a:defRPr>
       </a:lvl3pPr>
       <a:lvl4pPr marL="0" marR="0" indent="1371600" algn="r" defTabSz="914400" rtl="0" latinLnBrk="0">
@@ -4899,7 +4919,7 @@
           <a:latin typeface="+mn-lt"/>
           <a:ea typeface="+mn-ea"/>
           <a:cs typeface="+mn-cs"/>
-          <a:sym typeface="Calibri"/>
+          <a:sym typeface="Arial"/>
         </a:defRPr>
       </a:lvl4pPr>
       <a:lvl5pPr marL="0" marR="0" indent="1828800" algn="r" defTabSz="914400" rtl="0" latinLnBrk="0">
@@ -4928,7 +4948,7 @@
           <a:latin typeface="+mn-lt"/>
           <a:ea typeface="+mn-ea"/>
           <a:cs typeface="+mn-cs"/>
-          <a:sym typeface="Calibri"/>
+          <a:sym typeface="Arial"/>
         </a:defRPr>
       </a:lvl5pPr>
       <a:lvl6pPr marL="0" marR="0" indent="2286000" algn="r" defTabSz="914400" rtl="0" latinLnBrk="0">
@@ -4957,7 +4977,7 @@
           <a:latin typeface="+mn-lt"/>
           <a:ea typeface="+mn-ea"/>
           <a:cs typeface="+mn-cs"/>
-          <a:sym typeface="Calibri"/>
+          <a:sym typeface="Arial"/>
         </a:defRPr>
       </a:lvl6pPr>
       <a:lvl7pPr marL="0" marR="0" indent="2743200" algn="r" defTabSz="914400" rtl="0" latinLnBrk="0">
@@ -4986,7 +5006,7 @@
           <a:latin typeface="+mn-lt"/>
           <a:ea typeface="+mn-ea"/>
           <a:cs typeface="+mn-cs"/>
-          <a:sym typeface="Calibri"/>
+          <a:sym typeface="Arial"/>
         </a:defRPr>
       </a:lvl7pPr>
       <a:lvl8pPr marL="0" marR="0" indent="3200400" algn="r" defTabSz="914400" rtl="0" latinLnBrk="0">
@@ -5015,7 +5035,7 @@
           <a:latin typeface="+mn-lt"/>
           <a:ea typeface="+mn-ea"/>
           <a:cs typeface="+mn-cs"/>
-          <a:sym typeface="Calibri"/>
+          <a:sym typeface="Arial"/>
         </a:defRPr>
       </a:lvl8pPr>
       <a:lvl9pPr marL="0" marR="0" indent="3657600" algn="r" defTabSz="914400" rtl="0" latinLnBrk="0">
@@ -5044,7 +5064,7 @@
           <a:latin typeface="+mn-lt"/>
           <a:ea typeface="+mn-ea"/>
           <a:cs typeface="+mn-cs"/>
-          <a:sym typeface="Calibri"/>
+          <a:sym typeface="Arial"/>
         </a:defRPr>
       </a:lvl9pPr>
     </p:otherStyle>
@@ -5101,12 +5121,7 @@
           <a:bodyPr/>
           <a:lstStyle>
             <a:lvl1pPr defTabSz="493776">
-              <a:defRPr sz="3240">
-                <a:latin typeface="BankGothic Lt BT"/>
-                <a:ea typeface="BankGothic Lt BT"/>
-                <a:cs typeface="BankGothic Lt BT"/>
-                <a:sym typeface="BankGothic Lt BT"/>
-              </a:defRPr>
+              <a:defRPr sz="3240"/>
             </a:lvl1pPr>
           </a:lstStyle>
           <a:p>
@@ -5176,7 +5191,7 @@
         <p:spPr>
           <a:xfrm>
             <a:off x="1058659" y="1541780"/>
-            <a:ext cx="7026682" cy="3774441"/>
+            <a:ext cx="7026682" cy="3637469"/>
           </a:xfrm>
           <a:prstGeom prst="rect">
             <a:avLst/>
@@ -5269,7 +5284,7 @@
         <p:spPr>
           <a:xfrm>
             <a:off x="675229" y="1839276"/>
-            <a:ext cx="7793542" cy="3774441"/>
+            <a:ext cx="7793542" cy="3993070"/>
           </a:xfrm>
           <a:prstGeom prst="rect">
             <a:avLst/>
@@ -5761,7 +5776,7 @@
         <p:spPr>
           <a:xfrm>
             <a:off x="4294611" y="714388"/>
-            <a:ext cx="856467" cy="370841"/>
+            <a:ext cx="879349" cy="350662"/>
           </a:xfrm>
           <a:prstGeom prst="rect">
             <a:avLst/>
@@ -5867,7 +5882,7 @@
         <p:spPr>
           <a:xfrm>
             <a:off x="3269450" y="1577339"/>
-            <a:ext cx="903460" cy="370841"/>
+            <a:ext cx="993873" cy="350663"/>
           </a:xfrm>
           <a:prstGeom prst="rect">
             <a:avLst/>
@@ -5903,7 +5918,7 @@
         <p:spPr>
           <a:xfrm>
             <a:off x="5570642" y="1934678"/>
-            <a:ext cx="752325" cy="370841"/>
+            <a:ext cx="777551" cy="350662"/>
           </a:xfrm>
           <a:prstGeom prst="rect">
             <a:avLst/>
@@ -5939,7 +5954,7 @@
         <p:spPr>
           <a:xfrm>
             <a:off x="2527301" y="2281262"/>
-            <a:ext cx="812600" cy="370841"/>
+            <a:ext cx="930249" cy="350662"/>
           </a:xfrm>
           <a:prstGeom prst="rect">
             <a:avLst/>
@@ -5975,7 +5990,7 @@
         <p:spPr>
           <a:xfrm>
             <a:off x="3552829" y="3243579"/>
-            <a:ext cx="752324" cy="370841"/>
+            <a:ext cx="777551" cy="350663"/>
           </a:xfrm>
           <a:prstGeom prst="rect">
             <a:avLst/>
@@ -6046,7 +6061,7 @@
         <p:spPr>
           <a:xfrm>
             <a:off x="5268425" y="2745739"/>
-            <a:ext cx="1224594" cy="370841"/>
+            <a:ext cx="1336996" cy="350663"/>
           </a:xfrm>
           <a:prstGeom prst="rect">
             <a:avLst/>
@@ -6243,7 +6258,11 @@
         </p:spPr>
         <p:txBody>
           <a:bodyPr/>
-          <a:lstStyle/>
+          <a:lstStyle>
+            <a:lvl1pPr defTabSz="905255">
+              <a:defRPr sz="1979"/>
+            </a:lvl1pPr>
+          </a:lstStyle>
           <a:p>
             <a:pPr/>
             <a:r>
@@ -6294,25 +6313,19 @@
           <a:bodyPr/>
           <a:lstStyle/>
           <a:p>
-            <a:pPr defTabSz="850391">
-              <a:defRPr sz="1302"/>
-            </a:pPr>
+            <a:pPr/>
             <a:r>
               <a:t>The data is distributed over the Datanodes, with replication.</a:t>
             </a:r>
           </a:p>
           <a:p>
-            <a:pPr defTabSz="850391">
-              <a:defRPr sz="1302"/>
-            </a:pPr>
+            <a:pPr/>
             <a:r>
               <a:t>Clients access (read / write) the nodes in parallel.</a:t>
             </a:r>
           </a:p>
           <a:p>
-            <a:pPr defTabSz="850391">
-              <a:defRPr sz="1302"/>
-            </a:pPr>
+            <a:pPr/>
             <a:r>
               <a:t>Overall organization is achieved by the Metadata in the Namenode.</a:t>
             </a:r>
@@ -6328,7 +6341,7 @@
         <p:spPr>
           <a:xfrm>
             <a:off x="3429707" y="4686516"/>
-            <a:ext cx="5462288" cy="370841"/>
+            <a:ext cx="5746699" cy="350662"/>
           </a:xfrm>
           <a:prstGeom prst="rect">
             <a:avLst/>
@@ -6971,7 +6984,7 @@
         <p:spPr>
           <a:xfrm>
             <a:off x="2760175" y="4215328"/>
-            <a:ext cx="5620456" cy="370841"/>
+            <a:ext cx="5910671" cy="350662"/>
           </a:xfrm>
           <a:prstGeom prst="rect">
             <a:avLst/>
@@ -7160,25 +7173,33 @@
           <a:bodyPr/>
           <a:lstStyle/>
           <a:p>
-            <a:pPr/>
+            <a:pPr marL="336042" indent="-336042" defTabSz="896111">
+              <a:defRPr sz="3136"/>
+            </a:pPr>
             <a:r>
               <a:t>We have a database with records, some of them from the same source</a:t>
             </a:r>
           </a:p>
           <a:p>
-            <a:pPr/>
+            <a:pPr marL="336042" indent="-336042" defTabSz="896111">
+              <a:defRPr sz="3136"/>
+            </a:pPr>
             <a:r>
               <a:t>However, they have subtle differences: small pieces missing from addresses, names written with abbreviations, misspellings, etc.</a:t>
             </a:r>
           </a:p>
           <a:p>
-            <a:pPr/>
+            <a:pPr marL="336042" indent="-336042" defTabSz="896111">
+              <a:defRPr sz="3136"/>
+            </a:pPr>
             <a:r>
               <a:t>How can we identify and collect linked records?</a:t>
             </a:r>
           </a:p>
           <a:p>
-            <a:pPr/>
+            <a:pPr marL="336042" indent="-336042" defTabSz="896111">
+              <a:defRPr sz="3136"/>
+            </a:pPr>
             <a:r>
               <a:t>Test database: “linkage”</a:t>
             </a:r>
@@ -7226,7 +7247,11 @@
         </p:spPr>
         <p:txBody>
           <a:bodyPr/>
-          <a:lstStyle/>
+          <a:lstStyle>
+            <a:lvl1pPr defTabSz="832104">
+              <a:defRPr sz="4004"/>
+            </a:lvl1pPr>
+          </a:lstStyle>
           <a:p>
             <a:pPr/>
             <a:r>
@@ -7244,7 +7269,7 @@
         <p:spPr>
           <a:xfrm>
             <a:off x="1272984" y="1296315"/>
-            <a:ext cx="6598033" cy="5120641"/>
+            <a:ext cx="7372013" cy="4884562"/>
           </a:xfrm>
           <a:prstGeom prst="rect">
             <a:avLst/>
@@ -7422,12 +7447,7 @@
           <a:bodyPr/>
           <a:lstStyle>
             <a:lvl1pPr>
-              <a:defRPr sz="6000">
-                <a:latin typeface="BankGothic Lt BT"/>
-                <a:ea typeface="BankGothic Lt BT"/>
-                <a:cs typeface="BankGothic Lt BT"/>
-                <a:sym typeface="BankGothic Lt BT"/>
-              </a:defRPr>
+              <a:defRPr sz="6000"/>
             </a:lvl1pPr>
           </a:lstStyle>
           <a:p>
@@ -7497,7 +7517,7 @@
         <p:spPr>
           <a:xfrm>
             <a:off x="1319083" y="1230498"/>
-            <a:ext cx="3934307" cy="1767841"/>
+            <a:ext cx="4351100" cy="1684162"/>
           </a:xfrm>
           <a:prstGeom prst="rect">
             <a:avLst/>
@@ -7556,7 +7576,7 @@
         <p:spPr>
           <a:xfrm>
             <a:off x="387376" y="3011620"/>
-            <a:ext cx="2484908" cy="370841"/>
+            <a:ext cx="2759719" cy="350662"/>
           </a:xfrm>
           <a:prstGeom prst="rect">
             <a:avLst/>
@@ -7671,7 +7691,7 @@
         <p:spPr>
           <a:xfrm>
             <a:off x="1319083" y="1230498"/>
-            <a:ext cx="6505834" cy="1767841"/>
+            <a:ext cx="7129238" cy="1684162"/>
           </a:xfrm>
           <a:prstGeom prst="rect">
             <a:avLst/>
@@ -7733,7 +7753,7 @@
         <p:spPr>
           <a:xfrm>
             <a:off x="244831" y="2964179"/>
-            <a:ext cx="2630797" cy="929641"/>
+            <a:ext cx="2836179" cy="884063"/>
           </a:xfrm>
           <a:prstGeom prst="rect">
             <a:avLst/>
@@ -7857,7 +7877,7 @@
         <p:spPr>
           <a:xfrm>
             <a:off x="2393548" y="1373043"/>
-            <a:ext cx="4356904" cy="1767841"/>
+            <a:ext cx="4772246" cy="1684162"/>
           </a:xfrm>
           <a:prstGeom prst="rect">
             <a:avLst/>
@@ -8004,7 +8024,7 @@
         <p:spPr>
           <a:xfrm>
             <a:off x="2393548" y="1373043"/>
-            <a:ext cx="4356904" cy="2047241"/>
+            <a:ext cx="4772246" cy="1950862"/>
           </a:xfrm>
           <a:prstGeom prst="rect">
             <a:avLst/>
@@ -8078,7 +8098,7 @@
         <p:spPr>
           <a:xfrm>
             <a:off x="450730" y="3803611"/>
-            <a:ext cx="1526417" cy="929641"/>
+            <a:ext cx="1628885" cy="884063"/>
           </a:xfrm>
           <a:prstGeom prst="rect">
             <a:avLst/>
@@ -8199,7 +8219,7 @@
         <p:spPr>
           <a:xfrm>
             <a:off x="1254957" y="1652443"/>
-            <a:ext cx="6634086" cy="1209041"/>
+            <a:ext cx="7200563" cy="1150762"/>
           </a:xfrm>
           <a:prstGeom prst="rect">
             <a:avLst/>
@@ -8326,7 +8346,7 @@
         <p:spPr>
           <a:xfrm>
             <a:off x="2306874" y="1518433"/>
-            <a:ext cx="4530252" cy="2047241"/>
+            <a:ext cx="5001516" cy="1950862"/>
           </a:xfrm>
           <a:prstGeom prst="rect">
             <a:avLst/>
@@ -8477,7 +8497,7 @@
         <p:spPr>
           <a:xfrm>
             <a:off x="996833" y="1525736"/>
-            <a:ext cx="7150334" cy="1209041"/>
+            <a:ext cx="7713574" cy="1150762"/>
           </a:xfrm>
           <a:prstGeom prst="rect">
             <a:avLst/>
@@ -8633,7 +8653,7 @@
         <p:spPr>
           <a:xfrm>
             <a:off x="687475" y="1431938"/>
-            <a:ext cx="7769050" cy="2885441"/>
+            <a:ext cx="8488783" cy="2750962"/>
           </a:xfrm>
           <a:prstGeom prst="rect">
             <a:avLst/>
@@ -8767,7 +8787,7 @@
         <p:spPr>
           <a:xfrm>
             <a:off x="1436285" y="1740169"/>
-            <a:ext cx="6271430" cy="2047241"/>
+            <a:ext cx="6642347" cy="1950863"/>
           </a:xfrm>
           <a:prstGeom prst="rect">
             <a:avLst/>
@@ -8883,7 +8903,7 @@
         <p:spPr>
           <a:xfrm>
             <a:off x="1663769" y="1156615"/>
-            <a:ext cx="5816462" cy="5400041"/>
+            <a:ext cx="6526484" cy="5151262"/>
           </a:xfrm>
           <a:prstGeom prst="rect">
             <a:avLst/>
@@ -9164,7 +9184,7 @@
         <p:spPr>
           <a:xfrm>
             <a:off x="1356085" y="1476608"/>
-            <a:ext cx="6431830" cy="2606041"/>
+            <a:ext cx="7351811" cy="2484262"/>
           </a:xfrm>
           <a:prstGeom prst="rect">
             <a:avLst/>
@@ -9377,7 +9397,7 @@
         <p:spPr>
           <a:xfrm>
             <a:off x="2594354" y="1626456"/>
-            <a:ext cx="3955292" cy="1767841"/>
+            <a:ext cx="4379676" cy="1684162"/>
           </a:xfrm>
           <a:prstGeom prst="rect">
             <a:avLst/>
@@ -9528,49 +9548,65 @@
           <a:bodyPr/>
           <a:lstStyle/>
           <a:p>
-            <a:pPr/>
+            <a:pPr marL="332613" indent="-332613" defTabSz="886968">
+              <a:defRPr sz="3104"/>
+            </a:pPr>
             <a:r>
               <a:t>Find a dataset in CSV form</a:t>
             </a:r>
           </a:p>
           <a:p>
-            <a:pPr/>
+            <a:pPr marL="332613" indent="-332613" defTabSz="886968">
+              <a:defRPr sz="3104"/>
+            </a:pPr>
             <a:r>
               <a:t>Place it in a directory where Spark can see it</a:t>
             </a:r>
           </a:p>
           <a:p>
-            <a:pPr/>
+            <a:pPr marL="332613" indent="-332613" defTabSz="886968">
+              <a:defRPr sz="3104"/>
+            </a:pPr>
             <a:r>
               <a:t>Open it in Scala</a:t>
             </a:r>
           </a:p>
           <a:p>
-            <a:pPr/>
+            <a:pPr marL="332613" indent="-332613" defTabSz="886968">
+              <a:defRPr sz="3104"/>
+            </a:pPr>
             <a:r>
               <a:t>Explore it:</a:t>
             </a:r>
           </a:p>
           <a:p>
-            <a:pPr lvl="2" marL="1257300" indent="-342900"/>
+            <a:pPr lvl="2" marL="1219581" indent="-332613" defTabSz="886968">
+              <a:defRPr sz="3104"/>
+            </a:pPr>
             <a:r>
               <a:t>print out a few rows</a:t>
             </a:r>
           </a:p>
           <a:p>
-            <a:pPr lvl="2" marL="1257300" indent="-342900"/>
+            <a:pPr lvl="2" marL="1219581" indent="-332613" defTabSz="886968">
+              <a:defRPr sz="3104"/>
+            </a:pPr>
             <a:r>
               <a:t>find the datatype of each column</a:t>
             </a:r>
           </a:p>
           <a:p>
-            <a:pPr lvl="2" marL="1257300" indent="-342900"/>
+            <a:pPr lvl="2" marL="1219581" indent="-332613" defTabSz="886968">
+              <a:defRPr sz="3104"/>
+            </a:pPr>
             <a:r>
               <a:t>try to get descriptive statistics</a:t>
             </a:r>
           </a:p>
           <a:p>
-            <a:pPr/>
+            <a:pPr marL="332613" indent="-332613" defTabSz="886968">
+              <a:defRPr sz="3104"/>
+            </a:pPr>
             <a:r>
               <a:t>Try to extract interesting information</a:t>
             </a:r>
@@ -9743,11 +9779,11 @@
           <a:bodyPr/>
           <a:lstStyle/>
           <a:p>
-            <a:pPr marL="274320" indent="-274320" defTabSz="731520">
+            <a:pPr marL="267461" indent="-267461" defTabSz="713231">
               <a:spcBef>
-                <a:spcPts val="600"/>
+                <a:spcPts val="500"/>
               </a:spcBef>
-              <a:defRPr sz="2560"/>
+              <a:defRPr sz="2496"/>
             </a:pPr>
             <a:r>
               <a:t>Hadoop HDFS</a:t>
@@ -9769,11 +9805,11 @@
             </a:r>
           </a:p>
           <a:p>
-            <a:pPr marL="274320" indent="-274320" defTabSz="731520">
+            <a:pPr marL="267461" indent="-267461" defTabSz="713231">
               <a:spcBef>
-                <a:spcPts val="600"/>
+                <a:spcPts val="500"/>
               </a:spcBef>
-              <a:defRPr sz="2560"/>
+              <a:defRPr sz="2496"/>
             </a:pPr>
             <a:r>
               <a:t>Hadoop setup</a:t>
@@ -9795,11 +9831,11 @@
             </a:r>
           </a:p>
           <a:p>
-            <a:pPr marL="274320" indent="-274320" defTabSz="731520">
+            <a:pPr marL="267461" indent="-267461" defTabSz="713231">
               <a:spcBef>
-                <a:spcPts val="600"/>
+                <a:spcPts val="500"/>
               </a:spcBef>
-              <a:defRPr sz="2560"/>
+              <a:defRPr sz="2496"/>
             </a:pPr>
             <a:r>
               <a:t>Spark</a:t>
@@ -9821,11 +9857,11 @@
             </a:r>
           </a:p>
           <a:p>
-            <a:pPr marL="274320" indent="-274320" defTabSz="731520">
+            <a:pPr marL="267461" indent="-267461" defTabSz="713231">
               <a:spcBef>
-                <a:spcPts val="600"/>
+                <a:spcPts val="500"/>
               </a:spcBef>
-              <a:defRPr sz="2560"/>
+              <a:defRPr sz="2496"/>
             </a:pPr>
             <a:r>
               <a:t>PySpark</a:t>
@@ -10127,45 +10163,57 @@
           <a:bodyPr/>
           <a:lstStyle/>
           <a:p>
-            <a:pPr/>
+            <a:pPr marL="332613" indent="-332613" defTabSz="886968">
+              <a:defRPr sz="3104"/>
+            </a:pPr>
             <a:r>
               <a:t>Introduction: Background of IoT, Big Data, AI</a:t>
             </a:r>
           </a:p>
           <a:p>
-            <a:pPr>
-              <a:defRPr b="1"/>
+            <a:pPr marL="332613" indent="-332613" defTabSz="886968">
+              <a:defRPr b="1" sz="3104"/>
             </a:pPr>
             <a:r>
               <a:t>Collect, analyze data from IoT on a large scale</a:t>
             </a:r>
           </a:p>
           <a:p>
-            <a:pPr/>
+            <a:pPr marL="332613" indent="-332613" defTabSz="886968">
+              <a:defRPr sz="3104"/>
+            </a:pPr>
             <a:r>
               <a:t>Elements and practice of statistics</a:t>
             </a:r>
           </a:p>
           <a:p>
-            <a:pPr/>
+            <a:pPr marL="332613" indent="-332613" defTabSz="886968">
+              <a:defRPr sz="3104"/>
+            </a:pPr>
             <a:r>
               <a:t>AI methods for data science</a:t>
             </a:r>
           </a:p>
           <a:p>
-            <a:pPr/>
+            <a:pPr marL="332613" indent="-332613" defTabSz="886968">
+              <a:defRPr sz="3104"/>
+            </a:pPr>
+            <a:r>
+              <a:t>Getting further with AI: internal workings</a:t>
+            </a:r>
+          </a:p>
+          <a:p>
+            <a:pPr marL="332613" indent="-332613" defTabSz="886968">
+              <a:defRPr sz="3104"/>
+            </a:pPr>
             <a:r>
               <a:t>Practical usage of AI for Big Data from IoT</a:t>
             </a:r>
           </a:p>
           <a:p>
-            <a:pPr/>
-            <a:r>
-              <a:t>Getting further with AI: internal workings</a:t>
-            </a:r>
-          </a:p>
-          <a:p>
-            <a:pPr/>
+            <a:pPr marL="332613" indent="-332613" defTabSz="886968">
+              <a:defRPr sz="3104"/>
+            </a:pPr>
             <a:r>
               <a:t>Moving into the real world</a:t>
             </a:r>
@@ -10439,7 +10487,7 @@
         <p:spPr>
           <a:xfrm>
             <a:off x="873755" y="1822206"/>
-            <a:ext cx="7695005" cy="3774441"/>
+            <a:ext cx="7695005" cy="3637469"/>
           </a:xfrm>
           <a:prstGeom prst="rect">
             <a:avLst/>
@@ -10483,7 +10531,7 @@
         <p:spPr>
           <a:xfrm>
             <a:off x="279444" y="5339930"/>
-            <a:ext cx="8585112" cy="929641"/>
+            <a:ext cx="8871532" cy="884063"/>
           </a:xfrm>
           <a:prstGeom prst="rect">
             <a:avLst/>
@@ -10525,7 +10573,7 @@
         <p:spPr>
           <a:xfrm>
             <a:off x="1506841" y="6252864"/>
-            <a:ext cx="3564507" cy="370841"/>
+            <a:ext cx="3683718" cy="350662"/>
           </a:xfrm>
           <a:prstGeom prst="rect">
             <a:avLst/>
@@ -10611,7 +10659,7 @@
         <p:spPr>
           <a:xfrm>
             <a:off x="724498" y="1663823"/>
-            <a:ext cx="7695005" cy="4815841"/>
+            <a:ext cx="7695005" cy="5364669"/>
           </a:xfrm>
           <a:prstGeom prst="rect">
             <a:avLst/>
@@ -10716,14 +10764,14 @@
     </a:clrScheme>
     <a:fontScheme name="Office Theme">
       <a:majorFont>
-        <a:latin typeface="Helvetica"/>
-        <a:ea typeface="Helvetica"/>
-        <a:cs typeface="Helvetica"/>
+        <a:latin typeface="Arial"/>
+        <a:ea typeface="Arial"/>
+        <a:cs typeface="Arial"/>
       </a:majorFont>
       <a:minorFont>
-        <a:latin typeface="Calibri"/>
-        <a:ea typeface="Calibri"/>
-        <a:cs typeface="Calibri"/>
+        <a:latin typeface="Arial"/>
+        <a:ea typeface="Arial"/>
+        <a:cs typeface="Arial"/>
       </a:minorFont>
     </a:fontScheme>
     <a:fmtScheme name="Office Theme">
@@ -10931,7 +10979,7 @@
             <a:latin typeface="+mn-lt"/>
             <a:ea typeface="+mn-ea"/>
             <a:cs typeface="+mn-cs"/>
-            <a:sym typeface="Calibri"/>
+            <a:sym typeface="Arial"/>
           </a:defRPr>
         </a:defPPr>
         <a:lvl1pPr marL="0" marR="0" indent="0" algn="l" defTabSz="914400" rtl="0" fontAlgn="auto" latinLnBrk="1" hangingPunct="0">
@@ -11508,7 +11556,7 @@
             <a:latin typeface="+mn-lt"/>
             <a:ea typeface="+mn-ea"/>
             <a:cs typeface="+mn-cs"/>
-            <a:sym typeface="Calibri"/>
+            <a:sym typeface="Arial"/>
           </a:defRPr>
         </a:defPPr>
         <a:lvl1pPr marL="0" marR="0" indent="0" algn="l" defTabSz="914400" rtl="0" fontAlgn="auto" latinLnBrk="1" hangingPunct="0">
@@ -11800,14 +11848,14 @@
     </a:clrScheme>
     <a:fontScheme name="Office Theme">
       <a:majorFont>
-        <a:latin typeface="Helvetica"/>
-        <a:ea typeface="Helvetica"/>
-        <a:cs typeface="Helvetica"/>
+        <a:latin typeface="Arial"/>
+        <a:ea typeface="Arial"/>
+        <a:cs typeface="Arial"/>
       </a:majorFont>
       <a:minorFont>
-        <a:latin typeface="Calibri"/>
-        <a:ea typeface="Calibri"/>
-        <a:cs typeface="Calibri"/>
+        <a:latin typeface="Arial"/>
+        <a:ea typeface="Arial"/>
+        <a:cs typeface="Arial"/>
       </a:minorFont>
     </a:fontScheme>
     <a:fmtScheme name="Office Theme">
@@ -12015,7 +12063,7 @@
             <a:latin typeface="+mn-lt"/>
             <a:ea typeface="+mn-ea"/>
             <a:cs typeface="+mn-cs"/>
-            <a:sym typeface="Calibri"/>
+            <a:sym typeface="Arial"/>
           </a:defRPr>
         </a:defPPr>
         <a:lvl1pPr marL="0" marR="0" indent="0" algn="l" defTabSz="914400" rtl="0" fontAlgn="auto" latinLnBrk="1" hangingPunct="0">
@@ -12592,7 +12640,7 @@
             <a:latin typeface="+mn-lt"/>
             <a:ea typeface="+mn-ea"/>
             <a:cs typeface="+mn-cs"/>
-            <a:sym typeface="Calibri"/>
+            <a:sym typeface="Arial"/>
           </a:defRPr>
         </a:defPPr>
         <a:lvl1pPr marL="0" marR="0" indent="0" algn="l" defTabSz="914400" rtl="0" fontAlgn="auto" latinLnBrk="1" hangingPunct="0">

</xml_diff>